<commit_message>
Updated the DL Results
</commit_message>
<xml_diff>
--- a/documentation/MW Load Presenation Final.pptx
+++ b/documentation/MW Load Presenation Final.pptx
@@ -5,7 +5,7 @@
     <p:sldMasterId id="2147483679" r:id="rId1"/>
   </p:sldMasterIdLst>
   <p:notesMasterIdLst>
-    <p:notesMasterId r:id="rId28"/>
+    <p:notesMasterId r:id="rId27"/>
   </p:notesMasterIdLst>
   <p:sldIdLst>
     <p:sldId id="256" r:id="rId2"/>
@@ -27,44 +27,43 @@
     <p:sldId id="336" r:id="rId18"/>
     <p:sldId id="323" r:id="rId19"/>
     <p:sldId id="324" r:id="rId20"/>
-    <p:sldId id="338" r:id="rId21"/>
-    <p:sldId id="325" r:id="rId22"/>
-    <p:sldId id="330" r:id="rId23"/>
-    <p:sldId id="332" r:id="rId24"/>
-    <p:sldId id="339" r:id="rId25"/>
-    <p:sldId id="331" r:id="rId26"/>
-    <p:sldId id="271" r:id="rId27"/>
+    <p:sldId id="325" r:id="rId21"/>
+    <p:sldId id="330" r:id="rId22"/>
+    <p:sldId id="332" r:id="rId23"/>
+    <p:sldId id="339" r:id="rId24"/>
+    <p:sldId id="331" r:id="rId25"/>
+    <p:sldId id="271" r:id="rId26"/>
   </p:sldIdLst>
   <p:sldSz cx="9144000" cy="5143500" type="screen16x9"/>
   <p:notesSz cx="6858000" cy="9144000"/>
   <p:embeddedFontLst>
     <p:embeddedFont>
       <p:font typeface="Cambria Math" panose="02040503050406030204" pitchFamily="18" charset="0"/>
-      <p:regular r:id="rId29"/>
+      <p:regular r:id="rId28"/>
     </p:embeddedFont>
     <p:embeddedFont>
       <p:font typeface="Figtree Black" panose="020B0604020202020204" charset="0"/>
-      <p:bold r:id="rId30"/>
-      <p:boldItalic r:id="rId31"/>
+      <p:bold r:id="rId29"/>
+      <p:boldItalic r:id="rId30"/>
     </p:embeddedFont>
     <p:embeddedFont>
       <p:font typeface="Hanken Grotesk" panose="020B0604020202020204" charset="0"/>
-      <p:regular r:id="rId32"/>
-      <p:bold r:id="rId33"/>
-      <p:italic r:id="rId34"/>
-      <p:boldItalic r:id="rId35"/>
+      <p:regular r:id="rId31"/>
+      <p:bold r:id="rId32"/>
+      <p:italic r:id="rId33"/>
+      <p:boldItalic r:id="rId34"/>
     </p:embeddedFont>
     <p:embeddedFont>
       <p:font typeface="Lato" panose="020F0502020204030203" pitchFamily="34" charset="0"/>
-      <p:regular r:id="rId36"/>
-      <p:bold r:id="rId37"/>
-      <p:italic r:id="rId38"/>
-      <p:boldItalic r:id="rId39"/>
+      <p:regular r:id="rId35"/>
+      <p:bold r:id="rId36"/>
+      <p:italic r:id="rId37"/>
+      <p:boldItalic r:id="rId38"/>
     </p:embeddedFont>
     <p:embeddedFont>
       <p:font typeface="Nunito Light" pitchFamily="2" charset="0"/>
-      <p:regular r:id="rId40"/>
-      <p:italic r:id="rId41"/>
+      <p:regular r:id="rId39"/>
+      <p:italic r:id="rId40"/>
     </p:embeddedFont>
   </p:embeddedFontLst>
   <p:defaultTextStyle>
@@ -1829,7 +1828,7 @@
           <a:p>
             <a:fld id="{1A90A598-0175-4F4C-B315-95405EC9EDA1}" type="datetimeFigureOut">
               <a:rPr lang="en-US" smtClean="0"/>
-              <a:t>1/12/2026</a:t>
+              <a:t>1/14/2026</a:t>
             </a:fld>
             <a:endParaRPr lang="en-US"/>
           </a:p>
@@ -2028,7 +2027,7 @@
           <a:p>
             <a:fld id="{1A90A598-0175-4F4C-B315-95405EC9EDA1}" type="datetimeFigureOut">
               <a:rPr lang="en-US" smtClean="0"/>
-              <a:t>1/12/2026</a:t>
+              <a:t>1/14/2026</a:t>
             </a:fld>
             <a:endParaRPr lang="en-US"/>
           </a:p>
@@ -2237,7 +2236,7 @@
           <a:p>
             <a:fld id="{1A90A598-0175-4F4C-B315-95405EC9EDA1}" type="datetimeFigureOut">
               <a:rPr lang="en-US" smtClean="0"/>
-              <a:t>1/12/2026</a:t>
+              <a:t>1/14/2026</a:t>
             </a:fld>
             <a:endParaRPr lang="en-US"/>
           </a:p>
@@ -9694,7 +9693,7 @@
           <a:p>
             <a:fld id="{1A90A598-0175-4F4C-B315-95405EC9EDA1}" type="datetimeFigureOut">
               <a:rPr lang="en-US" smtClean="0"/>
-              <a:t>1/12/2026</a:t>
+              <a:t>1/14/2026</a:t>
             </a:fld>
             <a:endParaRPr lang="en-US"/>
           </a:p>
@@ -9970,7 +9969,7 @@
           <a:p>
             <a:fld id="{1A90A598-0175-4F4C-B315-95405EC9EDA1}" type="datetimeFigureOut">
               <a:rPr lang="en-US" smtClean="0"/>
-              <a:t>1/12/2026</a:t>
+              <a:t>1/14/2026</a:t>
             </a:fld>
             <a:endParaRPr lang="en-US"/>
           </a:p>
@@ -10236,7 +10235,7 @@
           <a:p>
             <a:fld id="{1A90A598-0175-4F4C-B315-95405EC9EDA1}" type="datetimeFigureOut">
               <a:rPr lang="en-US" smtClean="0"/>
-              <a:t>1/12/2026</a:t>
+              <a:t>1/14/2026</a:t>
             </a:fld>
             <a:endParaRPr lang="en-US"/>
           </a:p>
@@ -10649,7 +10648,7 @@
           <a:p>
             <a:fld id="{1A90A598-0175-4F4C-B315-95405EC9EDA1}" type="datetimeFigureOut">
               <a:rPr lang="en-US" smtClean="0"/>
-              <a:t>1/12/2026</a:t>
+              <a:t>1/14/2026</a:t>
             </a:fld>
             <a:endParaRPr lang="en-US"/>
           </a:p>
@@ -10791,7 +10790,7 @@
           <a:p>
             <a:fld id="{1A90A598-0175-4F4C-B315-95405EC9EDA1}" type="datetimeFigureOut">
               <a:rPr lang="en-US" smtClean="0"/>
-              <a:t>1/12/2026</a:t>
+              <a:t>1/14/2026</a:t>
             </a:fld>
             <a:endParaRPr lang="en-US"/>
           </a:p>
@@ -10905,7 +10904,7 @@
           <a:p>
             <a:fld id="{1A90A598-0175-4F4C-B315-95405EC9EDA1}" type="datetimeFigureOut">
               <a:rPr lang="en-US" smtClean="0"/>
-              <a:t>1/12/2026</a:t>
+              <a:t>1/14/2026</a:t>
             </a:fld>
             <a:endParaRPr lang="en-US"/>
           </a:p>
@@ -11216,7 +11215,7 @@
           <a:p>
             <a:fld id="{1A90A598-0175-4F4C-B315-95405EC9EDA1}" type="datetimeFigureOut">
               <a:rPr lang="en-US" smtClean="0"/>
-              <a:t>1/12/2026</a:t>
+              <a:t>1/14/2026</a:t>
             </a:fld>
             <a:endParaRPr lang="en-US"/>
           </a:p>
@@ -11505,7 +11504,7 @@
           <a:p>
             <a:fld id="{1A90A598-0175-4F4C-B315-95405EC9EDA1}" type="datetimeFigureOut">
               <a:rPr lang="en-US" smtClean="0"/>
-              <a:t>1/12/2026</a:t>
+              <a:t>1/14/2026</a:t>
             </a:fld>
             <a:endParaRPr lang="en-US"/>
           </a:p>
@@ -11747,7 +11746,7 @@
           <a:p>
             <a:fld id="{1A90A598-0175-4F4C-B315-95405EC9EDA1}" type="datetimeFigureOut">
               <a:rPr lang="en-US" smtClean="0"/>
-              <a:t>1/12/2026</a:t>
+              <a:t>1/14/2026</a:t>
             </a:fld>
             <a:endParaRPr lang="en-US"/>
           </a:p>
@@ -13262,7 +13261,7 @@
             </a:r>
             <a:fld id="{1612EBDF-BBCF-4455-9CA4-C9C775D5C22A}" type="datetime1">
               <a:rPr lang="en-US" sz="1000" smtClean="0"/>
-              <a:t>1/12/2026</a:t>
+              <a:t>1/14/2026</a:t>
             </a:fld>
             <a:endParaRPr lang="en-US" sz="1000" dirty="0"/>
           </a:p>
@@ -16889,7 +16888,7 @@
             </a:r>
             <a:fld id="{1612EBDF-BBCF-4455-9CA4-C9C775D5C22A}" type="datetime1">
               <a:rPr lang="en-US" sz="1000" smtClean="0"/>
-              <a:t>1/12/2026</a:t>
+              <a:t>1/14/2026</a:t>
             </a:fld>
             <a:endParaRPr lang="en-US" sz="1000" dirty="0"/>
           </a:p>
@@ -17850,7 +17849,7 @@
             </a:r>
             <a:fld id="{1612EBDF-BBCF-4455-9CA4-C9C775D5C22A}" type="datetime1">
               <a:rPr lang="en-US" sz="1000" smtClean="0"/>
-              <a:t>1/12/2026</a:t>
+              <a:t>1/14/2026</a:t>
             </a:fld>
             <a:endParaRPr lang="en-US" sz="1000" dirty="0"/>
           </a:p>
@@ -18818,7 +18817,7 @@
             </a:r>
             <a:fld id="{1612EBDF-BBCF-4455-9CA4-C9C775D5C22A}" type="datetime1">
               <a:rPr lang="en-US" sz="1000" smtClean="0"/>
-              <a:t>1/12/2026</a:t>
+              <a:t>1/14/2026</a:t>
             </a:fld>
             <a:endParaRPr lang="en-US" sz="1000" dirty="0"/>
           </a:p>
@@ -19886,7 +19885,7 @@
             </a:r>
             <a:fld id="{1612EBDF-BBCF-4455-9CA4-C9C775D5C22A}" type="datetime1">
               <a:rPr lang="en-US" sz="1000" smtClean="0"/>
-              <a:t>1/12/2026</a:t>
+              <a:t>1/14/2026</a:t>
             </a:fld>
             <a:endParaRPr lang="en-US" sz="1000" dirty="0"/>
           </a:p>
@@ -20964,7 +20963,7 @@
             </a:r>
             <a:fld id="{1612EBDF-BBCF-4455-9CA4-C9C775D5C22A}" type="datetime1">
               <a:rPr lang="en-US" sz="1000" smtClean="0"/>
-              <a:t>1/12/2026</a:t>
+              <a:t>1/14/2026</a:t>
             </a:fld>
             <a:endParaRPr lang="en-US" sz="1000" dirty="0"/>
           </a:p>
@@ -22449,7 +22448,7 @@
             </a:r>
             <a:fld id="{1612EBDF-BBCF-4455-9CA4-C9C775D5C22A}" type="datetime1">
               <a:rPr lang="en-US" sz="1000" smtClean="0"/>
-              <a:t>1/12/2026</a:t>
+              <a:t>1/14/2026</a:t>
             </a:fld>
             <a:endParaRPr lang="en-US" sz="1000" dirty="0"/>
           </a:p>
@@ -23950,7 +23949,7 @@
             </a:r>
             <a:fld id="{1612EBDF-BBCF-4455-9CA4-C9C775D5C22A}" type="datetime1">
               <a:rPr lang="en-US" sz="1000" smtClean="0"/>
-              <a:t>1/12/2026</a:t>
+              <a:t>1/14/2026</a:t>
             </a:fld>
             <a:endParaRPr lang="en-US" sz="1000" dirty="0"/>
           </a:p>
@@ -25642,7 +25641,7 @@
             </a:r>
             <a:fld id="{1612EBDF-BBCF-4455-9CA4-C9C775D5C22A}" type="datetime1">
               <a:rPr lang="en-US" sz="1000" smtClean="0"/>
-              <a:t>1/12/2026</a:t>
+              <a:t>1/14/2026</a:t>
             </a:fld>
             <a:endParaRPr lang="en-US" sz="1000" dirty="0"/>
           </a:p>
@@ -26570,41 +26569,6 @@
           </a:p>
         </p:txBody>
       </p:sp>
-      <p:pic>
-        <p:nvPicPr>
-          <p:cNvPr id="3" name="Picture 2">
-            <a:extLst>
-              <a:ext uri="{FF2B5EF4-FFF2-40B4-BE49-F238E27FC236}">
-                <a16:creationId xmlns:a16="http://schemas.microsoft.com/office/drawing/2014/main" id="{A637630D-7C5E-C3D4-7965-49180596BABC}"/>
-              </a:ext>
-            </a:extLst>
-          </p:cNvPr>
-          <p:cNvPicPr>
-            <a:picLocks noChangeAspect="1"/>
-          </p:cNvPicPr>
-          <p:nvPr/>
-        </p:nvPicPr>
-        <p:blipFill>
-          <a:blip r:embed="rId2" cstate="print">
-            <a:extLst>
-              <a:ext uri="{28A0092B-C50C-407E-A947-70E740481C1C}">
-                <a14:useLocalDpi xmlns:a14="http://schemas.microsoft.com/office/drawing/2010/main" val="0"/>
-              </a:ext>
-            </a:extLst>
-          </a:blip>
-          <a:srcRect r="33299" b="66493"/>
-          <a:stretch/>
-        </p:blipFill>
-        <p:spPr>
-          <a:xfrm>
-            <a:off x="1173665" y="2296807"/>
-            <a:ext cx="6796670" cy="2124957"/>
-          </a:xfrm>
-          <a:prstGeom prst="rect">
-            <a:avLst/>
-          </a:prstGeom>
-        </p:spPr>
-      </p:pic>
       <p:sp>
         <p:nvSpPr>
           <p:cNvPr id="5" name="Google Shape;330;p36">
@@ -27178,57 +27142,42 @@
             </a:r>
             <a:fld id="{1612EBDF-BBCF-4455-9CA4-C9C775D5C22A}" type="datetime1">
               <a:rPr lang="en-US" sz="1000" smtClean="0"/>
-              <a:t>1/12/2026</a:t>
+              <a:t>1/14/2026</a:t>
             </a:fld>
             <a:endParaRPr lang="en-US" sz="1000" dirty="0"/>
           </a:p>
         </p:txBody>
       </p:sp>
-      <p:sp>
-        <p:nvSpPr>
-          <p:cNvPr id="9" name="TextBox 8">
+      <p:pic>
+        <p:nvPicPr>
+          <p:cNvPr id="6" name="Picture 5" descr="A graph showing different colored bars&#10;&#10;AI-generated content may be incorrect.">
             <a:extLst>
               <a:ext uri="{FF2B5EF4-FFF2-40B4-BE49-F238E27FC236}">
-                <a16:creationId xmlns:a16="http://schemas.microsoft.com/office/drawing/2014/main" id="{074CE416-641C-0304-5D8F-91EEA6985799}"/>
+                <a16:creationId xmlns:a16="http://schemas.microsoft.com/office/drawing/2014/main" id="{5C9F4911-268A-CBF1-D4C1-FF548D8339A1}"/>
               </a:ext>
             </a:extLst>
           </p:cNvPr>
-          <p:cNvSpPr txBox="1"/>
+          <p:cNvPicPr>
+            <a:picLocks noChangeAspect="1"/>
+          </p:cNvPicPr>
           <p:nvPr/>
-        </p:nvSpPr>
+        </p:nvPicPr>
+        <p:blipFill>
+          <a:blip r:embed="rId2"/>
+          <a:stretch>
+            <a:fillRect/>
+          </a:stretch>
+        </p:blipFill>
         <p:spPr>
           <a:xfrm>
-            <a:off x="1375317" y="1281723"/>
-            <a:ext cx="6783372" cy="823687"/>
+            <a:off x="1785865" y="1045402"/>
+            <a:ext cx="5647815" cy="3369272"/>
           </a:xfrm>
           <a:prstGeom prst="rect">
             <a:avLst/>
           </a:prstGeom>
-          <a:noFill/>
         </p:spPr>
-        <p:txBody>
-          <a:bodyPr wrap="square">
-            <a:spAutoFit/>
-          </a:bodyPr>
-          <a:lstStyle/>
-          <a:p>
-            <a:pPr algn="ctr" defTabSz="685800">
-              <a:lnSpc>
-                <a:spcPct val="115000"/>
-              </a:lnSpc>
-              <a:buSzPts val="1200"/>
-            </a:pPr>
-            <a:r>
-              <a:rPr lang="en-US" sz="1400" dirty="0"/>
-              <a:t>The MAE of LSTM model has the lowest average prediction error. The RMSE values are almost the same for all three models, meaning they make similar errors. Overall, LSTM gives the most accurate and consistent predictions.</a:t>
-            </a:r>
-            <a:endParaRPr lang="en-US" sz="1400" dirty="0">
-              <a:latin typeface="Hanken Grotesk"/>
-              <a:sym typeface="Hanken Grotesk"/>
-            </a:endParaRPr>
-          </a:p>
-        </p:txBody>
-      </p:sp>
+      </p:pic>
     </p:spTree>
     <p:extLst>
       <p:ext uri="{BB962C8B-B14F-4D97-AF65-F5344CB8AC3E}">
@@ -28645,1577 +28594,6 @@
         </p:nvSpPr>
         <p:spPr>
           <a:xfrm>
-            <a:off x="1193195" y="240966"/>
-            <a:ext cx="5067600" cy="558970"/>
-          </a:xfrm>
-          <a:prstGeom prst="rect">
-            <a:avLst/>
-          </a:prstGeom>
-          <a:noFill/>
-          <a:ln>
-            <a:noFill/>
-          </a:ln>
-        </p:spPr>
-        <p:txBody>
-          <a:bodyPr spcFirstLastPara="1" wrap="square" lIns="91425" tIns="91425" rIns="91425" bIns="91425" anchor="b" anchorCtr="0">
-            <a:noAutofit/>
-          </a:bodyPr>
-          <a:lstStyle>
-            <a:defPPr marR="0" lvl="0" algn="l" rtl="0">
-              <a:lnSpc>
-                <a:spcPct val="100000"/>
-              </a:lnSpc>
-              <a:spcBef>
-                <a:spcPts val="0"/>
-              </a:spcBef>
-              <a:spcAft>
-                <a:spcPts val="0"/>
-              </a:spcAft>
-            </a:defPPr>
-            <a:lvl1pPr marR="0" lvl="0" algn="l" rtl="0">
-              <a:lnSpc>
-                <a:spcPct val="100000"/>
-              </a:lnSpc>
-              <a:spcBef>
-                <a:spcPts val="0"/>
-              </a:spcBef>
-              <a:spcAft>
-                <a:spcPts val="0"/>
-              </a:spcAft>
-              <a:buClr>
-                <a:schemeClr val="dk1"/>
-              </a:buClr>
-              <a:buSzPts val="2800"/>
-              <a:buFont typeface="Figtree Black"/>
-              <a:buNone/>
-              <a:defRPr sz="2800" b="0" i="0" u="none" strike="noStrike" cap="none">
-                <a:solidFill>
-                  <a:schemeClr val="dk1"/>
-                </a:solidFill>
-                <a:latin typeface="Figtree Black"/>
-                <a:ea typeface="Figtree Black"/>
-                <a:cs typeface="Figtree Black"/>
-                <a:sym typeface="Figtree Black"/>
-              </a:defRPr>
-            </a:lvl1pPr>
-            <a:lvl2pPr marR="0" lvl="1" algn="l" rtl="0">
-              <a:lnSpc>
-                <a:spcPct val="100000"/>
-              </a:lnSpc>
-              <a:spcBef>
-                <a:spcPts val="0"/>
-              </a:spcBef>
-              <a:spcAft>
-                <a:spcPts val="0"/>
-              </a:spcAft>
-              <a:buClr>
-                <a:schemeClr val="dk1"/>
-              </a:buClr>
-              <a:buSzPts val="3000"/>
-              <a:buFont typeface="Figtree Black"/>
-              <a:buNone/>
-              <a:defRPr sz="3000" b="0" i="0" u="none" strike="noStrike" cap="none">
-                <a:solidFill>
-                  <a:schemeClr val="dk1"/>
-                </a:solidFill>
-                <a:latin typeface="Figtree Black"/>
-                <a:ea typeface="Figtree Black"/>
-                <a:cs typeface="Figtree Black"/>
-                <a:sym typeface="Figtree Black"/>
-              </a:defRPr>
-            </a:lvl2pPr>
-            <a:lvl3pPr marR="0" lvl="2" algn="l" rtl="0">
-              <a:lnSpc>
-                <a:spcPct val="100000"/>
-              </a:lnSpc>
-              <a:spcBef>
-                <a:spcPts val="0"/>
-              </a:spcBef>
-              <a:spcAft>
-                <a:spcPts val="0"/>
-              </a:spcAft>
-              <a:buClr>
-                <a:schemeClr val="dk1"/>
-              </a:buClr>
-              <a:buSzPts val="3000"/>
-              <a:buFont typeface="Figtree Black"/>
-              <a:buNone/>
-              <a:defRPr sz="3000" b="0" i="0" u="none" strike="noStrike" cap="none">
-                <a:solidFill>
-                  <a:schemeClr val="dk1"/>
-                </a:solidFill>
-                <a:latin typeface="Figtree Black"/>
-                <a:ea typeface="Figtree Black"/>
-                <a:cs typeface="Figtree Black"/>
-                <a:sym typeface="Figtree Black"/>
-              </a:defRPr>
-            </a:lvl3pPr>
-            <a:lvl4pPr marR="0" lvl="3" algn="l" rtl="0">
-              <a:lnSpc>
-                <a:spcPct val="100000"/>
-              </a:lnSpc>
-              <a:spcBef>
-                <a:spcPts val="0"/>
-              </a:spcBef>
-              <a:spcAft>
-                <a:spcPts val="0"/>
-              </a:spcAft>
-              <a:buClr>
-                <a:schemeClr val="dk1"/>
-              </a:buClr>
-              <a:buSzPts val="3000"/>
-              <a:buFont typeface="Figtree Black"/>
-              <a:buNone/>
-              <a:defRPr sz="3000" b="0" i="0" u="none" strike="noStrike" cap="none">
-                <a:solidFill>
-                  <a:schemeClr val="dk1"/>
-                </a:solidFill>
-                <a:latin typeface="Figtree Black"/>
-                <a:ea typeface="Figtree Black"/>
-                <a:cs typeface="Figtree Black"/>
-                <a:sym typeface="Figtree Black"/>
-              </a:defRPr>
-            </a:lvl4pPr>
-            <a:lvl5pPr marR="0" lvl="4" algn="l" rtl="0">
-              <a:lnSpc>
-                <a:spcPct val="100000"/>
-              </a:lnSpc>
-              <a:spcBef>
-                <a:spcPts val="0"/>
-              </a:spcBef>
-              <a:spcAft>
-                <a:spcPts val="0"/>
-              </a:spcAft>
-              <a:buClr>
-                <a:schemeClr val="dk1"/>
-              </a:buClr>
-              <a:buSzPts val="3000"/>
-              <a:buFont typeface="Figtree Black"/>
-              <a:buNone/>
-              <a:defRPr sz="3000" b="0" i="0" u="none" strike="noStrike" cap="none">
-                <a:solidFill>
-                  <a:schemeClr val="dk1"/>
-                </a:solidFill>
-                <a:latin typeface="Figtree Black"/>
-                <a:ea typeface="Figtree Black"/>
-                <a:cs typeface="Figtree Black"/>
-                <a:sym typeface="Figtree Black"/>
-              </a:defRPr>
-            </a:lvl5pPr>
-            <a:lvl6pPr marR="0" lvl="5" algn="l" rtl="0">
-              <a:lnSpc>
-                <a:spcPct val="100000"/>
-              </a:lnSpc>
-              <a:spcBef>
-                <a:spcPts val="0"/>
-              </a:spcBef>
-              <a:spcAft>
-                <a:spcPts val="0"/>
-              </a:spcAft>
-              <a:buClr>
-                <a:schemeClr val="dk1"/>
-              </a:buClr>
-              <a:buSzPts val="3000"/>
-              <a:buFont typeface="Figtree Black"/>
-              <a:buNone/>
-              <a:defRPr sz="3000" b="0" i="0" u="none" strike="noStrike" cap="none">
-                <a:solidFill>
-                  <a:schemeClr val="dk1"/>
-                </a:solidFill>
-                <a:latin typeface="Figtree Black"/>
-                <a:ea typeface="Figtree Black"/>
-                <a:cs typeface="Figtree Black"/>
-                <a:sym typeface="Figtree Black"/>
-              </a:defRPr>
-            </a:lvl6pPr>
-            <a:lvl7pPr marR="0" lvl="6" algn="l" rtl="0">
-              <a:lnSpc>
-                <a:spcPct val="100000"/>
-              </a:lnSpc>
-              <a:spcBef>
-                <a:spcPts val="0"/>
-              </a:spcBef>
-              <a:spcAft>
-                <a:spcPts val="0"/>
-              </a:spcAft>
-              <a:buClr>
-                <a:schemeClr val="dk1"/>
-              </a:buClr>
-              <a:buSzPts val="3000"/>
-              <a:buFont typeface="Figtree Black"/>
-              <a:buNone/>
-              <a:defRPr sz="3000" b="0" i="0" u="none" strike="noStrike" cap="none">
-                <a:solidFill>
-                  <a:schemeClr val="dk1"/>
-                </a:solidFill>
-                <a:latin typeface="Figtree Black"/>
-                <a:ea typeface="Figtree Black"/>
-                <a:cs typeface="Figtree Black"/>
-                <a:sym typeface="Figtree Black"/>
-              </a:defRPr>
-            </a:lvl7pPr>
-            <a:lvl8pPr marR="0" lvl="7" algn="l" rtl="0">
-              <a:lnSpc>
-                <a:spcPct val="100000"/>
-              </a:lnSpc>
-              <a:spcBef>
-                <a:spcPts val="0"/>
-              </a:spcBef>
-              <a:spcAft>
-                <a:spcPts val="0"/>
-              </a:spcAft>
-              <a:buClr>
-                <a:schemeClr val="dk1"/>
-              </a:buClr>
-              <a:buSzPts val="3000"/>
-              <a:buFont typeface="Figtree Black"/>
-              <a:buNone/>
-              <a:defRPr sz="3000" b="0" i="0" u="none" strike="noStrike" cap="none">
-                <a:solidFill>
-                  <a:schemeClr val="dk1"/>
-                </a:solidFill>
-                <a:latin typeface="Figtree Black"/>
-                <a:ea typeface="Figtree Black"/>
-                <a:cs typeface="Figtree Black"/>
-                <a:sym typeface="Figtree Black"/>
-              </a:defRPr>
-            </a:lvl8pPr>
-            <a:lvl9pPr marR="0" lvl="8" algn="l" rtl="0">
-              <a:lnSpc>
-                <a:spcPct val="100000"/>
-              </a:lnSpc>
-              <a:spcBef>
-                <a:spcPts val="0"/>
-              </a:spcBef>
-              <a:spcAft>
-                <a:spcPts val="0"/>
-              </a:spcAft>
-              <a:buClr>
-                <a:schemeClr val="dk1"/>
-              </a:buClr>
-              <a:buSzPts val="3000"/>
-              <a:buFont typeface="Figtree Black"/>
-              <a:buNone/>
-              <a:defRPr sz="3000" b="0" i="0" u="none" strike="noStrike" cap="none">
-                <a:solidFill>
-                  <a:schemeClr val="dk1"/>
-                </a:solidFill>
-                <a:latin typeface="Figtree Black"/>
-                <a:ea typeface="Figtree Black"/>
-                <a:cs typeface="Figtree Black"/>
-                <a:sym typeface="Figtree Black"/>
-              </a:defRPr>
-            </a:lvl9pPr>
-          </a:lstStyle>
-          <a:p>
-            <a:r>
-              <a:rPr lang="en-US" sz="2400" dirty="0"/>
-              <a:t>Performance Evaluation</a:t>
-            </a:r>
-          </a:p>
-        </p:txBody>
-      </p:sp>
-      <p:sp>
-        <p:nvSpPr>
-          <p:cNvPr id="8" name="Google Shape;331;p36">
-            <a:extLst>
-              <a:ext uri="{FF2B5EF4-FFF2-40B4-BE49-F238E27FC236}">
-                <a16:creationId xmlns:a16="http://schemas.microsoft.com/office/drawing/2014/main" id="{82295662-F4E9-868D-B117-C87B48D2A093}"/>
-              </a:ext>
-            </a:extLst>
-          </p:cNvPr>
-          <p:cNvSpPr txBox="1">
-            <a:spLocks/>
-          </p:cNvSpPr>
-          <p:nvPr/>
-        </p:nvSpPr>
-        <p:spPr>
-          <a:xfrm>
-            <a:off x="241332" y="242085"/>
-            <a:ext cx="824400" cy="705000"/>
-          </a:xfrm>
-          <a:prstGeom prst="rect">
-            <a:avLst/>
-          </a:prstGeom>
-          <a:solidFill>
-            <a:schemeClr val="tx1"/>
-          </a:solidFill>
-        </p:spPr>
-        <p:txBody>
-          <a:bodyPr spcFirstLastPara="1" wrap="square" lIns="91425" tIns="91425" rIns="91425" bIns="91425" anchor="ctr" anchorCtr="0">
-            <a:noAutofit/>
-          </a:bodyPr>
-          <a:lstStyle>
-            <a:defPPr marR="0" lvl="0" algn="l" rtl="0">
-              <a:lnSpc>
-                <a:spcPct val="100000"/>
-              </a:lnSpc>
-              <a:spcBef>
-                <a:spcPts val="0"/>
-              </a:spcBef>
-              <a:spcAft>
-                <a:spcPts val="0"/>
-              </a:spcAft>
-            </a:defPPr>
-            <a:lvl1pPr marR="0" lvl="0" algn="l" rtl="0">
-              <a:lnSpc>
-                <a:spcPct val="100000"/>
-              </a:lnSpc>
-              <a:spcBef>
-                <a:spcPts val="0"/>
-              </a:spcBef>
-              <a:spcAft>
-                <a:spcPts val="0"/>
-              </a:spcAft>
-              <a:buClr>
-                <a:srgbClr val="000000"/>
-              </a:buClr>
-              <a:buFont typeface="Arial"/>
-              <a:defRPr sz="1400" b="0" i="0" u="none" strike="noStrike" cap="none">
-                <a:solidFill>
-                  <a:srgbClr val="000000"/>
-                </a:solidFill>
-                <a:latin typeface="Arial"/>
-                <a:ea typeface="Arial"/>
-                <a:cs typeface="Arial"/>
-                <a:sym typeface="Arial"/>
-              </a:defRPr>
-            </a:lvl1pPr>
-            <a:lvl2pPr marR="0" lvl="1" algn="l" rtl="0">
-              <a:lnSpc>
-                <a:spcPct val="100000"/>
-              </a:lnSpc>
-              <a:spcBef>
-                <a:spcPts val="0"/>
-              </a:spcBef>
-              <a:spcAft>
-                <a:spcPts val="0"/>
-              </a:spcAft>
-              <a:buClr>
-                <a:srgbClr val="000000"/>
-              </a:buClr>
-              <a:buFont typeface="Arial"/>
-              <a:defRPr sz="1400" b="0" i="0" u="none" strike="noStrike" cap="none">
-                <a:solidFill>
-                  <a:srgbClr val="000000"/>
-                </a:solidFill>
-                <a:latin typeface="Arial"/>
-                <a:ea typeface="Arial"/>
-                <a:cs typeface="Arial"/>
-                <a:sym typeface="Arial"/>
-              </a:defRPr>
-            </a:lvl2pPr>
-            <a:lvl3pPr marR="0" lvl="2" algn="l" rtl="0">
-              <a:lnSpc>
-                <a:spcPct val="100000"/>
-              </a:lnSpc>
-              <a:spcBef>
-                <a:spcPts val="0"/>
-              </a:spcBef>
-              <a:spcAft>
-                <a:spcPts val="0"/>
-              </a:spcAft>
-              <a:buClr>
-                <a:srgbClr val="000000"/>
-              </a:buClr>
-              <a:buFont typeface="Arial"/>
-              <a:defRPr sz="1400" b="0" i="0" u="none" strike="noStrike" cap="none">
-                <a:solidFill>
-                  <a:srgbClr val="000000"/>
-                </a:solidFill>
-                <a:latin typeface="Arial"/>
-                <a:ea typeface="Arial"/>
-                <a:cs typeface="Arial"/>
-                <a:sym typeface="Arial"/>
-              </a:defRPr>
-            </a:lvl3pPr>
-            <a:lvl4pPr marR="0" lvl="3" algn="l" rtl="0">
-              <a:lnSpc>
-                <a:spcPct val="100000"/>
-              </a:lnSpc>
-              <a:spcBef>
-                <a:spcPts val="0"/>
-              </a:spcBef>
-              <a:spcAft>
-                <a:spcPts val="0"/>
-              </a:spcAft>
-              <a:buClr>
-                <a:srgbClr val="000000"/>
-              </a:buClr>
-              <a:buFont typeface="Arial"/>
-              <a:defRPr sz="1400" b="0" i="0" u="none" strike="noStrike" cap="none">
-                <a:solidFill>
-                  <a:srgbClr val="000000"/>
-                </a:solidFill>
-                <a:latin typeface="Arial"/>
-                <a:ea typeface="Arial"/>
-                <a:cs typeface="Arial"/>
-                <a:sym typeface="Arial"/>
-              </a:defRPr>
-            </a:lvl4pPr>
-            <a:lvl5pPr marR="0" lvl="4" algn="l" rtl="0">
-              <a:lnSpc>
-                <a:spcPct val="100000"/>
-              </a:lnSpc>
-              <a:spcBef>
-                <a:spcPts val="0"/>
-              </a:spcBef>
-              <a:spcAft>
-                <a:spcPts val="0"/>
-              </a:spcAft>
-              <a:buClr>
-                <a:srgbClr val="000000"/>
-              </a:buClr>
-              <a:buFont typeface="Arial"/>
-              <a:defRPr sz="1400" b="0" i="0" u="none" strike="noStrike" cap="none">
-                <a:solidFill>
-                  <a:srgbClr val="000000"/>
-                </a:solidFill>
-                <a:latin typeface="Arial"/>
-                <a:ea typeface="Arial"/>
-                <a:cs typeface="Arial"/>
-                <a:sym typeface="Arial"/>
-              </a:defRPr>
-            </a:lvl5pPr>
-            <a:lvl6pPr marR="0" lvl="5" algn="l" rtl="0">
-              <a:lnSpc>
-                <a:spcPct val="100000"/>
-              </a:lnSpc>
-              <a:spcBef>
-                <a:spcPts val="0"/>
-              </a:spcBef>
-              <a:spcAft>
-                <a:spcPts val="0"/>
-              </a:spcAft>
-              <a:buClr>
-                <a:srgbClr val="000000"/>
-              </a:buClr>
-              <a:buFont typeface="Arial"/>
-              <a:defRPr sz="1400" b="0" i="0" u="none" strike="noStrike" cap="none">
-                <a:solidFill>
-                  <a:srgbClr val="000000"/>
-                </a:solidFill>
-                <a:latin typeface="Arial"/>
-                <a:ea typeface="Arial"/>
-                <a:cs typeface="Arial"/>
-                <a:sym typeface="Arial"/>
-              </a:defRPr>
-            </a:lvl6pPr>
-            <a:lvl7pPr marR="0" lvl="6" algn="l" rtl="0">
-              <a:lnSpc>
-                <a:spcPct val="100000"/>
-              </a:lnSpc>
-              <a:spcBef>
-                <a:spcPts val="0"/>
-              </a:spcBef>
-              <a:spcAft>
-                <a:spcPts val="0"/>
-              </a:spcAft>
-              <a:buClr>
-                <a:srgbClr val="000000"/>
-              </a:buClr>
-              <a:buFont typeface="Arial"/>
-              <a:defRPr sz="1400" b="0" i="0" u="none" strike="noStrike" cap="none">
-                <a:solidFill>
-                  <a:srgbClr val="000000"/>
-                </a:solidFill>
-                <a:latin typeface="Arial"/>
-                <a:ea typeface="Arial"/>
-                <a:cs typeface="Arial"/>
-                <a:sym typeface="Arial"/>
-              </a:defRPr>
-            </a:lvl7pPr>
-            <a:lvl8pPr marR="0" lvl="7" algn="l" rtl="0">
-              <a:lnSpc>
-                <a:spcPct val="100000"/>
-              </a:lnSpc>
-              <a:spcBef>
-                <a:spcPts val="0"/>
-              </a:spcBef>
-              <a:spcAft>
-                <a:spcPts val="0"/>
-              </a:spcAft>
-              <a:buClr>
-                <a:srgbClr val="000000"/>
-              </a:buClr>
-              <a:buFont typeface="Arial"/>
-              <a:defRPr sz="1400" b="0" i="0" u="none" strike="noStrike" cap="none">
-                <a:solidFill>
-                  <a:srgbClr val="000000"/>
-                </a:solidFill>
-                <a:latin typeface="Arial"/>
-                <a:ea typeface="Arial"/>
-                <a:cs typeface="Arial"/>
-                <a:sym typeface="Arial"/>
-              </a:defRPr>
-            </a:lvl8pPr>
-            <a:lvl9pPr marR="0" lvl="8" algn="l" rtl="0">
-              <a:lnSpc>
-                <a:spcPct val="100000"/>
-              </a:lnSpc>
-              <a:spcBef>
-                <a:spcPts val="0"/>
-              </a:spcBef>
-              <a:spcAft>
-                <a:spcPts val="0"/>
-              </a:spcAft>
-              <a:buClr>
-                <a:srgbClr val="000000"/>
-              </a:buClr>
-              <a:buFont typeface="Arial"/>
-              <a:defRPr sz="1400" b="0" i="0" u="none" strike="noStrike" cap="none">
-                <a:solidFill>
-                  <a:srgbClr val="000000"/>
-                </a:solidFill>
-                <a:latin typeface="Arial"/>
-                <a:ea typeface="Arial"/>
-                <a:cs typeface="Arial"/>
-                <a:sym typeface="Arial"/>
-              </a:defRPr>
-            </a:lvl9pPr>
-          </a:lstStyle>
-          <a:p>
-            <a:pPr algn="ctr"/>
-            <a:r>
-              <a:rPr lang="en" sz="3000" dirty="0">
-                <a:solidFill>
-                  <a:schemeClr val="lt1"/>
-                </a:solidFill>
-                <a:latin typeface="Figtree Black"/>
-                <a:sym typeface="Figtree Black"/>
-              </a:rPr>
-              <a:t>5.4</a:t>
-            </a:r>
-            <a:endParaRPr lang="en" sz="3000" dirty="0"/>
-          </a:p>
-        </p:txBody>
-      </p:sp>
-      <p:sp>
-        <p:nvSpPr>
-          <p:cNvPr id="17" name="Subtitle 4">
-            <a:extLst>
-              <a:ext uri="{FF2B5EF4-FFF2-40B4-BE49-F238E27FC236}">
-                <a16:creationId xmlns:a16="http://schemas.microsoft.com/office/drawing/2014/main" id="{5F787465-7631-8DA9-23CC-13A5225FDFD9}"/>
-              </a:ext>
-            </a:extLst>
-          </p:cNvPr>
-          <p:cNvSpPr txBox="1">
-            <a:spLocks/>
-          </p:cNvSpPr>
-          <p:nvPr/>
-        </p:nvSpPr>
-        <p:spPr>
-          <a:xfrm>
-            <a:off x="1065732" y="700362"/>
-            <a:ext cx="3772800" cy="361500"/>
-          </a:xfrm>
-          <a:prstGeom prst="rect">
-            <a:avLst/>
-          </a:prstGeom>
-          <a:noFill/>
-          <a:ln>
-            <a:noFill/>
-          </a:ln>
-        </p:spPr>
-        <p:txBody>
-          <a:bodyPr spcFirstLastPara="1" wrap="square" lIns="91425" tIns="91425" rIns="91425" bIns="91425" anchor="b" anchorCtr="0">
-            <a:noAutofit/>
-          </a:bodyPr>
-          <a:lstStyle>
-            <a:defPPr marR="0" lvl="0" algn="l" rtl="0">
-              <a:lnSpc>
-                <a:spcPct val="100000"/>
-              </a:lnSpc>
-              <a:spcBef>
-                <a:spcPts val="0"/>
-              </a:spcBef>
-              <a:spcAft>
-                <a:spcPts val="0"/>
-              </a:spcAft>
-            </a:defPPr>
-            <a:lvl1pPr marL="457200" marR="0" lvl="0" indent="-317500" algn="l" rtl="0">
-              <a:lnSpc>
-                <a:spcPct val="115000"/>
-              </a:lnSpc>
-              <a:spcBef>
-                <a:spcPts val="0"/>
-              </a:spcBef>
-              <a:spcAft>
-                <a:spcPts val="0"/>
-              </a:spcAft>
-              <a:buClr>
-                <a:schemeClr val="dk1"/>
-              </a:buClr>
-              <a:buSzPts val="2400"/>
-              <a:buFont typeface="Figtree Black"/>
-              <a:buNone/>
-              <a:defRPr sz="1900" b="0" i="0" u="none" strike="noStrike" cap="none">
-                <a:solidFill>
-                  <a:schemeClr val="dk1"/>
-                </a:solidFill>
-                <a:latin typeface="Figtree Black"/>
-                <a:ea typeface="Figtree Black"/>
-                <a:cs typeface="Figtree Black"/>
-                <a:sym typeface="Figtree Black"/>
-              </a:defRPr>
-            </a:lvl1pPr>
-            <a:lvl2pPr marL="914400" marR="0" lvl="1" indent="-317500" algn="l" rtl="0">
-              <a:lnSpc>
-                <a:spcPct val="115000"/>
-              </a:lnSpc>
-              <a:spcBef>
-                <a:spcPts val="0"/>
-              </a:spcBef>
-              <a:spcAft>
-                <a:spcPts val="0"/>
-              </a:spcAft>
-              <a:buClr>
-                <a:schemeClr val="dk1"/>
-              </a:buClr>
-              <a:buSzPts val="1400"/>
-              <a:buFont typeface="Figtree Black"/>
-              <a:buNone/>
-              <a:defRPr sz="1400" b="0" i="0" u="none" strike="noStrike" cap="none">
-                <a:solidFill>
-                  <a:schemeClr val="dk1"/>
-                </a:solidFill>
-                <a:latin typeface="Figtree Black"/>
-                <a:ea typeface="Figtree Black"/>
-                <a:cs typeface="Figtree Black"/>
-                <a:sym typeface="Figtree Black"/>
-              </a:defRPr>
-            </a:lvl2pPr>
-            <a:lvl3pPr marL="1371600" marR="0" lvl="2" indent="-317500" algn="l" rtl="0">
-              <a:lnSpc>
-                <a:spcPct val="115000"/>
-              </a:lnSpc>
-              <a:spcBef>
-                <a:spcPts val="0"/>
-              </a:spcBef>
-              <a:spcAft>
-                <a:spcPts val="0"/>
-              </a:spcAft>
-              <a:buClr>
-                <a:schemeClr val="dk1"/>
-              </a:buClr>
-              <a:buSzPts val="1400"/>
-              <a:buFont typeface="Figtree Black"/>
-              <a:buNone/>
-              <a:defRPr sz="1400" b="0" i="0" u="none" strike="noStrike" cap="none">
-                <a:solidFill>
-                  <a:schemeClr val="dk1"/>
-                </a:solidFill>
-                <a:latin typeface="Figtree Black"/>
-                <a:ea typeface="Figtree Black"/>
-                <a:cs typeface="Figtree Black"/>
-                <a:sym typeface="Figtree Black"/>
-              </a:defRPr>
-            </a:lvl3pPr>
-            <a:lvl4pPr marL="1828800" marR="0" lvl="3" indent="-317500" algn="l" rtl="0">
-              <a:lnSpc>
-                <a:spcPct val="115000"/>
-              </a:lnSpc>
-              <a:spcBef>
-                <a:spcPts val="0"/>
-              </a:spcBef>
-              <a:spcAft>
-                <a:spcPts val="0"/>
-              </a:spcAft>
-              <a:buClr>
-                <a:schemeClr val="dk1"/>
-              </a:buClr>
-              <a:buSzPts val="1400"/>
-              <a:buFont typeface="Figtree Black"/>
-              <a:buNone/>
-              <a:defRPr sz="1400" b="0" i="0" u="none" strike="noStrike" cap="none">
-                <a:solidFill>
-                  <a:schemeClr val="dk1"/>
-                </a:solidFill>
-                <a:latin typeface="Figtree Black"/>
-                <a:ea typeface="Figtree Black"/>
-                <a:cs typeface="Figtree Black"/>
-                <a:sym typeface="Figtree Black"/>
-              </a:defRPr>
-            </a:lvl4pPr>
-            <a:lvl5pPr marL="2286000" marR="0" lvl="4" indent="-317500" algn="l" rtl="0">
-              <a:lnSpc>
-                <a:spcPct val="115000"/>
-              </a:lnSpc>
-              <a:spcBef>
-                <a:spcPts val="0"/>
-              </a:spcBef>
-              <a:spcAft>
-                <a:spcPts val="0"/>
-              </a:spcAft>
-              <a:buClr>
-                <a:schemeClr val="dk1"/>
-              </a:buClr>
-              <a:buSzPts val="1400"/>
-              <a:buFont typeface="Figtree Black"/>
-              <a:buNone/>
-              <a:defRPr sz="1400" b="0" i="0" u="none" strike="noStrike" cap="none">
-                <a:solidFill>
-                  <a:schemeClr val="dk1"/>
-                </a:solidFill>
-                <a:latin typeface="Figtree Black"/>
-                <a:ea typeface="Figtree Black"/>
-                <a:cs typeface="Figtree Black"/>
-                <a:sym typeface="Figtree Black"/>
-              </a:defRPr>
-            </a:lvl5pPr>
-            <a:lvl6pPr marL="2743200" marR="0" lvl="5" indent="-317500" algn="l" rtl="0">
-              <a:lnSpc>
-                <a:spcPct val="115000"/>
-              </a:lnSpc>
-              <a:spcBef>
-                <a:spcPts val="0"/>
-              </a:spcBef>
-              <a:spcAft>
-                <a:spcPts val="0"/>
-              </a:spcAft>
-              <a:buClr>
-                <a:schemeClr val="dk1"/>
-              </a:buClr>
-              <a:buSzPts val="1400"/>
-              <a:buFont typeface="Figtree Black"/>
-              <a:buNone/>
-              <a:defRPr sz="1400" b="0" i="0" u="none" strike="noStrike" cap="none">
-                <a:solidFill>
-                  <a:schemeClr val="dk1"/>
-                </a:solidFill>
-                <a:latin typeface="Figtree Black"/>
-                <a:ea typeface="Figtree Black"/>
-                <a:cs typeface="Figtree Black"/>
-                <a:sym typeface="Figtree Black"/>
-              </a:defRPr>
-            </a:lvl6pPr>
-            <a:lvl7pPr marL="3200400" marR="0" lvl="6" indent="-317500" algn="l" rtl="0">
-              <a:lnSpc>
-                <a:spcPct val="115000"/>
-              </a:lnSpc>
-              <a:spcBef>
-                <a:spcPts val="0"/>
-              </a:spcBef>
-              <a:spcAft>
-                <a:spcPts val="0"/>
-              </a:spcAft>
-              <a:buClr>
-                <a:schemeClr val="dk1"/>
-              </a:buClr>
-              <a:buSzPts val="1400"/>
-              <a:buFont typeface="Figtree Black"/>
-              <a:buNone/>
-              <a:defRPr sz="1400" b="0" i="0" u="none" strike="noStrike" cap="none">
-                <a:solidFill>
-                  <a:schemeClr val="dk1"/>
-                </a:solidFill>
-                <a:latin typeface="Figtree Black"/>
-                <a:ea typeface="Figtree Black"/>
-                <a:cs typeface="Figtree Black"/>
-                <a:sym typeface="Figtree Black"/>
-              </a:defRPr>
-            </a:lvl7pPr>
-            <a:lvl8pPr marL="3657600" marR="0" lvl="7" indent="-317500" algn="l" rtl="0">
-              <a:lnSpc>
-                <a:spcPct val="115000"/>
-              </a:lnSpc>
-              <a:spcBef>
-                <a:spcPts val="0"/>
-              </a:spcBef>
-              <a:spcAft>
-                <a:spcPts val="0"/>
-              </a:spcAft>
-              <a:buClr>
-                <a:schemeClr val="dk1"/>
-              </a:buClr>
-              <a:buSzPts val="1400"/>
-              <a:buFont typeface="Figtree Black"/>
-              <a:buNone/>
-              <a:defRPr sz="1400" b="0" i="0" u="none" strike="noStrike" cap="none">
-                <a:solidFill>
-                  <a:schemeClr val="dk1"/>
-                </a:solidFill>
-                <a:latin typeface="Figtree Black"/>
-                <a:ea typeface="Figtree Black"/>
-                <a:cs typeface="Figtree Black"/>
-                <a:sym typeface="Figtree Black"/>
-              </a:defRPr>
-            </a:lvl8pPr>
-            <a:lvl9pPr marL="4114800" marR="0" lvl="8" indent="-317500" algn="l" rtl="0">
-              <a:lnSpc>
-                <a:spcPct val="115000"/>
-              </a:lnSpc>
-              <a:spcBef>
-                <a:spcPts val="0"/>
-              </a:spcBef>
-              <a:spcAft>
-                <a:spcPts val="0"/>
-              </a:spcAft>
-              <a:buClr>
-                <a:schemeClr val="dk1"/>
-              </a:buClr>
-              <a:buSzPts val="1400"/>
-              <a:buFont typeface="Figtree Black"/>
-              <a:buNone/>
-              <a:defRPr sz="1400" b="0" i="0" u="none" strike="noStrike" cap="none">
-                <a:solidFill>
-                  <a:schemeClr val="dk1"/>
-                </a:solidFill>
-                <a:latin typeface="Figtree Black"/>
-                <a:ea typeface="Figtree Black"/>
-                <a:cs typeface="Figtree Black"/>
-                <a:sym typeface="Figtree Black"/>
-              </a:defRPr>
-            </a:lvl9pPr>
-          </a:lstStyle>
-          <a:p>
-            <a:r>
-              <a:rPr lang="en-US" sz="1600" dirty="0"/>
-              <a:t>Deep Learning Models</a:t>
-            </a:r>
-          </a:p>
-        </p:txBody>
-      </p:sp>
-      <p:pic>
-        <p:nvPicPr>
-          <p:cNvPr id="3" name="Picture 2">
-            <a:extLst>
-              <a:ext uri="{FF2B5EF4-FFF2-40B4-BE49-F238E27FC236}">
-                <a16:creationId xmlns:a16="http://schemas.microsoft.com/office/drawing/2014/main" id="{A637630D-7C5E-C3D4-7965-49180596BABC}"/>
-              </a:ext>
-            </a:extLst>
-          </p:cNvPr>
-          <p:cNvPicPr>
-            <a:picLocks noChangeAspect="1"/>
-          </p:cNvPicPr>
-          <p:nvPr/>
-        </p:nvPicPr>
-        <p:blipFill>
-          <a:blip r:embed="rId2" cstate="print">
-            <a:extLst>
-              <a:ext uri="{28A0092B-C50C-407E-A947-70E740481C1C}">
-                <a14:useLocalDpi xmlns:a14="http://schemas.microsoft.com/office/drawing/2010/main" val="0"/>
-              </a:ext>
-            </a:extLst>
-          </a:blip>
-          <a:srcRect l="66598" b="66493"/>
-          <a:stretch/>
-        </p:blipFill>
-        <p:spPr>
-          <a:xfrm>
-            <a:off x="1193195" y="2142024"/>
-            <a:ext cx="3244990" cy="2025959"/>
-          </a:xfrm>
-          <a:prstGeom prst="rect">
-            <a:avLst/>
-          </a:prstGeom>
-        </p:spPr>
-      </p:pic>
-      <p:sp>
-        <p:nvSpPr>
-          <p:cNvPr id="5" name="Google Shape;330;p36">
-            <a:extLst>
-              <a:ext uri="{FF2B5EF4-FFF2-40B4-BE49-F238E27FC236}">
-                <a16:creationId xmlns:a16="http://schemas.microsoft.com/office/drawing/2014/main" id="{7BFEDC8F-A750-94FA-5C3E-5192CD56F298}"/>
-              </a:ext>
-            </a:extLst>
-          </p:cNvPr>
-          <p:cNvSpPr txBox="1">
-            <a:spLocks/>
-          </p:cNvSpPr>
-          <p:nvPr/>
-        </p:nvSpPr>
-        <p:spPr>
-          <a:xfrm>
-            <a:off x="1519333" y="4269445"/>
-            <a:ext cx="6105334" cy="347916"/>
-          </a:xfrm>
-          <a:prstGeom prst="rect">
-            <a:avLst/>
-          </a:prstGeom>
-          <a:noFill/>
-          <a:ln>
-            <a:noFill/>
-          </a:ln>
-        </p:spPr>
-        <p:txBody>
-          <a:bodyPr spcFirstLastPara="1" wrap="square" lIns="91425" tIns="91425" rIns="91425" bIns="91425" anchor="t" anchorCtr="0">
-            <a:noAutofit/>
-          </a:bodyPr>
-          <a:lstStyle>
-            <a:defPPr marR="0" lvl="0" algn="l" rtl="0">
-              <a:lnSpc>
-                <a:spcPct val="100000"/>
-              </a:lnSpc>
-              <a:spcBef>
-                <a:spcPts val="0"/>
-              </a:spcBef>
-              <a:spcAft>
-                <a:spcPts val="0"/>
-              </a:spcAft>
-            </a:defPPr>
-            <a:lvl1pPr marL="457200" marR="0" lvl="0" indent="-317500" algn="l" rtl="0">
-              <a:lnSpc>
-                <a:spcPct val="100000"/>
-              </a:lnSpc>
-              <a:spcBef>
-                <a:spcPts val="0"/>
-              </a:spcBef>
-              <a:spcAft>
-                <a:spcPts val="0"/>
-              </a:spcAft>
-              <a:buClr>
-                <a:schemeClr val="dk1"/>
-              </a:buClr>
-              <a:buSzPts val="1400"/>
-              <a:buFont typeface="Hanken Grotesk"/>
-              <a:buNone/>
-              <a:defRPr sz="1400" b="0" i="0" u="none" strike="noStrike" cap="none">
-                <a:solidFill>
-                  <a:schemeClr val="dk1"/>
-                </a:solidFill>
-                <a:latin typeface="Hanken Grotesk"/>
-                <a:ea typeface="Hanken Grotesk"/>
-                <a:cs typeface="Hanken Grotesk"/>
-                <a:sym typeface="Hanken Grotesk"/>
-              </a:defRPr>
-            </a:lvl1pPr>
-            <a:lvl2pPr marL="914400" marR="0" lvl="1" indent="-317500" algn="ctr" rtl="0">
-              <a:lnSpc>
-                <a:spcPct val="100000"/>
-              </a:lnSpc>
-              <a:spcBef>
-                <a:spcPts val="0"/>
-              </a:spcBef>
-              <a:spcAft>
-                <a:spcPts val="0"/>
-              </a:spcAft>
-              <a:buClr>
-                <a:schemeClr val="dk1"/>
-              </a:buClr>
-              <a:buSzPts val="1400"/>
-              <a:buFont typeface="Hanken Grotesk"/>
-              <a:buNone/>
-              <a:defRPr sz="1400" b="0" i="0" u="none" strike="noStrike" cap="none">
-                <a:solidFill>
-                  <a:schemeClr val="dk1"/>
-                </a:solidFill>
-                <a:latin typeface="Hanken Grotesk"/>
-                <a:ea typeface="Hanken Grotesk"/>
-                <a:cs typeface="Hanken Grotesk"/>
-                <a:sym typeface="Hanken Grotesk"/>
-              </a:defRPr>
-            </a:lvl2pPr>
-            <a:lvl3pPr marL="1371600" marR="0" lvl="2" indent="-317500" algn="ctr" rtl="0">
-              <a:lnSpc>
-                <a:spcPct val="100000"/>
-              </a:lnSpc>
-              <a:spcBef>
-                <a:spcPts val="0"/>
-              </a:spcBef>
-              <a:spcAft>
-                <a:spcPts val="0"/>
-              </a:spcAft>
-              <a:buClr>
-                <a:schemeClr val="dk1"/>
-              </a:buClr>
-              <a:buSzPts val="1400"/>
-              <a:buFont typeface="Hanken Grotesk"/>
-              <a:buNone/>
-              <a:defRPr sz="1400" b="0" i="0" u="none" strike="noStrike" cap="none">
-                <a:solidFill>
-                  <a:schemeClr val="dk1"/>
-                </a:solidFill>
-                <a:latin typeface="Hanken Grotesk"/>
-                <a:ea typeface="Hanken Grotesk"/>
-                <a:cs typeface="Hanken Grotesk"/>
-                <a:sym typeface="Hanken Grotesk"/>
-              </a:defRPr>
-            </a:lvl3pPr>
-            <a:lvl4pPr marL="1828800" marR="0" lvl="3" indent="-317500" algn="ctr" rtl="0">
-              <a:lnSpc>
-                <a:spcPct val="100000"/>
-              </a:lnSpc>
-              <a:spcBef>
-                <a:spcPts val="0"/>
-              </a:spcBef>
-              <a:spcAft>
-                <a:spcPts val="0"/>
-              </a:spcAft>
-              <a:buClr>
-                <a:schemeClr val="dk1"/>
-              </a:buClr>
-              <a:buSzPts val="1400"/>
-              <a:buFont typeface="Hanken Grotesk"/>
-              <a:buNone/>
-              <a:defRPr sz="1400" b="0" i="0" u="none" strike="noStrike" cap="none">
-                <a:solidFill>
-                  <a:schemeClr val="dk1"/>
-                </a:solidFill>
-                <a:latin typeface="Hanken Grotesk"/>
-                <a:ea typeface="Hanken Grotesk"/>
-                <a:cs typeface="Hanken Grotesk"/>
-                <a:sym typeface="Hanken Grotesk"/>
-              </a:defRPr>
-            </a:lvl4pPr>
-            <a:lvl5pPr marL="2286000" marR="0" lvl="4" indent="-317500" algn="ctr" rtl="0">
-              <a:lnSpc>
-                <a:spcPct val="100000"/>
-              </a:lnSpc>
-              <a:spcBef>
-                <a:spcPts val="0"/>
-              </a:spcBef>
-              <a:spcAft>
-                <a:spcPts val="0"/>
-              </a:spcAft>
-              <a:buClr>
-                <a:schemeClr val="dk1"/>
-              </a:buClr>
-              <a:buSzPts val="1400"/>
-              <a:buFont typeface="Hanken Grotesk"/>
-              <a:buNone/>
-              <a:defRPr sz="1400" b="0" i="0" u="none" strike="noStrike" cap="none">
-                <a:solidFill>
-                  <a:schemeClr val="dk1"/>
-                </a:solidFill>
-                <a:latin typeface="Hanken Grotesk"/>
-                <a:ea typeface="Hanken Grotesk"/>
-                <a:cs typeface="Hanken Grotesk"/>
-                <a:sym typeface="Hanken Grotesk"/>
-              </a:defRPr>
-            </a:lvl5pPr>
-            <a:lvl6pPr marL="2743200" marR="0" lvl="5" indent="-317500" algn="ctr" rtl="0">
-              <a:lnSpc>
-                <a:spcPct val="100000"/>
-              </a:lnSpc>
-              <a:spcBef>
-                <a:spcPts val="0"/>
-              </a:spcBef>
-              <a:spcAft>
-                <a:spcPts val="0"/>
-              </a:spcAft>
-              <a:buClr>
-                <a:schemeClr val="dk1"/>
-              </a:buClr>
-              <a:buSzPts val="1400"/>
-              <a:buFont typeface="Hanken Grotesk"/>
-              <a:buNone/>
-              <a:defRPr sz="1400" b="0" i="0" u="none" strike="noStrike" cap="none">
-                <a:solidFill>
-                  <a:schemeClr val="dk1"/>
-                </a:solidFill>
-                <a:latin typeface="Hanken Grotesk"/>
-                <a:ea typeface="Hanken Grotesk"/>
-                <a:cs typeface="Hanken Grotesk"/>
-                <a:sym typeface="Hanken Grotesk"/>
-              </a:defRPr>
-            </a:lvl6pPr>
-            <a:lvl7pPr marL="3200400" marR="0" lvl="6" indent="-317500" algn="ctr" rtl="0">
-              <a:lnSpc>
-                <a:spcPct val="100000"/>
-              </a:lnSpc>
-              <a:spcBef>
-                <a:spcPts val="0"/>
-              </a:spcBef>
-              <a:spcAft>
-                <a:spcPts val="0"/>
-              </a:spcAft>
-              <a:buClr>
-                <a:schemeClr val="dk1"/>
-              </a:buClr>
-              <a:buSzPts val="1400"/>
-              <a:buFont typeface="Hanken Grotesk"/>
-              <a:buNone/>
-              <a:defRPr sz="1400" b="0" i="0" u="none" strike="noStrike" cap="none">
-                <a:solidFill>
-                  <a:schemeClr val="dk1"/>
-                </a:solidFill>
-                <a:latin typeface="Hanken Grotesk"/>
-                <a:ea typeface="Hanken Grotesk"/>
-                <a:cs typeface="Hanken Grotesk"/>
-                <a:sym typeface="Hanken Grotesk"/>
-              </a:defRPr>
-            </a:lvl7pPr>
-            <a:lvl8pPr marL="3657600" marR="0" lvl="7" indent="-317500" algn="ctr" rtl="0">
-              <a:lnSpc>
-                <a:spcPct val="100000"/>
-              </a:lnSpc>
-              <a:spcBef>
-                <a:spcPts val="0"/>
-              </a:spcBef>
-              <a:spcAft>
-                <a:spcPts val="0"/>
-              </a:spcAft>
-              <a:buClr>
-                <a:schemeClr val="dk1"/>
-              </a:buClr>
-              <a:buSzPts val="1400"/>
-              <a:buFont typeface="Hanken Grotesk"/>
-              <a:buNone/>
-              <a:defRPr sz="1400" b="0" i="0" u="none" strike="noStrike" cap="none">
-                <a:solidFill>
-                  <a:schemeClr val="dk1"/>
-                </a:solidFill>
-                <a:latin typeface="Hanken Grotesk"/>
-                <a:ea typeface="Hanken Grotesk"/>
-                <a:cs typeface="Hanken Grotesk"/>
-                <a:sym typeface="Hanken Grotesk"/>
-              </a:defRPr>
-            </a:lvl8pPr>
-            <a:lvl9pPr marL="4114800" marR="0" lvl="8" indent="-317500" algn="ctr" rtl="0">
-              <a:lnSpc>
-                <a:spcPct val="100000"/>
-              </a:lnSpc>
-              <a:spcBef>
-                <a:spcPts val="0"/>
-              </a:spcBef>
-              <a:spcAft>
-                <a:spcPts val="0"/>
-              </a:spcAft>
-              <a:buClr>
-                <a:schemeClr val="dk1"/>
-              </a:buClr>
-              <a:buSzPts val="1400"/>
-              <a:buFont typeface="Hanken Grotesk"/>
-              <a:buNone/>
-              <a:defRPr sz="1400" b="0" i="0" u="none" strike="noStrike" cap="none">
-                <a:solidFill>
-                  <a:schemeClr val="dk1"/>
-                </a:solidFill>
-                <a:latin typeface="Hanken Grotesk"/>
-                <a:ea typeface="Hanken Grotesk"/>
-                <a:cs typeface="Hanken Grotesk"/>
-                <a:sym typeface="Hanken Grotesk"/>
-              </a:defRPr>
-            </a:lvl9pPr>
-          </a:lstStyle>
-          <a:p>
-            <a:pPr marL="0" indent="0" algn="ctr"/>
-            <a:r>
-              <a:rPr lang="en-US" sz="1100" i="1" dirty="0"/>
-              <a:t>Fig 4.7 Deep Learning Models Evaluation Results</a:t>
-            </a:r>
-          </a:p>
-        </p:txBody>
-      </p:sp>
-      <p:sp>
-        <p:nvSpPr>
-          <p:cNvPr id="2" name="Google Shape;330;p36">
-            <a:extLst>
-              <a:ext uri="{FF2B5EF4-FFF2-40B4-BE49-F238E27FC236}">
-                <a16:creationId xmlns:a16="http://schemas.microsoft.com/office/drawing/2014/main" id="{CDD48701-7E78-25D1-23BF-A21633650787}"/>
-              </a:ext>
-            </a:extLst>
-          </p:cNvPr>
-          <p:cNvSpPr txBox="1">
-            <a:spLocks/>
-          </p:cNvSpPr>
-          <p:nvPr/>
-        </p:nvSpPr>
-        <p:spPr>
-          <a:xfrm>
-            <a:off x="241332" y="4617361"/>
-            <a:ext cx="3764403" cy="278135"/>
-          </a:xfrm>
-          <a:prstGeom prst="rect">
-            <a:avLst/>
-          </a:prstGeom>
-          <a:noFill/>
-          <a:ln>
-            <a:noFill/>
-          </a:ln>
-        </p:spPr>
-        <p:txBody>
-          <a:bodyPr spcFirstLastPara="1" wrap="square" lIns="91425" tIns="91425" rIns="91425" bIns="91425" anchor="t" anchorCtr="0">
-            <a:noAutofit/>
-          </a:bodyPr>
-          <a:lstStyle>
-            <a:defPPr marR="0" lvl="0" algn="l" rtl="0">
-              <a:lnSpc>
-                <a:spcPct val="100000"/>
-              </a:lnSpc>
-              <a:spcBef>
-                <a:spcPts val="0"/>
-              </a:spcBef>
-              <a:spcAft>
-                <a:spcPts val="0"/>
-              </a:spcAft>
-            </a:defPPr>
-            <a:lvl1pPr marL="457200" marR="0" lvl="0" indent="-317500" algn="l" rtl="0">
-              <a:lnSpc>
-                <a:spcPct val="100000"/>
-              </a:lnSpc>
-              <a:spcBef>
-                <a:spcPts val="0"/>
-              </a:spcBef>
-              <a:spcAft>
-                <a:spcPts val="0"/>
-              </a:spcAft>
-              <a:buClr>
-                <a:schemeClr val="dk1"/>
-              </a:buClr>
-              <a:buSzPts val="1400"/>
-              <a:buFont typeface="Hanken Grotesk"/>
-              <a:buNone/>
-              <a:defRPr sz="1400" b="0" i="0" u="none" strike="noStrike" cap="none">
-                <a:solidFill>
-                  <a:schemeClr val="dk1"/>
-                </a:solidFill>
-                <a:latin typeface="Hanken Grotesk"/>
-                <a:ea typeface="Hanken Grotesk"/>
-                <a:cs typeface="Hanken Grotesk"/>
-                <a:sym typeface="Hanken Grotesk"/>
-              </a:defRPr>
-            </a:lvl1pPr>
-            <a:lvl2pPr marL="914400" marR="0" lvl="1" indent="-317500" algn="ctr" rtl="0">
-              <a:lnSpc>
-                <a:spcPct val="100000"/>
-              </a:lnSpc>
-              <a:spcBef>
-                <a:spcPts val="0"/>
-              </a:spcBef>
-              <a:spcAft>
-                <a:spcPts val="0"/>
-              </a:spcAft>
-              <a:buClr>
-                <a:schemeClr val="dk1"/>
-              </a:buClr>
-              <a:buSzPts val="1400"/>
-              <a:buFont typeface="Hanken Grotesk"/>
-              <a:buNone/>
-              <a:defRPr sz="1400" b="0" i="0" u="none" strike="noStrike" cap="none">
-                <a:solidFill>
-                  <a:schemeClr val="dk1"/>
-                </a:solidFill>
-                <a:latin typeface="Hanken Grotesk"/>
-                <a:ea typeface="Hanken Grotesk"/>
-                <a:cs typeface="Hanken Grotesk"/>
-                <a:sym typeface="Hanken Grotesk"/>
-              </a:defRPr>
-            </a:lvl2pPr>
-            <a:lvl3pPr marL="1371600" marR="0" lvl="2" indent="-317500" algn="ctr" rtl="0">
-              <a:lnSpc>
-                <a:spcPct val="100000"/>
-              </a:lnSpc>
-              <a:spcBef>
-                <a:spcPts val="0"/>
-              </a:spcBef>
-              <a:spcAft>
-                <a:spcPts val="0"/>
-              </a:spcAft>
-              <a:buClr>
-                <a:schemeClr val="dk1"/>
-              </a:buClr>
-              <a:buSzPts val="1400"/>
-              <a:buFont typeface="Hanken Grotesk"/>
-              <a:buNone/>
-              <a:defRPr sz="1400" b="0" i="0" u="none" strike="noStrike" cap="none">
-                <a:solidFill>
-                  <a:schemeClr val="dk1"/>
-                </a:solidFill>
-                <a:latin typeface="Hanken Grotesk"/>
-                <a:ea typeface="Hanken Grotesk"/>
-                <a:cs typeface="Hanken Grotesk"/>
-                <a:sym typeface="Hanken Grotesk"/>
-              </a:defRPr>
-            </a:lvl3pPr>
-            <a:lvl4pPr marL="1828800" marR="0" lvl="3" indent="-317500" algn="ctr" rtl="0">
-              <a:lnSpc>
-                <a:spcPct val="100000"/>
-              </a:lnSpc>
-              <a:spcBef>
-                <a:spcPts val="0"/>
-              </a:spcBef>
-              <a:spcAft>
-                <a:spcPts val="0"/>
-              </a:spcAft>
-              <a:buClr>
-                <a:schemeClr val="dk1"/>
-              </a:buClr>
-              <a:buSzPts val="1400"/>
-              <a:buFont typeface="Hanken Grotesk"/>
-              <a:buNone/>
-              <a:defRPr sz="1400" b="0" i="0" u="none" strike="noStrike" cap="none">
-                <a:solidFill>
-                  <a:schemeClr val="dk1"/>
-                </a:solidFill>
-                <a:latin typeface="Hanken Grotesk"/>
-                <a:ea typeface="Hanken Grotesk"/>
-                <a:cs typeface="Hanken Grotesk"/>
-                <a:sym typeface="Hanken Grotesk"/>
-              </a:defRPr>
-            </a:lvl4pPr>
-            <a:lvl5pPr marL="2286000" marR="0" lvl="4" indent="-317500" algn="ctr" rtl="0">
-              <a:lnSpc>
-                <a:spcPct val="100000"/>
-              </a:lnSpc>
-              <a:spcBef>
-                <a:spcPts val="0"/>
-              </a:spcBef>
-              <a:spcAft>
-                <a:spcPts val="0"/>
-              </a:spcAft>
-              <a:buClr>
-                <a:schemeClr val="dk1"/>
-              </a:buClr>
-              <a:buSzPts val="1400"/>
-              <a:buFont typeface="Hanken Grotesk"/>
-              <a:buNone/>
-              <a:defRPr sz="1400" b="0" i="0" u="none" strike="noStrike" cap="none">
-                <a:solidFill>
-                  <a:schemeClr val="dk1"/>
-                </a:solidFill>
-                <a:latin typeface="Hanken Grotesk"/>
-                <a:ea typeface="Hanken Grotesk"/>
-                <a:cs typeface="Hanken Grotesk"/>
-                <a:sym typeface="Hanken Grotesk"/>
-              </a:defRPr>
-            </a:lvl5pPr>
-            <a:lvl6pPr marL="2743200" marR="0" lvl="5" indent="-317500" algn="ctr" rtl="0">
-              <a:lnSpc>
-                <a:spcPct val="100000"/>
-              </a:lnSpc>
-              <a:spcBef>
-                <a:spcPts val="0"/>
-              </a:spcBef>
-              <a:spcAft>
-                <a:spcPts val="0"/>
-              </a:spcAft>
-              <a:buClr>
-                <a:schemeClr val="dk1"/>
-              </a:buClr>
-              <a:buSzPts val="1400"/>
-              <a:buFont typeface="Hanken Grotesk"/>
-              <a:buNone/>
-              <a:defRPr sz="1400" b="0" i="0" u="none" strike="noStrike" cap="none">
-                <a:solidFill>
-                  <a:schemeClr val="dk1"/>
-                </a:solidFill>
-                <a:latin typeface="Hanken Grotesk"/>
-                <a:ea typeface="Hanken Grotesk"/>
-                <a:cs typeface="Hanken Grotesk"/>
-                <a:sym typeface="Hanken Grotesk"/>
-              </a:defRPr>
-            </a:lvl6pPr>
-            <a:lvl7pPr marL="3200400" marR="0" lvl="6" indent="-317500" algn="ctr" rtl="0">
-              <a:lnSpc>
-                <a:spcPct val="100000"/>
-              </a:lnSpc>
-              <a:spcBef>
-                <a:spcPts val="0"/>
-              </a:spcBef>
-              <a:spcAft>
-                <a:spcPts val="0"/>
-              </a:spcAft>
-              <a:buClr>
-                <a:schemeClr val="dk1"/>
-              </a:buClr>
-              <a:buSzPts val="1400"/>
-              <a:buFont typeface="Hanken Grotesk"/>
-              <a:buNone/>
-              <a:defRPr sz="1400" b="0" i="0" u="none" strike="noStrike" cap="none">
-                <a:solidFill>
-                  <a:schemeClr val="dk1"/>
-                </a:solidFill>
-                <a:latin typeface="Hanken Grotesk"/>
-                <a:ea typeface="Hanken Grotesk"/>
-                <a:cs typeface="Hanken Grotesk"/>
-                <a:sym typeface="Hanken Grotesk"/>
-              </a:defRPr>
-            </a:lvl7pPr>
-            <a:lvl8pPr marL="3657600" marR="0" lvl="7" indent="-317500" algn="ctr" rtl="0">
-              <a:lnSpc>
-                <a:spcPct val="100000"/>
-              </a:lnSpc>
-              <a:spcBef>
-                <a:spcPts val="0"/>
-              </a:spcBef>
-              <a:spcAft>
-                <a:spcPts val="0"/>
-              </a:spcAft>
-              <a:buClr>
-                <a:schemeClr val="dk1"/>
-              </a:buClr>
-              <a:buSzPts val="1400"/>
-              <a:buFont typeface="Hanken Grotesk"/>
-              <a:buNone/>
-              <a:defRPr sz="1400" b="0" i="0" u="none" strike="noStrike" cap="none">
-                <a:solidFill>
-                  <a:schemeClr val="dk1"/>
-                </a:solidFill>
-                <a:latin typeface="Hanken Grotesk"/>
-                <a:ea typeface="Hanken Grotesk"/>
-                <a:cs typeface="Hanken Grotesk"/>
-                <a:sym typeface="Hanken Grotesk"/>
-              </a:defRPr>
-            </a:lvl8pPr>
-            <a:lvl9pPr marL="4114800" marR="0" lvl="8" indent="-317500" algn="ctr" rtl="0">
-              <a:lnSpc>
-                <a:spcPct val="100000"/>
-              </a:lnSpc>
-              <a:spcBef>
-                <a:spcPts val="0"/>
-              </a:spcBef>
-              <a:spcAft>
-                <a:spcPts val="0"/>
-              </a:spcAft>
-              <a:buClr>
-                <a:schemeClr val="dk1"/>
-              </a:buClr>
-              <a:buSzPts val="1400"/>
-              <a:buFont typeface="Hanken Grotesk"/>
-              <a:buNone/>
-              <a:defRPr sz="1400" b="0" i="0" u="none" strike="noStrike" cap="none">
-                <a:solidFill>
-                  <a:schemeClr val="dk1"/>
-                </a:solidFill>
-                <a:latin typeface="Hanken Grotesk"/>
-                <a:ea typeface="Hanken Grotesk"/>
-                <a:cs typeface="Hanken Grotesk"/>
-                <a:sym typeface="Hanken Grotesk"/>
-              </a:defRPr>
-            </a:lvl9pPr>
-          </a:lstStyle>
-          <a:p>
-            <a:pPr marL="0" indent="0"/>
-            <a:r>
-              <a:rPr lang="en-US" sz="1000" dirty="0"/>
-              <a:t>Slide 16 - </a:t>
-            </a:r>
-            <a:fld id="{1612EBDF-BBCF-4455-9CA4-C9C775D5C22A}" type="datetime1">
-              <a:rPr lang="en-US" sz="1000" smtClean="0"/>
-              <a:t>1/12/2026</a:t>
-            </a:fld>
-            <a:endParaRPr lang="en-US" sz="1000" dirty="0"/>
-          </a:p>
-        </p:txBody>
-      </p:sp>
-      <p:pic>
-        <p:nvPicPr>
-          <p:cNvPr id="4" name="Picture 3">
-            <a:extLst>
-              <a:ext uri="{FF2B5EF4-FFF2-40B4-BE49-F238E27FC236}">
-                <a16:creationId xmlns:a16="http://schemas.microsoft.com/office/drawing/2014/main" id="{C7546611-A217-7189-E702-BA888CC6BD3B}"/>
-              </a:ext>
-            </a:extLst>
-          </p:cNvPr>
-          <p:cNvPicPr>
-            <a:picLocks noChangeAspect="1"/>
-          </p:cNvPicPr>
-          <p:nvPr/>
-        </p:nvPicPr>
-        <p:blipFill>
-          <a:blip r:embed="rId2" cstate="print">
-            <a:extLst>
-              <a:ext uri="{28A0092B-C50C-407E-A947-70E740481C1C}">
-                <a14:useLocalDpi xmlns:a14="http://schemas.microsoft.com/office/drawing/2010/main" val="0"/>
-              </a:ext>
-            </a:extLst>
-          </a:blip>
-          <a:srcRect t="33231" r="65393" b="33539"/>
-          <a:stretch/>
-        </p:blipFill>
-        <p:spPr>
-          <a:xfrm>
-            <a:off x="4705818" y="2093237"/>
-            <a:ext cx="3553302" cy="2123534"/>
-          </a:xfrm>
-          <a:prstGeom prst="rect">
-            <a:avLst/>
-          </a:prstGeom>
-        </p:spPr>
-      </p:pic>
-      <p:sp>
-        <p:nvSpPr>
-          <p:cNvPr id="9" name="TextBox 8">
-            <a:extLst>
-              <a:ext uri="{FF2B5EF4-FFF2-40B4-BE49-F238E27FC236}">
-                <a16:creationId xmlns:a16="http://schemas.microsoft.com/office/drawing/2014/main" id="{074CE416-641C-0304-5D8F-91EEA6985799}"/>
-              </a:ext>
-            </a:extLst>
-          </p:cNvPr>
-          <p:cNvSpPr txBox="1"/>
-          <p:nvPr/>
-        </p:nvSpPr>
-        <p:spPr>
-          <a:xfrm>
-            <a:off x="1193195" y="1341408"/>
-            <a:ext cx="7259430" cy="575927"/>
-          </a:xfrm>
-          <a:prstGeom prst="rect">
-            <a:avLst/>
-          </a:prstGeom>
-          <a:noFill/>
-        </p:spPr>
-        <p:txBody>
-          <a:bodyPr wrap="square">
-            <a:spAutoFit/>
-          </a:bodyPr>
-          <a:lstStyle/>
-          <a:p>
-            <a:pPr algn="ctr" defTabSz="685800">
-              <a:lnSpc>
-                <a:spcPct val="115000"/>
-              </a:lnSpc>
-              <a:buSzPts val="1200"/>
-            </a:pPr>
-            <a:r>
-              <a:rPr lang="en-US" sz="1400" dirty="0"/>
-              <a:t>The R² graph shows that the LSTM model achieves the highest explanatory power. The MAPE results indicate that GRU yields the lowest prediction error.</a:t>
-            </a:r>
-            <a:endParaRPr lang="en-US" sz="1400" dirty="0">
-              <a:latin typeface="Hanken Grotesk"/>
-              <a:sym typeface="Hanken Grotesk"/>
-            </a:endParaRPr>
-          </a:p>
-        </p:txBody>
-      </p:sp>
-    </p:spTree>
-    <p:extLst>
-      <p:ext uri="{BB962C8B-B14F-4D97-AF65-F5344CB8AC3E}">
-        <p14:creationId xmlns:p14="http://schemas.microsoft.com/office/powerpoint/2010/main" val="133853263"/>
-      </p:ext>
-    </p:extLst>
-  </p:cSld>
-  <p:clrMapOvr>
-    <a:masterClrMapping/>
-  </p:clrMapOvr>
-</p:sld>
-</file>
-
-<file path=ppt/slides/slide21.xml><?xml version="1.0" encoding="utf-8"?>
-<p:sld xmlns:a="http://schemas.openxmlformats.org/drawingml/2006/main" xmlns:r="http://schemas.openxmlformats.org/officeDocument/2006/relationships" xmlns:p="http://schemas.openxmlformats.org/presentationml/2006/main">
-  <p:cSld>
-    <p:spTree>
-      <p:nvGrpSpPr>
-        <p:cNvPr id="1" name=""/>
-        <p:cNvGrpSpPr/>
-        <p:nvPr/>
-      </p:nvGrpSpPr>
-      <p:grpSpPr>
-        <a:xfrm>
-          <a:off x="0" y="0"/>
-          <a:ext cx="0" cy="0"/>
-          <a:chOff x="0" y="0"/>
-          <a:chExt cx="0" cy="0"/>
-        </a:xfrm>
-      </p:grpSpPr>
-      <p:sp>
-        <p:nvSpPr>
-          <p:cNvPr id="7" name="Google Shape;329;p36">
-            <a:extLst>
-              <a:ext uri="{FF2B5EF4-FFF2-40B4-BE49-F238E27FC236}">
-                <a16:creationId xmlns:a16="http://schemas.microsoft.com/office/drawing/2014/main" id="{BFE1BF81-4654-B512-0EDA-17498BF909C3}"/>
-              </a:ext>
-            </a:extLst>
-          </p:cNvPr>
-          <p:cNvSpPr txBox="1">
-            <a:spLocks/>
-          </p:cNvSpPr>
-          <p:nvPr/>
-        </p:nvSpPr>
-        <p:spPr>
-          <a:xfrm>
             <a:off x="1193195" y="107640"/>
             <a:ext cx="5067600" cy="558970"/>
           </a:xfrm>
@@ -31329,7 +29707,7 @@
             <a:pPr marL="0" indent="0" algn="ctr"/>
             <a:r>
               <a:rPr lang="en-US" sz="1100" i="1" dirty="0"/>
-              <a:t>Fig 4.7 LSTM Model Sample Forecast vs Actual</a:t>
+              <a:t>Fig 4.7 MLP Model Sample Forecast vs Actual</a:t>
             </a:r>
           </a:p>
         </p:txBody>
@@ -31620,100 +29998,49 @@
             </a:r>
             <a:fld id="{1612EBDF-BBCF-4455-9CA4-C9C775D5C22A}" type="datetime1">
               <a:rPr lang="en-US" sz="1000" smtClean="0"/>
-              <a:t>1/12/2026</a:t>
+              <a:t>1/14/2026</a:t>
             </a:fld>
             <a:endParaRPr lang="en-US" sz="1000" dirty="0"/>
           </a:p>
         </p:txBody>
       </p:sp>
-      <p:grpSp>
-        <p:nvGrpSpPr>
-          <p:cNvPr id="6" name="Group 5">
+      <p:sp>
+        <p:nvSpPr>
+          <p:cNvPr id="3" name="TextBox 2">
             <a:extLst>
               <a:ext uri="{FF2B5EF4-FFF2-40B4-BE49-F238E27FC236}">
-                <a16:creationId xmlns:a16="http://schemas.microsoft.com/office/drawing/2014/main" id="{D02DE9A2-381E-97AF-1B0E-10E0D07781EC}"/>
+                <a16:creationId xmlns:a16="http://schemas.microsoft.com/office/drawing/2014/main" id="{D0B56183-B377-9080-5906-19477F7CB764}"/>
               </a:ext>
             </a:extLst>
           </p:cNvPr>
-          <p:cNvGrpSpPr/>
+          <p:cNvSpPr txBox="1"/>
           <p:nvPr/>
-        </p:nvGrpSpPr>
-        <p:grpSpPr>
+        </p:nvSpPr>
+        <p:spPr>
           <a:xfrm>
-            <a:off x="1511356" y="922847"/>
-            <a:ext cx="6433765" cy="2937392"/>
-            <a:chOff x="1511356" y="912687"/>
-            <a:chExt cx="6433765" cy="2937392"/>
+            <a:off x="1511356" y="1282442"/>
+            <a:ext cx="323165" cy="1383792"/>
           </a:xfrm>
-        </p:grpSpPr>
-        <p:pic>
-          <p:nvPicPr>
-            <p:cNvPr id="4" name="Picture 3">
-              <a:extLst>
-                <a:ext uri="{FF2B5EF4-FFF2-40B4-BE49-F238E27FC236}">
-                  <a16:creationId xmlns:a16="http://schemas.microsoft.com/office/drawing/2014/main" id="{735238FE-E36B-9162-A315-5A444342F3E1}"/>
-                </a:ext>
-              </a:extLst>
-            </p:cNvPr>
-            <p:cNvPicPr>
-              <a:picLocks noChangeAspect="1"/>
-            </p:cNvPicPr>
-            <p:nvPr/>
-          </p:nvPicPr>
-          <p:blipFill>
-            <a:blip r:embed="rId2"/>
-            <a:stretch>
-              <a:fillRect/>
-            </a:stretch>
-          </p:blipFill>
-          <p:spPr>
-            <a:xfrm>
-              <a:off x="1621881" y="912687"/>
-              <a:ext cx="6323240" cy="2937392"/>
-            </a:xfrm>
-            <a:prstGeom prst="rect">
-              <a:avLst/>
-            </a:prstGeom>
-          </p:spPr>
-        </p:pic>
-        <p:sp>
-          <p:nvSpPr>
-            <p:cNvPr id="3" name="TextBox 2">
-              <a:extLst>
-                <a:ext uri="{FF2B5EF4-FFF2-40B4-BE49-F238E27FC236}">
-                  <a16:creationId xmlns:a16="http://schemas.microsoft.com/office/drawing/2014/main" id="{D0B56183-B377-9080-5906-19477F7CB764}"/>
-                </a:ext>
-              </a:extLst>
-            </p:cNvPr>
-            <p:cNvSpPr txBox="1"/>
-            <p:nvPr/>
-          </p:nvSpPr>
-          <p:spPr>
-            <a:xfrm>
-              <a:off x="1511356" y="1272282"/>
-              <a:ext cx="323165" cy="1383792"/>
-            </a:xfrm>
-            <a:prstGeom prst="rect">
-              <a:avLst/>
-            </a:prstGeom>
-            <a:solidFill>
-              <a:schemeClr val="bg1"/>
-            </a:solidFill>
-          </p:spPr>
-          <p:txBody>
-            <a:bodyPr vert="vert270" wrap="square" rtlCol="0">
-              <a:spAutoFit/>
-            </a:bodyPr>
-            <a:lstStyle/>
-            <a:p>
-              <a:r>
-                <a:rPr lang="en-US" sz="900" dirty="0"/>
-                <a:t>Load (MV)</a:t>
-              </a:r>
-            </a:p>
-          </p:txBody>
-        </p:sp>
-      </p:grpSp>
+          <a:prstGeom prst="rect">
+            <a:avLst/>
+          </a:prstGeom>
+          <a:solidFill>
+            <a:schemeClr val="bg1"/>
+          </a:solidFill>
+        </p:spPr>
+        <p:txBody>
+          <a:bodyPr vert="vert270" wrap="square" rtlCol="0">
+            <a:spAutoFit/>
+          </a:bodyPr>
+          <a:lstStyle/>
+          <a:p>
+            <a:r>
+              <a:rPr lang="en-US" sz="900" dirty="0"/>
+              <a:t>Load (MV)</a:t>
+            </a:r>
+          </a:p>
+        </p:txBody>
+      </p:sp>
       <p:sp>
         <p:nvSpPr>
           <p:cNvPr id="10" name="TextBox 9">
@@ -31729,7 +30056,7 @@
         <p:spPr>
           <a:xfrm>
             <a:off x="783205" y="4222688"/>
-            <a:ext cx="8110654" cy="523220"/>
+            <a:ext cx="8110654" cy="307777"/>
           </a:xfrm>
           <a:prstGeom prst="rect">
             <a:avLst/>
@@ -31757,15 +30084,45 @@
             </a:r>
             <a:r>
               <a:rPr lang="en-US" sz="1400" b="1" dirty="0"/>
-              <a:t>LSTM</a:t>
+              <a:t>MLP</a:t>
             </a:r>
             <a:r>
               <a:rPr lang="en-US" sz="1400" dirty="0"/>
-              <a:t> model's predictions over a 24-hour period</a:t>
+              <a:t> model's predictions</a:t>
             </a:r>
           </a:p>
         </p:txBody>
       </p:sp>
+      <p:pic>
+        <p:nvPicPr>
+          <p:cNvPr id="11" name="Picture 10" descr="A graph showing a graph&#10;&#10;AI-generated content may be incorrect.">
+            <a:extLst>
+              <a:ext uri="{FF2B5EF4-FFF2-40B4-BE49-F238E27FC236}">
+                <a16:creationId xmlns:a16="http://schemas.microsoft.com/office/drawing/2014/main" id="{97D4BE0A-404E-04FD-6822-92D33E17E9BA}"/>
+              </a:ext>
+            </a:extLst>
+          </p:cNvPr>
+          <p:cNvPicPr>
+            <a:picLocks noChangeAspect="1"/>
+          </p:cNvPicPr>
+          <p:nvPr/>
+        </p:nvPicPr>
+        <p:blipFill>
+          <a:blip r:embed="rId2"/>
+          <a:stretch>
+            <a:fillRect/>
+          </a:stretch>
+        </p:blipFill>
+        <p:spPr>
+          <a:xfrm>
+            <a:off x="1834521" y="1417949"/>
+            <a:ext cx="6185210" cy="2292393"/>
+          </a:xfrm>
+          <a:prstGeom prst="rect">
+            <a:avLst/>
+          </a:prstGeom>
+        </p:spPr>
+      </p:pic>
     </p:spTree>
     <p:extLst>
       <p:ext uri="{BB962C8B-B14F-4D97-AF65-F5344CB8AC3E}">
@@ -31779,7 +30136,7 @@
 </p:sld>
 </file>
 
-<file path=ppt/slides/slide22.xml><?xml version="1.0" encoding="utf-8"?>
+<file path=ppt/slides/slide21.xml><?xml version="1.0" encoding="utf-8"?>
 <p:sld xmlns:a="http://schemas.openxmlformats.org/drawingml/2006/main" xmlns:r="http://schemas.openxmlformats.org/officeDocument/2006/relationships" xmlns:p="http://schemas.openxmlformats.org/presentationml/2006/main">
   <p:cSld>
     <p:spTree>
@@ -32372,7 +30729,7 @@
           <p:nvPr>
             <p:extLst>
               <p:ext uri="{D42A27DB-BD31-4B8C-83A1-F6EECF244321}">
-                <p14:modId xmlns:p14="http://schemas.microsoft.com/office/powerpoint/2010/main" val="1164398064"/>
+                <p14:modId xmlns:p14="http://schemas.microsoft.com/office/powerpoint/2010/main" val="3826615946"/>
               </p:ext>
             </p:extLst>
           </p:nvPr>
@@ -32437,16 +30794,18 @@
                     <a:bodyPr/>
                     <a:lstStyle/>
                     <a:p>
-                      <a:pPr algn="ctr"/>
+                      <a:pPr marL="0" algn="ctr" defTabSz="685800" rtl="0" eaLnBrk="1" latinLnBrk="0" hangingPunct="1"/>
                       <a:r>
-                        <a:rPr lang="en-US" sz="900" b="1" dirty="0">
+                        <a:rPr lang="en-US" sz="1000" b="1" kern="1200" dirty="0">
+                          <a:solidFill>
+                            <a:schemeClr val="tx1"/>
+                          </a:solidFill>
                           <a:latin typeface="Hanken Grotesk" panose="020B0604020202020204" charset="0"/>
+                          <a:ea typeface="+mn-ea"/>
+                          <a:cs typeface="+mn-cs"/>
                         </a:rPr>
                         <a:t>Rank</a:t>
                       </a:r>
-                      <a:endParaRPr lang="en-US" sz="900" dirty="0">
-                        <a:latin typeface="Hanken Grotesk" panose="020B0604020202020204" charset="0"/>
-                      </a:endParaRPr>
                     </a:p>
                   </a:txBody>
                   <a:tcPr marL="56005" marR="56005" marT="28002" marB="28002" anchor="ctr"/>
@@ -32456,16 +30815,18 @@
                     <a:bodyPr/>
                     <a:lstStyle/>
                     <a:p>
-                      <a:pPr algn="ctr"/>
+                      <a:pPr marL="0" algn="ctr" defTabSz="685800" rtl="0" eaLnBrk="1" latinLnBrk="0" hangingPunct="1"/>
                       <a:r>
-                        <a:rPr lang="en-US" sz="900" b="1" dirty="0">
+                        <a:rPr lang="en-US" sz="1000" b="1" kern="1200" dirty="0">
+                          <a:solidFill>
+                            <a:schemeClr val="tx1"/>
+                          </a:solidFill>
                           <a:latin typeface="Hanken Grotesk" panose="020B0604020202020204" charset="0"/>
+                          <a:ea typeface="+mn-ea"/>
+                          <a:cs typeface="+mn-cs"/>
                         </a:rPr>
                         <a:t>Model</a:t>
                       </a:r>
-                      <a:endParaRPr lang="en-US" sz="900" dirty="0">
-                        <a:latin typeface="Hanken Grotesk" panose="020B0604020202020204" charset="0"/>
-                      </a:endParaRPr>
                     </a:p>
                   </a:txBody>
                   <a:tcPr marL="56005" marR="56005" marT="28002" marB="28002" anchor="ctr"/>
@@ -32475,16 +30836,18 @@
                     <a:bodyPr/>
                     <a:lstStyle/>
                     <a:p>
-                      <a:pPr algn="ctr"/>
+                      <a:pPr marL="0" algn="ctr" defTabSz="685800" rtl="0" eaLnBrk="1" latinLnBrk="0" hangingPunct="1"/>
                       <a:r>
-                        <a:rPr lang="en-US" sz="900" b="1">
+                        <a:rPr lang="en-US" sz="1000" b="1" kern="1200">
+                          <a:solidFill>
+                            <a:schemeClr val="tx1"/>
+                          </a:solidFill>
                           <a:latin typeface="Hanken Grotesk" panose="020B0604020202020204" charset="0"/>
+                          <a:ea typeface="+mn-ea"/>
+                          <a:cs typeface="+mn-cs"/>
                         </a:rPr>
                         <a:t>MAE</a:t>
                       </a:r>
-                      <a:endParaRPr lang="en-US" sz="900">
-                        <a:latin typeface="Hanken Grotesk" panose="020B0604020202020204" charset="0"/>
-                      </a:endParaRPr>
                     </a:p>
                   </a:txBody>
                   <a:tcPr marL="56005" marR="56005" marT="28002" marB="28002" anchor="ctr"/>
@@ -32494,16 +30857,18 @@
                     <a:bodyPr/>
                     <a:lstStyle/>
                     <a:p>
-                      <a:pPr algn="ctr"/>
+                      <a:pPr marL="0" algn="ctr" defTabSz="685800" rtl="0" eaLnBrk="1" latinLnBrk="0" hangingPunct="1"/>
                       <a:r>
-                        <a:rPr lang="en-US" sz="900" b="1">
+                        <a:rPr lang="en-US" sz="1000" b="1" kern="1200">
+                          <a:solidFill>
+                            <a:schemeClr val="tx1"/>
+                          </a:solidFill>
                           <a:latin typeface="Hanken Grotesk" panose="020B0604020202020204" charset="0"/>
+                          <a:ea typeface="+mn-ea"/>
+                          <a:cs typeface="+mn-cs"/>
                         </a:rPr>
                         <a:t>RMSE</a:t>
                       </a:r>
-                      <a:endParaRPr lang="en-US" sz="900">
-                        <a:latin typeface="Hanken Grotesk" panose="020B0604020202020204" charset="0"/>
-                      </a:endParaRPr>
                     </a:p>
                   </a:txBody>
                   <a:tcPr marL="56005" marR="56005" marT="28002" marB="28002" anchor="ctr"/>
@@ -32513,16 +30878,18 @@
                     <a:bodyPr/>
                     <a:lstStyle/>
                     <a:p>
-                      <a:pPr algn="ctr"/>
+                      <a:pPr marL="0" algn="ctr" defTabSz="685800" rtl="0" eaLnBrk="1" latinLnBrk="0" hangingPunct="1"/>
                       <a:r>
-                        <a:rPr lang="en-US" sz="900" b="1">
+                        <a:rPr lang="en-US" sz="1000" b="1" kern="1200">
+                          <a:solidFill>
+                            <a:schemeClr val="tx1"/>
+                          </a:solidFill>
                           <a:latin typeface="Hanken Grotesk" panose="020B0604020202020204" charset="0"/>
+                          <a:ea typeface="+mn-ea"/>
+                          <a:cs typeface="+mn-cs"/>
                         </a:rPr>
                         <a:t>R²</a:t>
                       </a:r>
-                      <a:endParaRPr lang="en-US" sz="900">
-                        <a:latin typeface="Hanken Grotesk" panose="020B0604020202020204" charset="0"/>
-                      </a:endParaRPr>
                     </a:p>
                   </a:txBody>
                   <a:tcPr marL="56005" marR="56005" marT="28002" marB="28002" anchor="ctr"/>
@@ -32532,16 +30899,18 @@
                     <a:bodyPr/>
                     <a:lstStyle/>
                     <a:p>
-                      <a:pPr algn="ctr"/>
+                      <a:pPr marL="0" algn="ctr" defTabSz="685800" rtl="0" eaLnBrk="1" latinLnBrk="0" hangingPunct="1"/>
                       <a:r>
-                        <a:rPr lang="en-US" sz="900" b="1">
+                        <a:rPr lang="en-US" sz="1000" b="1" kern="1200" dirty="0">
+                          <a:solidFill>
+                            <a:schemeClr val="tx1"/>
+                          </a:solidFill>
                           <a:latin typeface="Hanken Grotesk" panose="020B0604020202020204" charset="0"/>
+                          <a:ea typeface="+mn-ea"/>
+                          <a:cs typeface="+mn-cs"/>
                         </a:rPr>
                         <a:t>Category</a:t>
                       </a:r>
-                      <a:endParaRPr lang="en-US" sz="900">
-                        <a:latin typeface="Hanken Grotesk" panose="020B0604020202020204" charset="0"/>
-                      </a:endParaRPr>
                     </a:p>
                   </a:txBody>
                   <a:tcPr marL="56005" marR="56005" marT="28002" marB="28002" anchor="ctr"/>
@@ -32558,16 +30927,18 @@
                     <a:bodyPr/>
                     <a:lstStyle/>
                     <a:p>
-                      <a:pPr algn="ctr"/>
+                      <a:pPr marL="0" algn="ctr" defTabSz="685800" rtl="0" eaLnBrk="1" latinLnBrk="0" hangingPunct="1"/>
                       <a:r>
-                        <a:rPr lang="en-US" sz="900" b="1" dirty="0">
+                        <a:rPr lang="en-US" sz="900" kern="1200" dirty="0">
+                          <a:solidFill>
+                            <a:schemeClr val="tx1"/>
+                          </a:solidFill>
                           <a:latin typeface="Hanken Grotesk" panose="020B0604020202020204" charset="0"/>
+                          <a:ea typeface="+mn-ea"/>
+                          <a:cs typeface="+mn-cs"/>
                         </a:rPr>
                         <a:t>1</a:t>
                       </a:r>
-                      <a:endParaRPr lang="en-US" sz="900" dirty="0">
-                        <a:latin typeface="Hanken Grotesk" panose="020B0604020202020204" charset="0"/>
-                      </a:endParaRPr>
                     </a:p>
                   </a:txBody>
                   <a:tcPr marL="56005" marR="56005" marT="28002" marB="28002" anchor="ctr"/>
@@ -32577,22 +30948,18 @@
                     <a:bodyPr/>
                     <a:lstStyle/>
                     <a:p>
-                      <a:pPr algn="ctr"/>
+                      <a:pPr marL="0" algn="ctr" defTabSz="685800" rtl="0" eaLnBrk="1" latinLnBrk="0" hangingPunct="1"/>
                       <a:r>
-                        <a:rPr lang="en-US" sz="900" b="1" dirty="0" err="1">
+                        <a:rPr lang="en-US" sz="900" kern="1200" dirty="0">
+                          <a:solidFill>
+                            <a:schemeClr val="tx1"/>
+                          </a:solidFill>
                           <a:latin typeface="Hanken Grotesk" panose="020B0604020202020204" charset="0"/>
+                          <a:ea typeface="+mn-ea"/>
+                          <a:cs typeface="+mn-cs"/>
                         </a:rPr>
-                        <a:t>XGBoost</a:t>
+                        <a:t>MLP</a:t>
                       </a:r>
-                      <a:r>
-                        <a:rPr lang="en-US" sz="900" b="1" dirty="0">
-                          <a:latin typeface="Hanken Grotesk" panose="020B0604020202020204" charset="0"/>
-                        </a:rPr>
-                        <a:t> (Tuned)</a:t>
-                      </a:r>
-                      <a:endParaRPr lang="en-US" sz="900" dirty="0">
-                        <a:latin typeface="Hanken Grotesk" panose="020B0604020202020204" charset="0"/>
-                      </a:endParaRPr>
                     </a:p>
                   </a:txBody>
                   <a:tcPr marL="56005" marR="56005" marT="28002" marB="28002" anchor="ctr"/>
@@ -32602,16 +30969,18 @@
                     <a:bodyPr/>
                     <a:lstStyle/>
                     <a:p>
-                      <a:pPr algn="ctr"/>
+                      <a:pPr marL="0" algn="ctr" defTabSz="685800" rtl="0" eaLnBrk="1" latinLnBrk="0" hangingPunct="1"/>
                       <a:r>
-                        <a:rPr lang="en-US" sz="900" b="1">
+                        <a:rPr lang="en-US" sz="900" kern="1200" dirty="0">
+                          <a:solidFill>
+                            <a:schemeClr val="tx1"/>
+                          </a:solidFill>
                           <a:latin typeface="Hanken Grotesk" panose="020B0604020202020204" charset="0"/>
+                          <a:ea typeface="+mn-ea"/>
+                          <a:cs typeface="+mn-cs"/>
                         </a:rPr>
-                        <a:t>0.257</a:t>
+                        <a:t>0.155</a:t>
                       </a:r>
-                      <a:endParaRPr lang="en-US" sz="900">
-                        <a:latin typeface="Hanken Grotesk" panose="020B0604020202020204" charset="0"/>
-                      </a:endParaRPr>
                     </a:p>
                   </a:txBody>
                   <a:tcPr marL="56005" marR="56005" marT="28002" marB="28002" anchor="ctr"/>
@@ -32621,16 +30990,18 @@
                     <a:bodyPr/>
                     <a:lstStyle/>
                     <a:p>
-                      <a:pPr algn="ctr"/>
+                      <a:pPr marL="0" algn="ctr" defTabSz="685800" rtl="0" eaLnBrk="1" latinLnBrk="0" hangingPunct="1"/>
                       <a:r>
-                        <a:rPr lang="en-US" sz="900" b="1">
+                        <a:rPr lang="en-US" sz="900" kern="1200" dirty="0">
+                          <a:solidFill>
+                            <a:schemeClr val="tx1"/>
+                          </a:solidFill>
                           <a:latin typeface="Hanken Grotesk" panose="020B0604020202020204" charset="0"/>
+                          <a:ea typeface="+mn-ea"/>
+                          <a:cs typeface="+mn-cs"/>
                         </a:rPr>
-                        <a:t>0.384</a:t>
+                        <a:t>0.242</a:t>
                       </a:r>
-                      <a:endParaRPr lang="en-US" sz="900">
-                        <a:latin typeface="Hanken Grotesk" panose="020B0604020202020204" charset="0"/>
-                      </a:endParaRPr>
                     </a:p>
                   </a:txBody>
                   <a:tcPr marL="56005" marR="56005" marT="28002" marB="28002" anchor="ctr"/>
@@ -32640,16 +31011,18 @@
                     <a:bodyPr/>
                     <a:lstStyle/>
                     <a:p>
-                      <a:pPr algn="ctr"/>
+                      <a:pPr marL="0" algn="ctr" defTabSz="685800" rtl="0" eaLnBrk="1" latinLnBrk="0" hangingPunct="1"/>
                       <a:r>
-                        <a:rPr lang="en-US" sz="900" b="1">
+                        <a:rPr lang="en-US" sz="900" kern="1200" dirty="0">
+                          <a:solidFill>
+                            <a:schemeClr val="tx1"/>
+                          </a:solidFill>
                           <a:latin typeface="Hanken Grotesk" panose="020B0604020202020204" charset="0"/>
+                          <a:ea typeface="+mn-ea"/>
+                          <a:cs typeface="+mn-cs"/>
                         </a:rPr>
-                        <a:t>0.8312</a:t>
+                        <a:t>0.011</a:t>
                       </a:r>
-                      <a:endParaRPr lang="en-US" sz="900">
-                        <a:latin typeface="Hanken Grotesk" panose="020B0604020202020204" charset="0"/>
-                      </a:endParaRPr>
                     </a:p>
                   </a:txBody>
                   <a:tcPr marL="56005" marR="56005" marT="28002" marB="28002" anchor="ctr"/>
@@ -32659,10 +31032,159 @@
                     <a:bodyPr/>
                     <a:lstStyle/>
                     <a:p>
-                      <a:pPr algn="ctr"/>
+                      <a:pPr marL="0" algn="ctr" defTabSz="685800" rtl="0" eaLnBrk="1" latinLnBrk="0" hangingPunct="1"/>
                       <a:r>
-                        <a:rPr lang="en-US" sz="900">
+                        <a:rPr lang="en-US" sz="900" kern="1200" dirty="0">
+                          <a:solidFill>
+                            <a:schemeClr val="tx1"/>
+                          </a:solidFill>
                           <a:latin typeface="Hanken Grotesk" panose="020B0604020202020204" charset="0"/>
+                          <a:ea typeface="+mn-ea"/>
+                          <a:cs typeface="+mn-cs"/>
+                        </a:rPr>
+                        <a:t>DL</a:t>
+                      </a:r>
+                    </a:p>
+                  </a:txBody>
+                  <a:tcPr marL="56005" marR="56005" marT="28002" marB="28002" anchor="ctr"/>
+                </a:tc>
+                <a:extLst>
+                  <a:ext uri="{0D108BD9-81ED-4DB2-BD59-A6C34878D82A}">
+                    <a16:rowId xmlns:a16="http://schemas.microsoft.com/office/drawing/2014/main" val="3177952081"/>
+                  </a:ext>
+                </a:extLst>
+              </a:tr>
+              <a:tr h="262674">
+                <a:tc>
+                  <a:txBody>
+                    <a:bodyPr/>
+                    <a:lstStyle/>
+                    <a:p>
+                      <a:pPr marL="0" algn="ctr" defTabSz="685800" rtl="0" eaLnBrk="1" latinLnBrk="0" hangingPunct="1"/>
+                      <a:r>
+                        <a:rPr lang="en-US" sz="900" kern="1200" dirty="0">
+                          <a:solidFill>
+                            <a:schemeClr val="tx1"/>
+                          </a:solidFill>
+                          <a:latin typeface="Hanken Grotesk" panose="020B0604020202020204" charset="0"/>
+                          <a:ea typeface="+mn-ea"/>
+                          <a:cs typeface="+mn-cs"/>
+                        </a:rPr>
+                        <a:t>2</a:t>
+                      </a:r>
+                    </a:p>
+                  </a:txBody>
+                  <a:tcPr marL="56005" marR="56005" marT="28002" marB="28002" anchor="ctr"/>
+                </a:tc>
+                <a:tc>
+                  <a:txBody>
+                    <a:bodyPr/>
+                    <a:lstStyle/>
+                    <a:p>
+                      <a:pPr marL="0" algn="ctr" defTabSz="685800" rtl="0" eaLnBrk="1" latinLnBrk="0" hangingPunct="1"/>
+                      <a:r>
+                        <a:rPr lang="en-US" sz="900" kern="1200" dirty="0" err="1">
+                          <a:solidFill>
+                            <a:schemeClr val="tx1"/>
+                          </a:solidFill>
+                          <a:latin typeface="Hanken Grotesk" panose="020B0604020202020204" charset="0"/>
+                          <a:ea typeface="+mn-ea"/>
+                          <a:cs typeface="+mn-cs"/>
+                        </a:rPr>
+                        <a:t>XGBoost</a:t>
+                      </a:r>
+                      <a:r>
+                        <a:rPr lang="en-US" sz="900" kern="1200" dirty="0">
+                          <a:solidFill>
+                            <a:schemeClr val="tx1"/>
+                          </a:solidFill>
+                          <a:latin typeface="Hanken Grotesk" panose="020B0604020202020204" charset="0"/>
+                          <a:ea typeface="+mn-ea"/>
+                          <a:cs typeface="+mn-cs"/>
+                        </a:rPr>
+                        <a:t> (Tuned)</a:t>
+                      </a:r>
+                    </a:p>
+                  </a:txBody>
+                  <a:tcPr marL="56005" marR="56005" marT="28002" marB="28002" anchor="ctr"/>
+                </a:tc>
+                <a:tc>
+                  <a:txBody>
+                    <a:bodyPr/>
+                    <a:lstStyle/>
+                    <a:p>
+                      <a:pPr marL="0" algn="ctr" defTabSz="685800" rtl="0" eaLnBrk="1" latinLnBrk="0" hangingPunct="1"/>
+                      <a:r>
+                        <a:rPr lang="en-US" sz="900" kern="1200">
+                          <a:solidFill>
+                            <a:schemeClr val="tx1"/>
+                          </a:solidFill>
+                          <a:latin typeface="Hanken Grotesk" panose="020B0604020202020204" charset="0"/>
+                          <a:ea typeface="+mn-ea"/>
+                          <a:cs typeface="+mn-cs"/>
+                        </a:rPr>
+                        <a:t>0.257</a:t>
+                      </a:r>
+                    </a:p>
+                  </a:txBody>
+                  <a:tcPr marL="56005" marR="56005" marT="28002" marB="28002" anchor="ctr"/>
+                </a:tc>
+                <a:tc>
+                  <a:txBody>
+                    <a:bodyPr/>
+                    <a:lstStyle/>
+                    <a:p>
+                      <a:pPr marL="0" algn="ctr" defTabSz="685800" rtl="0" eaLnBrk="1" latinLnBrk="0" hangingPunct="1"/>
+                      <a:r>
+                        <a:rPr lang="en-US" sz="900" kern="1200">
+                          <a:solidFill>
+                            <a:schemeClr val="tx1"/>
+                          </a:solidFill>
+                          <a:latin typeface="Hanken Grotesk" panose="020B0604020202020204" charset="0"/>
+                          <a:ea typeface="+mn-ea"/>
+                          <a:cs typeface="+mn-cs"/>
+                        </a:rPr>
+                        <a:t>0.384</a:t>
+                      </a:r>
+                    </a:p>
+                  </a:txBody>
+                  <a:tcPr marL="56005" marR="56005" marT="28002" marB="28002" anchor="ctr"/>
+                </a:tc>
+                <a:tc>
+                  <a:txBody>
+                    <a:bodyPr/>
+                    <a:lstStyle/>
+                    <a:p>
+                      <a:pPr marL="0" algn="ctr" defTabSz="685800" rtl="0" eaLnBrk="1" latinLnBrk="0" hangingPunct="1"/>
+                      <a:r>
+                        <a:rPr lang="en-US" sz="900" kern="1200">
+                          <a:solidFill>
+                            <a:schemeClr val="tx1"/>
+                          </a:solidFill>
+                          <a:latin typeface="Hanken Grotesk" panose="020B0604020202020204" charset="0"/>
+                          <a:ea typeface="+mn-ea"/>
+                          <a:cs typeface="+mn-cs"/>
+                        </a:rPr>
+                        <a:t>0.8312</a:t>
+                      </a:r>
+                    </a:p>
+                  </a:txBody>
+                  <a:tcPr marL="56005" marR="56005" marT="28002" marB="28002" anchor="ctr"/>
+                </a:tc>
+                <a:tc>
+                  <a:txBody>
+                    <a:bodyPr/>
+                    <a:lstStyle/>
+                    <a:p>
+                      <a:pPr marL="0" algn="ctr" defTabSz="685800" rtl="0" eaLnBrk="1" latinLnBrk="0" hangingPunct="1"/>
+                      <a:r>
+                        <a:rPr lang="en-US" sz="900" kern="1200">
+                          <a:solidFill>
+                            <a:schemeClr val="tx1"/>
+                          </a:solidFill>
+                          <a:latin typeface="Hanken Grotesk" panose="020B0604020202020204" charset="0"/>
+                          <a:ea typeface="+mn-ea"/>
+                          <a:cs typeface="+mn-cs"/>
                         </a:rPr>
                         <a:t>ML</a:t>
                       </a:r>
@@ -32682,16 +31204,18 @@
                     <a:bodyPr/>
                     <a:lstStyle/>
                     <a:p>
-                      <a:pPr algn="ctr"/>
+                      <a:pPr marL="0" algn="ctr" defTabSz="685800" rtl="0" eaLnBrk="1" latinLnBrk="0" hangingPunct="1"/>
                       <a:r>
-                        <a:rPr lang="en-US" sz="900" b="1">
+                        <a:rPr lang="en-US" sz="900" kern="1200" dirty="0">
+                          <a:solidFill>
+                            <a:schemeClr val="tx1"/>
+                          </a:solidFill>
                           <a:latin typeface="Hanken Grotesk" panose="020B0604020202020204" charset="0"/>
+                          <a:ea typeface="+mn-ea"/>
+                          <a:cs typeface="+mn-cs"/>
                         </a:rPr>
-                        <a:t>2</a:t>
+                        <a:t>3</a:t>
                       </a:r>
-                      <a:endParaRPr lang="en-US" sz="900">
-                        <a:latin typeface="Hanken Grotesk" panose="020B0604020202020204" charset="0"/>
-                      </a:endParaRPr>
                     </a:p>
                   </a:txBody>
                   <a:tcPr marL="56005" marR="56005" marT="28002" marB="28002" anchor="ctr"/>
@@ -32701,16 +31225,18 @@
                     <a:bodyPr/>
                     <a:lstStyle/>
                     <a:p>
-                      <a:pPr algn="ctr"/>
+                      <a:pPr marL="0" algn="ctr" defTabSz="685800" rtl="0" eaLnBrk="1" latinLnBrk="0" hangingPunct="1"/>
                       <a:r>
-                        <a:rPr lang="en-US" sz="900" b="1">
+                        <a:rPr lang="en-US" sz="900" kern="1200" dirty="0">
+                          <a:solidFill>
+                            <a:schemeClr val="tx1"/>
+                          </a:solidFill>
                           <a:latin typeface="Hanken Grotesk" panose="020B0604020202020204" charset="0"/>
+                          <a:ea typeface="+mn-ea"/>
+                          <a:cs typeface="+mn-cs"/>
                         </a:rPr>
                         <a:t>Random Forest (Tuned)</a:t>
                       </a:r>
-                      <a:endParaRPr lang="en-US" sz="900">
-                        <a:latin typeface="Hanken Grotesk" panose="020B0604020202020204" charset="0"/>
-                      </a:endParaRPr>
                     </a:p>
                   </a:txBody>
                   <a:tcPr marL="56005" marR="56005" marT="28002" marB="28002" anchor="ctr"/>
@@ -32720,10 +31246,15 @@
                     <a:bodyPr/>
                     <a:lstStyle/>
                     <a:p>
-                      <a:pPr algn="ctr"/>
+                      <a:pPr marL="0" algn="ctr" defTabSz="685800" rtl="0" eaLnBrk="1" latinLnBrk="0" hangingPunct="1"/>
                       <a:r>
-                        <a:rPr lang="en-US" sz="900" dirty="0">
+                        <a:rPr lang="en-US" sz="900" kern="1200" dirty="0">
+                          <a:solidFill>
+                            <a:schemeClr val="tx1"/>
+                          </a:solidFill>
                           <a:latin typeface="Hanken Grotesk" panose="020B0604020202020204" charset="0"/>
+                          <a:ea typeface="+mn-ea"/>
+                          <a:cs typeface="+mn-cs"/>
                         </a:rPr>
                         <a:t>0.293</a:t>
                       </a:r>
@@ -32736,10 +31267,15 @@
                     <a:bodyPr/>
                     <a:lstStyle/>
                     <a:p>
-                      <a:pPr algn="ctr"/>
+                      <a:pPr marL="0" algn="ctr" defTabSz="685800" rtl="0" eaLnBrk="1" latinLnBrk="0" hangingPunct="1"/>
                       <a:r>
-                        <a:rPr lang="en-US" sz="900">
+                        <a:rPr lang="en-US" sz="900" kern="1200" dirty="0">
+                          <a:solidFill>
+                            <a:schemeClr val="tx1"/>
+                          </a:solidFill>
                           <a:latin typeface="Hanken Grotesk" panose="020B0604020202020204" charset="0"/>
+                          <a:ea typeface="+mn-ea"/>
+                          <a:cs typeface="+mn-cs"/>
                         </a:rPr>
                         <a:t>0.435</a:t>
                       </a:r>
@@ -32752,10 +31288,15 @@
                     <a:bodyPr/>
                     <a:lstStyle/>
                     <a:p>
-                      <a:pPr algn="ctr"/>
+                      <a:pPr marL="0" algn="ctr" defTabSz="685800" rtl="0" eaLnBrk="1" latinLnBrk="0" hangingPunct="1"/>
                       <a:r>
-                        <a:rPr lang="en-US" sz="900">
+                        <a:rPr lang="en-US" sz="900" kern="1200" dirty="0">
+                          <a:solidFill>
+                            <a:schemeClr val="tx1"/>
+                          </a:solidFill>
                           <a:latin typeface="Hanken Grotesk" panose="020B0604020202020204" charset="0"/>
+                          <a:ea typeface="+mn-ea"/>
+                          <a:cs typeface="+mn-cs"/>
                         </a:rPr>
                         <a:t>0.7831</a:t>
                       </a:r>
@@ -32768,10 +31309,15 @@
                     <a:bodyPr/>
                     <a:lstStyle/>
                     <a:p>
-                      <a:pPr algn="ctr"/>
+                      <a:pPr marL="0" algn="ctr" defTabSz="685800" rtl="0" eaLnBrk="1" latinLnBrk="0" hangingPunct="1"/>
                       <a:r>
-                        <a:rPr lang="en-US" sz="900">
+                        <a:rPr lang="en-US" sz="900" kern="1200" dirty="0">
+                          <a:solidFill>
+                            <a:schemeClr val="tx1"/>
+                          </a:solidFill>
                           <a:latin typeface="Hanken Grotesk" panose="020B0604020202020204" charset="0"/>
+                          <a:ea typeface="+mn-ea"/>
+                          <a:cs typeface="+mn-cs"/>
                         </a:rPr>
                         <a:t>ML</a:t>
                       </a:r>
@@ -32791,16 +31337,18 @@
                     <a:bodyPr/>
                     <a:lstStyle/>
                     <a:p>
-                      <a:pPr algn="ctr"/>
+                      <a:pPr marL="0" algn="ctr" defTabSz="685800" rtl="0" eaLnBrk="1" latinLnBrk="0" hangingPunct="1"/>
                       <a:r>
-                        <a:rPr lang="en-US" sz="900" b="1">
+                        <a:rPr lang="en-US" sz="900" kern="1200" dirty="0">
+                          <a:solidFill>
+                            <a:schemeClr val="tx1"/>
+                          </a:solidFill>
                           <a:latin typeface="Hanken Grotesk" panose="020B0604020202020204" charset="0"/>
+                          <a:ea typeface="+mn-ea"/>
+                          <a:cs typeface="+mn-cs"/>
                         </a:rPr>
-                        <a:t>3</a:t>
+                        <a:t>4</a:t>
                       </a:r>
-                      <a:endParaRPr lang="en-US" sz="900">
-                        <a:latin typeface="Hanken Grotesk" panose="020B0604020202020204" charset="0"/>
-                      </a:endParaRPr>
                     </a:p>
                   </a:txBody>
                   <a:tcPr marL="56005" marR="56005" marT="28002" marB="28002" anchor="ctr"/>
@@ -32810,10 +31358,15 @@
                     <a:bodyPr/>
                     <a:lstStyle/>
                     <a:p>
-                      <a:pPr algn="ctr"/>
+                      <a:pPr marL="0" algn="ctr" defTabSz="685800" rtl="0" eaLnBrk="1" latinLnBrk="0" hangingPunct="1"/>
                       <a:r>
-                        <a:rPr lang="en-US" sz="900">
+                        <a:rPr lang="en-US" sz="900" kern="1200" dirty="0">
+                          <a:solidFill>
+                            <a:schemeClr val="tx1"/>
+                          </a:solidFill>
                           <a:latin typeface="Hanken Grotesk" panose="020B0604020202020204" charset="0"/>
+                          <a:ea typeface="+mn-ea"/>
+                          <a:cs typeface="+mn-cs"/>
                         </a:rPr>
                         <a:t>Random Forest</a:t>
                       </a:r>
@@ -32826,10 +31379,15 @@
                     <a:bodyPr/>
                     <a:lstStyle/>
                     <a:p>
-                      <a:pPr algn="ctr"/>
+                      <a:pPr marL="0" algn="ctr" defTabSz="685800" rtl="0" eaLnBrk="1" latinLnBrk="0" hangingPunct="1"/>
                       <a:r>
-                        <a:rPr lang="en-US" sz="900">
+                        <a:rPr lang="en-US" sz="900" kern="1200" dirty="0">
+                          <a:solidFill>
+                            <a:schemeClr val="tx1"/>
+                          </a:solidFill>
                           <a:latin typeface="Hanken Grotesk" panose="020B0604020202020204" charset="0"/>
+                          <a:ea typeface="+mn-ea"/>
+                          <a:cs typeface="+mn-cs"/>
                         </a:rPr>
                         <a:t>0.305</a:t>
                       </a:r>
@@ -32842,10 +31400,15 @@
                     <a:bodyPr/>
                     <a:lstStyle/>
                     <a:p>
-                      <a:pPr algn="ctr"/>
+                      <a:pPr marL="0" algn="ctr" defTabSz="685800" rtl="0" eaLnBrk="1" latinLnBrk="0" hangingPunct="1"/>
                       <a:r>
-                        <a:rPr lang="en-US" sz="900">
+                        <a:rPr lang="en-US" sz="900" kern="1200">
+                          <a:solidFill>
+                            <a:schemeClr val="tx1"/>
+                          </a:solidFill>
                           <a:latin typeface="Hanken Grotesk" panose="020B0604020202020204" charset="0"/>
+                          <a:ea typeface="+mn-ea"/>
+                          <a:cs typeface="+mn-cs"/>
                         </a:rPr>
                         <a:t>0.444</a:t>
                       </a:r>
@@ -32858,10 +31421,15 @@
                     <a:bodyPr/>
                     <a:lstStyle/>
                     <a:p>
-                      <a:pPr algn="ctr"/>
+                      <a:pPr marL="0" algn="ctr" defTabSz="685800" rtl="0" eaLnBrk="1" latinLnBrk="0" hangingPunct="1"/>
                       <a:r>
-                        <a:rPr lang="en-US" sz="900">
+                        <a:rPr lang="en-US" sz="900" kern="1200">
+                          <a:solidFill>
+                            <a:schemeClr val="tx1"/>
+                          </a:solidFill>
                           <a:latin typeface="Hanken Grotesk" panose="020B0604020202020204" charset="0"/>
+                          <a:ea typeface="+mn-ea"/>
+                          <a:cs typeface="+mn-cs"/>
                         </a:rPr>
                         <a:t>0.7739</a:t>
                       </a:r>
@@ -32874,10 +31442,15 @@
                     <a:bodyPr/>
                     <a:lstStyle/>
                     <a:p>
-                      <a:pPr algn="ctr"/>
+                      <a:pPr marL="0" algn="ctr" defTabSz="685800" rtl="0" eaLnBrk="1" latinLnBrk="0" hangingPunct="1"/>
                       <a:r>
-                        <a:rPr lang="en-US" sz="900">
+                        <a:rPr lang="en-US" sz="900" kern="1200">
+                          <a:solidFill>
+                            <a:schemeClr val="tx1"/>
+                          </a:solidFill>
                           <a:latin typeface="Hanken Grotesk" panose="020B0604020202020204" charset="0"/>
+                          <a:ea typeface="+mn-ea"/>
+                          <a:cs typeface="+mn-cs"/>
                         </a:rPr>
                         <a:t>ML</a:t>
                       </a:r>
@@ -32897,15 +31470,46 @@
                     <a:bodyPr/>
                     <a:lstStyle/>
                     <a:p>
-                      <a:pPr algn="ctr"/>
+                      <a:pPr marL="0" algn="ctr" defTabSz="685800" rtl="0" eaLnBrk="1" latinLnBrk="0" hangingPunct="1"/>
                       <a:r>
-                        <a:rPr lang="en-US" sz="900" b="1">
+                        <a:rPr lang="en-US" sz="900" kern="1200" dirty="0">
+                          <a:solidFill>
+                            <a:schemeClr val="tx1"/>
+                          </a:solidFill>
                           <a:latin typeface="Hanken Grotesk" panose="020B0604020202020204" charset="0"/>
+                          <a:ea typeface="+mn-ea"/>
+                          <a:cs typeface="+mn-cs"/>
                         </a:rPr>
-                        <a:t>4</a:t>
+                        <a:t>5</a:t>
                       </a:r>
-                      <a:endParaRPr lang="en-US" sz="900">
+                    </a:p>
+                  </a:txBody>
+                  <a:tcPr marL="56005" marR="56005" marT="28002" marB="28002" anchor="ctr"/>
+                </a:tc>
+                <a:tc>
+                  <a:txBody>
+                    <a:bodyPr/>
+                    <a:lstStyle/>
+                    <a:p>
+                      <a:pPr marL="0" algn="ctr" defTabSz="685800" rtl="0" eaLnBrk="1" latinLnBrk="0" hangingPunct="1"/>
+                      <a:r>
+                        <a:rPr lang="en-US" sz="900" kern="1200" dirty="0" err="1">
+                          <a:solidFill>
+                            <a:schemeClr val="tx1"/>
+                          </a:solidFill>
+                          <a:latin typeface="Hanken Grotesk" panose="020B0604020202020204" charset="0"/>
+                          <a:ea typeface="+mn-ea"/>
+                          <a:cs typeface="+mn-cs"/>
+                        </a:rPr>
+                        <a:t>XGBoost</a:t>
+                      </a:r>
+                      <a:endParaRPr lang="en-US" sz="900" kern="1200" dirty="0">
+                        <a:solidFill>
+                          <a:schemeClr val="tx1"/>
+                        </a:solidFill>
                         <a:latin typeface="Hanken Grotesk" panose="020B0604020202020204" charset="0"/>
+                        <a:ea typeface="+mn-ea"/>
+                        <a:cs typeface="+mn-cs"/>
                       </a:endParaRPr>
                     </a:p>
                   </a:txBody>
@@ -32916,26 +31520,15 @@
                     <a:bodyPr/>
                     <a:lstStyle/>
                     <a:p>
-                      <a:pPr algn="ctr"/>
+                      <a:pPr marL="0" algn="ctr" defTabSz="685800" rtl="0" eaLnBrk="1" latinLnBrk="0" hangingPunct="1"/>
                       <a:r>
-                        <a:rPr lang="en-US" sz="900">
+                        <a:rPr lang="en-US" sz="900" kern="1200">
+                          <a:solidFill>
+                            <a:schemeClr val="tx1"/>
+                          </a:solidFill>
                           <a:latin typeface="Hanken Grotesk" panose="020B0604020202020204" charset="0"/>
-                        </a:rPr>
-                        <a:t>XGBoost</a:t>
-                      </a:r>
-                    </a:p>
-                  </a:txBody>
-                  <a:tcPr marL="56005" marR="56005" marT="28002" marB="28002" anchor="ctr"/>
-                </a:tc>
-                <a:tc>
-                  <a:txBody>
-                    <a:bodyPr/>
-                    <a:lstStyle/>
-                    <a:p>
-                      <a:pPr algn="ctr"/>
-                      <a:r>
-                        <a:rPr lang="en-US" sz="900">
-                          <a:latin typeface="Hanken Grotesk" panose="020B0604020202020204" charset="0"/>
+                          <a:ea typeface="+mn-ea"/>
+                          <a:cs typeface="+mn-cs"/>
                         </a:rPr>
                         <a:t>0.313</a:t>
                       </a:r>
@@ -32948,10 +31541,15 @@
                     <a:bodyPr/>
                     <a:lstStyle/>
                     <a:p>
-                      <a:pPr algn="ctr"/>
+                      <a:pPr marL="0" algn="ctr" defTabSz="685800" rtl="0" eaLnBrk="1" latinLnBrk="0" hangingPunct="1"/>
                       <a:r>
-                        <a:rPr lang="en-US" sz="900">
+                        <a:rPr lang="en-US" sz="900" kern="1200">
+                          <a:solidFill>
+                            <a:schemeClr val="tx1"/>
+                          </a:solidFill>
                           <a:latin typeface="Hanken Grotesk" panose="020B0604020202020204" charset="0"/>
+                          <a:ea typeface="+mn-ea"/>
+                          <a:cs typeface="+mn-cs"/>
                         </a:rPr>
                         <a:t>0.448</a:t>
                       </a:r>
@@ -32964,10 +31562,15 @@
                     <a:bodyPr/>
                     <a:lstStyle/>
                     <a:p>
-                      <a:pPr algn="ctr"/>
+                      <a:pPr marL="0" algn="ctr" defTabSz="685800" rtl="0" eaLnBrk="1" latinLnBrk="0" hangingPunct="1"/>
                       <a:r>
-                        <a:rPr lang="en-US" sz="900">
+                        <a:rPr lang="en-US" sz="900" kern="1200">
+                          <a:solidFill>
+                            <a:schemeClr val="tx1"/>
+                          </a:solidFill>
                           <a:latin typeface="Hanken Grotesk" panose="020B0604020202020204" charset="0"/>
+                          <a:ea typeface="+mn-ea"/>
+                          <a:cs typeface="+mn-cs"/>
                         </a:rPr>
                         <a:t>0.7693</a:t>
                       </a:r>
@@ -32980,10 +31583,15 @@
                     <a:bodyPr/>
                     <a:lstStyle/>
                     <a:p>
-                      <a:pPr algn="ctr"/>
+                      <a:pPr marL="0" algn="ctr" defTabSz="685800" rtl="0" eaLnBrk="1" latinLnBrk="0" hangingPunct="1"/>
                       <a:r>
-                        <a:rPr lang="en-US" sz="900">
+                        <a:rPr lang="en-US" sz="900" kern="1200">
+                          <a:solidFill>
+                            <a:schemeClr val="tx1"/>
+                          </a:solidFill>
                           <a:latin typeface="Hanken Grotesk" panose="020B0604020202020204" charset="0"/>
+                          <a:ea typeface="+mn-ea"/>
+                          <a:cs typeface="+mn-cs"/>
                         </a:rPr>
                         <a:t>ML</a:t>
                       </a:r>
@@ -33003,16 +31611,18 @@
                     <a:bodyPr/>
                     <a:lstStyle/>
                     <a:p>
-                      <a:pPr algn="ctr"/>
+                      <a:pPr marL="0" algn="ctr" defTabSz="685800" rtl="0" eaLnBrk="1" latinLnBrk="0" hangingPunct="1"/>
                       <a:r>
-                        <a:rPr lang="en-US" sz="900" b="1">
+                        <a:rPr lang="en-US" sz="900" kern="1200" dirty="0">
+                          <a:solidFill>
+                            <a:schemeClr val="tx1"/>
+                          </a:solidFill>
                           <a:latin typeface="Hanken Grotesk" panose="020B0604020202020204" charset="0"/>
+                          <a:ea typeface="+mn-ea"/>
+                          <a:cs typeface="+mn-cs"/>
                         </a:rPr>
-                        <a:t>5</a:t>
+                        <a:t>6</a:t>
                       </a:r>
-                      <a:endParaRPr lang="en-US" sz="900">
-                        <a:latin typeface="Hanken Grotesk" panose="020B0604020202020204" charset="0"/>
-                      </a:endParaRPr>
                     </a:p>
                   </a:txBody>
                   <a:tcPr marL="56005" marR="56005" marT="28002" marB="28002" anchor="ctr"/>
@@ -33022,10 +31632,15 @@
                     <a:bodyPr/>
                     <a:lstStyle/>
                     <a:p>
-                      <a:pPr algn="ctr"/>
+                      <a:pPr marL="0" algn="ctr" defTabSz="685800" rtl="0" eaLnBrk="1" latinLnBrk="0" hangingPunct="1"/>
                       <a:r>
-                        <a:rPr lang="en-US" sz="900" dirty="0">
+                        <a:rPr lang="en-US" sz="900" kern="1200" dirty="0">
+                          <a:solidFill>
+                            <a:schemeClr val="tx1"/>
+                          </a:solidFill>
                           <a:latin typeface="Hanken Grotesk" panose="020B0604020202020204" charset="0"/>
+                          <a:ea typeface="+mn-ea"/>
+                          <a:cs typeface="+mn-cs"/>
                         </a:rPr>
                         <a:t>Gradient Boosting</a:t>
                       </a:r>
@@ -33038,10 +31653,15 @@
                     <a:bodyPr/>
                     <a:lstStyle/>
                     <a:p>
-                      <a:pPr algn="ctr"/>
+                      <a:pPr marL="0" algn="ctr" defTabSz="685800" rtl="0" eaLnBrk="1" latinLnBrk="0" hangingPunct="1"/>
                       <a:r>
-                        <a:rPr lang="en-US" sz="900">
+                        <a:rPr lang="en-US" sz="900" kern="1200">
+                          <a:solidFill>
+                            <a:schemeClr val="tx1"/>
+                          </a:solidFill>
                           <a:latin typeface="Hanken Grotesk" panose="020B0604020202020204" charset="0"/>
+                          <a:ea typeface="+mn-ea"/>
+                          <a:cs typeface="+mn-cs"/>
                         </a:rPr>
                         <a:t>0.330</a:t>
                       </a:r>
@@ -33054,10 +31674,15 @@
                     <a:bodyPr/>
                     <a:lstStyle/>
                     <a:p>
-                      <a:pPr algn="ctr"/>
+                      <a:pPr marL="0" algn="ctr" defTabSz="685800" rtl="0" eaLnBrk="1" latinLnBrk="0" hangingPunct="1"/>
                       <a:r>
-                        <a:rPr lang="en-US" sz="900">
+                        <a:rPr lang="en-US" sz="900" kern="1200" dirty="0">
+                          <a:solidFill>
+                            <a:schemeClr val="tx1"/>
+                          </a:solidFill>
                           <a:latin typeface="Hanken Grotesk" panose="020B0604020202020204" charset="0"/>
+                          <a:ea typeface="+mn-ea"/>
+                          <a:cs typeface="+mn-cs"/>
                         </a:rPr>
                         <a:t>0.468</a:t>
                       </a:r>
@@ -33070,10 +31695,15 @@
                     <a:bodyPr/>
                     <a:lstStyle/>
                     <a:p>
-                      <a:pPr algn="ctr"/>
+                      <a:pPr marL="0" algn="ctr" defTabSz="685800" rtl="0" eaLnBrk="1" latinLnBrk="0" hangingPunct="1"/>
                       <a:r>
-                        <a:rPr lang="en-US" sz="900">
+                        <a:rPr lang="en-US" sz="900" kern="1200">
+                          <a:solidFill>
+                            <a:schemeClr val="tx1"/>
+                          </a:solidFill>
                           <a:latin typeface="Hanken Grotesk" panose="020B0604020202020204" charset="0"/>
+                          <a:ea typeface="+mn-ea"/>
+                          <a:cs typeface="+mn-cs"/>
                         </a:rPr>
                         <a:t>0.7486</a:t>
                       </a:r>
@@ -33086,10 +31716,15 @@
                     <a:bodyPr/>
                     <a:lstStyle/>
                     <a:p>
-                      <a:pPr algn="ctr"/>
+                      <a:pPr marL="0" algn="ctr" defTabSz="685800" rtl="0" eaLnBrk="1" latinLnBrk="0" hangingPunct="1"/>
                       <a:r>
-                        <a:rPr lang="en-US" sz="900">
+                        <a:rPr lang="en-US" sz="900" kern="1200">
+                          <a:solidFill>
+                            <a:schemeClr val="tx1"/>
+                          </a:solidFill>
                           <a:latin typeface="Hanken Grotesk" panose="020B0604020202020204" charset="0"/>
+                          <a:ea typeface="+mn-ea"/>
+                          <a:cs typeface="+mn-cs"/>
                         </a:rPr>
                         <a:t>ML</a:t>
                       </a:r>
@@ -33109,16 +31744,18 @@
                     <a:bodyPr/>
                     <a:lstStyle/>
                     <a:p>
-                      <a:pPr algn="ctr"/>
+                      <a:pPr marL="0" algn="ctr" defTabSz="685800" rtl="0" eaLnBrk="1" latinLnBrk="0" hangingPunct="1"/>
                       <a:r>
-                        <a:rPr lang="en-US" sz="900" b="1">
+                        <a:rPr lang="en-US" sz="900" kern="1200" dirty="0">
+                          <a:solidFill>
+                            <a:schemeClr val="tx1"/>
+                          </a:solidFill>
                           <a:latin typeface="Hanken Grotesk" panose="020B0604020202020204" charset="0"/>
+                          <a:ea typeface="+mn-ea"/>
+                          <a:cs typeface="+mn-cs"/>
                         </a:rPr>
-                        <a:t>6</a:t>
+                        <a:t>7</a:t>
                       </a:r>
-                      <a:endParaRPr lang="en-US" sz="900">
-                        <a:latin typeface="Hanken Grotesk" panose="020B0604020202020204" charset="0"/>
-                      </a:endParaRPr>
                     </a:p>
                   </a:txBody>
                   <a:tcPr marL="56005" marR="56005" marT="28002" marB="28002" anchor="ctr"/>
@@ -33128,10 +31765,15 @@
                     <a:bodyPr/>
                     <a:lstStyle/>
                     <a:p>
-                      <a:pPr algn="ctr"/>
+                      <a:pPr marL="0" algn="ctr" defTabSz="685800" rtl="0" eaLnBrk="1" latinLnBrk="0" hangingPunct="1"/>
                       <a:r>
-                        <a:rPr lang="en-US" sz="900" dirty="0">
+                        <a:rPr lang="en-US" sz="900" kern="1200" dirty="0">
+                          <a:solidFill>
+                            <a:schemeClr val="tx1"/>
+                          </a:solidFill>
                           <a:latin typeface="Hanken Grotesk" panose="020B0604020202020204" charset="0"/>
+                          <a:ea typeface="+mn-ea"/>
+                          <a:cs typeface="+mn-cs"/>
                         </a:rPr>
                         <a:t>SVR</a:t>
                       </a:r>
@@ -33144,10 +31786,15 @@
                     <a:bodyPr/>
                     <a:lstStyle/>
                     <a:p>
-                      <a:pPr algn="ctr"/>
+                      <a:pPr marL="0" algn="ctr" defTabSz="685800" rtl="0" eaLnBrk="1" latinLnBrk="0" hangingPunct="1"/>
                       <a:r>
-                        <a:rPr lang="en-US" sz="900">
+                        <a:rPr lang="en-US" sz="900" kern="1200" dirty="0">
+                          <a:solidFill>
+                            <a:schemeClr val="tx1"/>
+                          </a:solidFill>
                           <a:latin typeface="Hanken Grotesk" panose="020B0604020202020204" charset="0"/>
+                          <a:ea typeface="+mn-ea"/>
+                          <a:cs typeface="+mn-cs"/>
                         </a:rPr>
                         <a:t>0.318</a:t>
                       </a:r>
@@ -33160,10 +31807,15 @@
                     <a:bodyPr/>
                     <a:lstStyle/>
                     <a:p>
-                      <a:pPr algn="ctr"/>
+                      <a:pPr marL="0" algn="ctr" defTabSz="685800" rtl="0" eaLnBrk="1" latinLnBrk="0" hangingPunct="1"/>
                       <a:r>
-                        <a:rPr lang="en-US" sz="900">
+                        <a:rPr lang="en-US" sz="900" kern="1200" dirty="0">
+                          <a:solidFill>
+                            <a:schemeClr val="tx1"/>
+                          </a:solidFill>
                           <a:latin typeface="Hanken Grotesk" panose="020B0604020202020204" charset="0"/>
+                          <a:ea typeface="+mn-ea"/>
+                          <a:cs typeface="+mn-cs"/>
                         </a:rPr>
                         <a:t>0.483</a:t>
                       </a:r>
@@ -33176,10 +31828,15 @@
                     <a:bodyPr/>
                     <a:lstStyle/>
                     <a:p>
-                      <a:pPr algn="ctr"/>
+                      <a:pPr marL="0" algn="ctr" defTabSz="685800" rtl="0" eaLnBrk="1" latinLnBrk="0" hangingPunct="1"/>
                       <a:r>
-                        <a:rPr lang="en-US" sz="900">
+                        <a:rPr lang="en-US" sz="900" kern="1200">
+                          <a:solidFill>
+                            <a:schemeClr val="tx1"/>
+                          </a:solidFill>
                           <a:latin typeface="Hanken Grotesk" panose="020B0604020202020204" charset="0"/>
+                          <a:ea typeface="+mn-ea"/>
+                          <a:cs typeface="+mn-cs"/>
                         </a:rPr>
                         <a:t>0.7324</a:t>
                       </a:r>
@@ -33192,10 +31849,15 @@
                     <a:bodyPr/>
                     <a:lstStyle/>
                     <a:p>
-                      <a:pPr algn="ctr"/>
+                      <a:pPr marL="0" algn="ctr" defTabSz="685800" rtl="0" eaLnBrk="1" latinLnBrk="0" hangingPunct="1"/>
                       <a:r>
-                        <a:rPr lang="en-US" sz="900">
+                        <a:rPr lang="en-US" sz="900" kern="1200">
+                          <a:solidFill>
+                            <a:schemeClr val="tx1"/>
+                          </a:solidFill>
                           <a:latin typeface="Hanken Grotesk" panose="020B0604020202020204" charset="0"/>
+                          <a:ea typeface="+mn-ea"/>
+                          <a:cs typeface="+mn-cs"/>
                         </a:rPr>
                         <a:t>ML</a:t>
                       </a:r>
@@ -33215,16 +31877,18 @@
                     <a:bodyPr/>
                     <a:lstStyle/>
                     <a:p>
-                      <a:pPr algn="ctr"/>
+                      <a:pPr marL="0" algn="ctr" defTabSz="685800" rtl="0" eaLnBrk="1" latinLnBrk="0" hangingPunct="1"/>
                       <a:r>
-                        <a:rPr lang="en-US" sz="900" b="1">
+                        <a:rPr lang="en-US" sz="900" kern="1200" dirty="0">
+                          <a:solidFill>
+                            <a:schemeClr val="tx1"/>
+                          </a:solidFill>
                           <a:latin typeface="Hanken Grotesk" panose="020B0604020202020204" charset="0"/>
+                          <a:ea typeface="+mn-ea"/>
+                          <a:cs typeface="+mn-cs"/>
                         </a:rPr>
-                        <a:t>7</a:t>
+                        <a:t>8</a:t>
                       </a:r>
-                      <a:endParaRPr lang="en-US" sz="900">
-                        <a:latin typeface="Hanken Grotesk" panose="020B0604020202020204" charset="0"/>
-                      </a:endParaRPr>
                     </a:p>
                   </a:txBody>
                   <a:tcPr marL="56005" marR="56005" marT="28002" marB="28002" anchor="ctr"/>
@@ -33234,10 +31898,15 @@
                     <a:bodyPr/>
                     <a:lstStyle/>
                     <a:p>
-                      <a:pPr algn="ctr"/>
+                      <a:pPr marL="0" algn="ctr" defTabSz="685800" rtl="0" eaLnBrk="1" latinLnBrk="0" hangingPunct="1"/>
                       <a:r>
-                        <a:rPr lang="en-US" sz="900" dirty="0">
+                        <a:rPr lang="en-US" sz="900" kern="1200" dirty="0">
+                          <a:solidFill>
+                            <a:schemeClr val="tx1"/>
+                          </a:solidFill>
                           <a:latin typeface="Hanken Grotesk" panose="020B0604020202020204" charset="0"/>
+                          <a:ea typeface="+mn-ea"/>
+                          <a:cs typeface="+mn-cs"/>
                         </a:rPr>
                         <a:t>Ridge Regression</a:t>
                       </a:r>
@@ -33250,10 +31919,15 @@
                     <a:bodyPr/>
                     <a:lstStyle/>
                     <a:p>
-                      <a:pPr algn="ctr"/>
+                      <a:pPr marL="0" algn="ctr" defTabSz="685800" rtl="0" eaLnBrk="1" latinLnBrk="0" hangingPunct="1"/>
                       <a:r>
-                        <a:rPr lang="en-US" sz="900">
+                        <a:rPr lang="en-US" sz="900" kern="1200">
+                          <a:solidFill>
+                            <a:schemeClr val="tx1"/>
+                          </a:solidFill>
                           <a:latin typeface="Hanken Grotesk" panose="020B0604020202020204" charset="0"/>
+                          <a:ea typeface="+mn-ea"/>
+                          <a:cs typeface="+mn-cs"/>
                         </a:rPr>
                         <a:t>0.502</a:t>
                       </a:r>
@@ -33266,10 +31940,15 @@
                     <a:bodyPr/>
                     <a:lstStyle/>
                     <a:p>
-                      <a:pPr algn="ctr"/>
+                      <a:pPr marL="0" algn="ctr" defTabSz="685800" rtl="0" eaLnBrk="1" latinLnBrk="0" hangingPunct="1"/>
                       <a:r>
-                        <a:rPr lang="en-US" sz="900">
+                        <a:rPr lang="en-US" sz="900" kern="1200" dirty="0">
+                          <a:solidFill>
+                            <a:schemeClr val="tx1"/>
+                          </a:solidFill>
                           <a:latin typeface="Hanken Grotesk" panose="020B0604020202020204" charset="0"/>
+                          <a:ea typeface="+mn-ea"/>
+                          <a:cs typeface="+mn-cs"/>
                         </a:rPr>
                         <a:t>0.648</a:t>
                       </a:r>
@@ -33282,10 +31961,15 @@
                     <a:bodyPr/>
                     <a:lstStyle/>
                     <a:p>
-                      <a:pPr algn="ctr"/>
+                      <a:pPr marL="0" algn="ctr" defTabSz="685800" rtl="0" eaLnBrk="1" latinLnBrk="0" hangingPunct="1"/>
                       <a:r>
-                        <a:rPr lang="en-US" sz="900" dirty="0">
+                        <a:rPr lang="en-US" sz="900" kern="1200" dirty="0">
+                          <a:solidFill>
+                            <a:schemeClr val="tx1"/>
+                          </a:solidFill>
                           <a:latin typeface="Hanken Grotesk" panose="020B0604020202020204" charset="0"/>
+                          <a:ea typeface="+mn-ea"/>
+                          <a:cs typeface="+mn-cs"/>
                         </a:rPr>
                         <a:t>0.5182</a:t>
                       </a:r>
@@ -33298,10 +31982,15 @@
                     <a:bodyPr/>
                     <a:lstStyle/>
                     <a:p>
-                      <a:pPr algn="ctr"/>
+                      <a:pPr marL="0" algn="ctr" defTabSz="685800" rtl="0" eaLnBrk="1" latinLnBrk="0" hangingPunct="1"/>
                       <a:r>
-                        <a:rPr lang="en-US" sz="900">
+                        <a:rPr lang="en-US" sz="900" kern="1200">
+                          <a:solidFill>
+                            <a:schemeClr val="tx1"/>
+                          </a:solidFill>
                           <a:latin typeface="Hanken Grotesk" panose="020B0604020202020204" charset="0"/>
+                          <a:ea typeface="+mn-ea"/>
+                          <a:cs typeface="+mn-cs"/>
                         </a:rPr>
                         <a:t>ML</a:t>
                       </a:r>
@@ -33321,16 +32010,18 @@
                     <a:bodyPr/>
                     <a:lstStyle/>
                     <a:p>
-                      <a:pPr algn="ctr"/>
+                      <a:pPr marL="0" algn="ctr" defTabSz="685800" rtl="0" eaLnBrk="1" latinLnBrk="0" hangingPunct="1"/>
                       <a:r>
-                        <a:rPr lang="en-US" sz="900" b="1">
+                        <a:rPr lang="en-US" sz="900" kern="1200" dirty="0">
+                          <a:solidFill>
+                            <a:schemeClr val="tx1"/>
+                          </a:solidFill>
                           <a:latin typeface="Hanken Grotesk" panose="020B0604020202020204" charset="0"/>
+                          <a:ea typeface="+mn-ea"/>
+                          <a:cs typeface="+mn-cs"/>
                         </a:rPr>
-                        <a:t>8</a:t>
+                        <a:t>9</a:t>
                       </a:r>
-                      <a:endParaRPr lang="en-US" sz="900">
-                        <a:latin typeface="Hanken Grotesk" panose="020B0604020202020204" charset="0"/>
-                      </a:endParaRPr>
                     </a:p>
                   </a:txBody>
                   <a:tcPr marL="56005" marR="56005" marT="28002" marB="28002" anchor="ctr"/>
@@ -33340,10 +32031,15 @@
                     <a:bodyPr/>
                     <a:lstStyle/>
                     <a:p>
-                      <a:pPr algn="ctr"/>
+                      <a:pPr marL="0" algn="ctr" defTabSz="685800" rtl="0" eaLnBrk="1" latinLnBrk="0" hangingPunct="1"/>
                       <a:r>
-                        <a:rPr lang="en-US" sz="900">
+                        <a:rPr lang="en-US" sz="900" kern="1200">
+                          <a:solidFill>
+                            <a:schemeClr val="tx1"/>
+                          </a:solidFill>
                           <a:latin typeface="Hanken Grotesk" panose="020B0604020202020204" charset="0"/>
+                          <a:ea typeface="+mn-ea"/>
+                          <a:cs typeface="+mn-cs"/>
                         </a:rPr>
                         <a:t>Linear Regression</a:t>
                       </a:r>
@@ -33356,10 +32052,15 @@
                     <a:bodyPr/>
                     <a:lstStyle/>
                     <a:p>
-                      <a:pPr algn="ctr"/>
+                      <a:pPr marL="0" algn="ctr" defTabSz="685800" rtl="0" eaLnBrk="1" latinLnBrk="0" hangingPunct="1"/>
                       <a:r>
-                        <a:rPr lang="en-US" sz="900">
+                        <a:rPr lang="en-US" sz="900" kern="1200">
+                          <a:solidFill>
+                            <a:schemeClr val="tx1"/>
+                          </a:solidFill>
                           <a:latin typeface="Hanken Grotesk" panose="020B0604020202020204" charset="0"/>
+                          <a:ea typeface="+mn-ea"/>
+                          <a:cs typeface="+mn-cs"/>
                         </a:rPr>
                         <a:t>0.502</a:t>
                       </a:r>
@@ -33372,10 +32073,15 @@
                     <a:bodyPr/>
                     <a:lstStyle/>
                     <a:p>
-                      <a:pPr algn="ctr"/>
+                      <a:pPr marL="0" algn="ctr" defTabSz="685800" rtl="0" eaLnBrk="1" latinLnBrk="0" hangingPunct="1"/>
                       <a:r>
-                        <a:rPr lang="en-US" sz="900">
+                        <a:rPr lang="en-US" sz="900" kern="1200">
+                          <a:solidFill>
+                            <a:schemeClr val="tx1"/>
+                          </a:solidFill>
                           <a:latin typeface="Hanken Grotesk" panose="020B0604020202020204" charset="0"/>
+                          <a:ea typeface="+mn-ea"/>
+                          <a:cs typeface="+mn-cs"/>
                         </a:rPr>
                         <a:t>0.648</a:t>
                       </a:r>
@@ -33388,10 +32094,15 @@
                     <a:bodyPr/>
                     <a:lstStyle/>
                     <a:p>
-                      <a:pPr algn="ctr"/>
+                      <a:pPr marL="0" algn="ctr" defTabSz="685800" rtl="0" eaLnBrk="1" latinLnBrk="0" hangingPunct="1"/>
                       <a:r>
-                        <a:rPr lang="en-US" sz="900">
+                        <a:rPr lang="en-US" sz="900" kern="1200" dirty="0">
+                          <a:solidFill>
+                            <a:schemeClr val="tx1"/>
+                          </a:solidFill>
                           <a:latin typeface="Hanken Grotesk" panose="020B0604020202020204" charset="0"/>
+                          <a:ea typeface="+mn-ea"/>
+                          <a:cs typeface="+mn-cs"/>
                         </a:rPr>
                         <a:t>0.5182</a:t>
                       </a:r>
@@ -33404,10 +32115,15 @@
                     <a:bodyPr/>
                     <a:lstStyle/>
                     <a:p>
-                      <a:pPr algn="ctr"/>
+                      <a:pPr marL="0" algn="ctr" defTabSz="685800" rtl="0" eaLnBrk="1" latinLnBrk="0" hangingPunct="1"/>
                       <a:r>
-                        <a:rPr lang="en-US" sz="900">
+                        <a:rPr lang="en-US" sz="900" kern="1200">
+                          <a:solidFill>
+                            <a:schemeClr val="tx1"/>
+                          </a:solidFill>
                           <a:latin typeface="Hanken Grotesk" panose="020B0604020202020204" charset="0"/>
+                          <a:ea typeface="+mn-ea"/>
+                          <a:cs typeface="+mn-cs"/>
                         </a:rPr>
                         <a:t>ML</a:t>
                       </a:r>
@@ -33427,16 +32143,18 @@
                     <a:bodyPr/>
                     <a:lstStyle/>
                     <a:p>
-                      <a:pPr algn="ctr"/>
+                      <a:pPr marL="0" algn="ctr" defTabSz="685800" rtl="0" eaLnBrk="1" latinLnBrk="0" hangingPunct="1"/>
                       <a:r>
-                        <a:rPr lang="en-US" sz="900" b="1">
+                        <a:rPr lang="en-US" sz="900" kern="1200" dirty="0">
+                          <a:solidFill>
+                            <a:schemeClr val="tx1"/>
+                          </a:solidFill>
                           <a:latin typeface="Hanken Grotesk" panose="020B0604020202020204" charset="0"/>
+                          <a:ea typeface="+mn-ea"/>
+                          <a:cs typeface="+mn-cs"/>
                         </a:rPr>
-                        <a:t>9</a:t>
+                        <a:t>10</a:t>
                       </a:r>
-                      <a:endParaRPr lang="en-US" sz="900">
-                        <a:latin typeface="Hanken Grotesk" panose="020B0604020202020204" charset="0"/>
-                      </a:endParaRPr>
                     </a:p>
                   </a:txBody>
                   <a:tcPr marL="56005" marR="56005" marT="28002" marB="28002" anchor="ctr"/>
@@ -33446,10 +32164,15 @@
                     <a:bodyPr/>
                     <a:lstStyle/>
                     <a:p>
-                      <a:pPr algn="ctr"/>
+                      <a:pPr marL="0" algn="ctr" defTabSz="685800" rtl="0" eaLnBrk="1" latinLnBrk="0" hangingPunct="1"/>
                       <a:r>
-                        <a:rPr lang="en-US" sz="900">
+                        <a:rPr lang="en-US" sz="900" kern="1200" dirty="0">
+                          <a:solidFill>
+                            <a:schemeClr val="tx1"/>
+                          </a:solidFill>
                           <a:latin typeface="Hanken Grotesk" panose="020B0604020202020204" charset="0"/>
+                          <a:ea typeface="+mn-ea"/>
+                          <a:cs typeface="+mn-cs"/>
                         </a:rPr>
                         <a:t>LSTM</a:t>
                       </a:r>
@@ -33462,13 +32185,19 @@
                     <a:bodyPr/>
                     <a:lstStyle/>
                     <a:p>
-                      <a:pPr algn="ctr"/>
+                      <a:pPr marL="0" algn="ctr" defTabSz="685800" rtl="0" eaLnBrk="1" latinLnBrk="0" hangingPunct="1"/>
                       <a:r>
-                        <a:rPr lang="en-US" sz="900">
-                          <a:latin typeface="Hanken Grotesk" panose="020B0604020202020204" charset="0"/>
-                        </a:rPr>
-                        <a:t>0.467</a:t>
+                        <a:rPr lang="en-US" sz="900" dirty="0"/>
+                        <a:t>0.857 </a:t>
                       </a:r>
+                      <a:endParaRPr lang="en-US" sz="900" kern="1200" dirty="0">
+                        <a:solidFill>
+                          <a:schemeClr val="tx1"/>
+                        </a:solidFill>
+                        <a:latin typeface="Hanken Grotesk" panose="020B0604020202020204" charset="0"/>
+                        <a:ea typeface="+mn-ea"/>
+                        <a:cs typeface="+mn-cs"/>
+                      </a:endParaRPr>
                     </a:p>
                   </a:txBody>
                   <a:tcPr marL="56005" marR="56005" marT="28002" marB="28002" anchor="ctr"/>
@@ -33478,13 +32207,19 @@
                     <a:bodyPr/>
                     <a:lstStyle/>
                     <a:p>
-                      <a:pPr algn="ctr"/>
+                      <a:pPr marL="0" algn="ctr" defTabSz="685800" rtl="0" eaLnBrk="1" latinLnBrk="0" hangingPunct="1"/>
                       <a:r>
-                        <a:rPr lang="en-US" sz="900">
-                          <a:latin typeface="Hanken Grotesk" panose="020B0604020202020204" charset="0"/>
-                        </a:rPr>
-                        <a:t>0.498</a:t>
+                        <a:rPr lang="en-US" sz="900" dirty="0"/>
+                        <a:t>0.987</a:t>
                       </a:r>
+                      <a:endParaRPr lang="en-US" sz="900" kern="1200" dirty="0">
+                        <a:solidFill>
+                          <a:schemeClr val="tx1"/>
+                        </a:solidFill>
+                        <a:latin typeface="Hanken Grotesk" panose="020B0604020202020204" charset="0"/>
+                        <a:ea typeface="+mn-ea"/>
+                        <a:cs typeface="+mn-cs"/>
+                      </a:endParaRPr>
                     </a:p>
                   </a:txBody>
                   <a:tcPr marL="56005" marR="56005" marT="28002" marB="28002" anchor="ctr"/>
@@ -33494,13 +32229,19 @@
                     <a:bodyPr/>
                     <a:lstStyle/>
                     <a:p>
-                      <a:pPr algn="ctr"/>
+                      <a:pPr marL="0" algn="ctr" defTabSz="685800" rtl="0" eaLnBrk="1" latinLnBrk="0" hangingPunct="1"/>
                       <a:r>
-                        <a:rPr lang="en-US" sz="900" b="0" dirty="0">
-                          <a:latin typeface="Hanken Grotesk" panose="020B0604020202020204" charset="0"/>
-                        </a:rPr>
-                        <a:t>0.014</a:t>
+                        <a:rPr lang="en-US" sz="900" dirty="0"/>
+                        <a:t>-0.410</a:t>
                       </a:r>
+                      <a:endParaRPr lang="en-US" sz="900" kern="1200" dirty="0">
+                        <a:solidFill>
+                          <a:schemeClr val="tx1"/>
+                        </a:solidFill>
+                        <a:latin typeface="Hanken Grotesk" panose="020B0604020202020204" charset="0"/>
+                        <a:ea typeface="+mn-ea"/>
+                        <a:cs typeface="+mn-cs"/>
+                      </a:endParaRPr>
                     </a:p>
                   </a:txBody>
                   <a:tcPr marL="56005" marR="56005" marT="28002" marB="28002" anchor="ctr"/>
@@ -33510,10 +32251,15 @@
                     <a:bodyPr/>
                     <a:lstStyle/>
                     <a:p>
-                      <a:pPr algn="ctr"/>
+                      <a:pPr marL="0" algn="ctr" defTabSz="685800" rtl="0" eaLnBrk="1" latinLnBrk="0" hangingPunct="1"/>
                       <a:r>
-                        <a:rPr lang="en-US" sz="900">
+                        <a:rPr lang="en-US" sz="900" kern="1200" dirty="0">
+                          <a:solidFill>
+                            <a:schemeClr val="tx1"/>
+                          </a:solidFill>
                           <a:latin typeface="Hanken Grotesk" panose="020B0604020202020204" charset="0"/>
+                          <a:ea typeface="+mn-ea"/>
+                          <a:cs typeface="+mn-cs"/>
                         </a:rPr>
                         <a:t>DL</a:t>
                       </a:r>
@@ -33533,16 +32279,18 @@
                     <a:bodyPr/>
                     <a:lstStyle/>
                     <a:p>
-                      <a:pPr algn="ctr"/>
+                      <a:pPr marL="0" algn="ctr" defTabSz="685800" rtl="0" eaLnBrk="1" latinLnBrk="0" hangingPunct="1"/>
                       <a:r>
-                        <a:rPr lang="en-US" sz="900" b="1">
+                        <a:rPr lang="en-US" sz="900" kern="1200" dirty="0">
+                          <a:solidFill>
+                            <a:schemeClr val="tx1"/>
+                          </a:solidFill>
                           <a:latin typeface="Hanken Grotesk" panose="020B0604020202020204" charset="0"/>
+                          <a:ea typeface="+mn-ea"/>
+                          <a:cs typeface="+mn-cs"/>
                         </a:rPr>
-                        <a:t>10</a:t>
+                        <a:t>11</a:t>
                       </a:r>
-                      <a:endParaRPr lang="en-US" sz="900">
-                        <a:latin typeface="Hanken Grotesk" panose="020B0604020202020204" charset="0"/>
-                      </a:endParaRPr>
                     </a:p>
                   </a:txBody>
                   <a:tcPr marL="56005" marR="56005" marT="28002" marB="28002" anchor="ctr"/>
@@ -33552,10 +32300,15 @@
                     <a:bodyPr/>
                     <a:lstStyle/>
                     <a:p>
-                      <a:pPr algn="ctr"/>
+                      <a:pPr marL="0" algn="ctr" defTabSz="685800" rtl="0" eaLnBrk="1" latinLnBrk="0" hangingPunct="1"/>
                       <a:r>
-                        <a:rPr lang="en-US" sz="900">
+                        <a:rPr lang="en-US" sz="900" kern="1200" dirty="0">
+                          <a:solidFill>
+                            <a:schemeClr val="tx1"/>
+                          </a:solidFill>
                           <a:latin typeface="Hanken Grotesk" panose="020B0604020202020204" charset="0"/>
+                          <a:ea typeface="+mn-ea"/>
+                          <a:cs typeface="+mn-cs"/>
                         </a:rPr>
                         <a:t>GRU</a:t>
                       </a:r>
@@ -33568,13 +32321,19 @@
                     <a:bodyPr/>
                     <a:lstStyle/>
                     <a:p>
-                      <a:pPr algn="ctr"/>
+                      <a:pPr marL="0" algn="ctr" defTabSz="685800" rtl="0" eaLnBrk="1" latinLnBrk="0" hangingPunct="1"/>
                       <a:r>
-                        <a:rPr lang="en-US" sz="900">
-                          <a:latin typeface="Hanken Grotesk" panose="020B0604020202020204" charset="0"/>
-                        </a:rPr>
-                        <a:t>0.482</a:t>
+                        <a:rPr lang="en-US" sz="900" dirty="0"/>
+                        <a:t>0.856</a:t>
                       </a:r>
+                      <a:endParaRPr lang="en-US" sz="900" kern="1200" dirty="0">
+                        <a:solidFill>
+                          <a:schemeClr val="tx1"/>
+                        </a:solidFill>
+                        <a:latin typeface="Hanken Grotesk" panose="020B0604020202020204" charset="0"/>
+                        <a:ea typeface="+mn-ea"/>
+                        <a:cs typeface="+mn-cs"/>
+                      </a:endParaRPr>
                     </a:p>
                   </a:txBody>
                   <a:tcPr marL="56005" marR="56005" marT="28002" marB="28002" anchor="ctr"/>
@@ -33584,13 +32343,19 @@
                     <a:bodyPr/>
                     <a:lstStyle/>
                     <a:p>
-                      <a:pPr algn="ctr"/>
+                      <a:pPr marL="0" algn="ctr" defTabSz="685800" rtl="0" eaLnBrk="1" latinLnBrk="0" hangingPunct="1"/>
                       <a:r>
-                        <a:rPr lang="en-US" sz="900">
-                          <a:latin typeface="Hanken Grotesk" panose="020B0604020202020204" charset="0"/>
-                        </a:rPr>
-                        <a:t>0.499</a:t>
+                        <a:rPr lang="en-US" sz="900" dirty="0"/>
+                        <a:t>0.991</a:t>
                       </a:r>
+                      <a:endParaRPr lang="en-US" sz="900" kern="1200" dirty="0">
+                        <a:solidFill>
+                          <a:schemeClr val="tx1"/>
+                        </a:solidFill>
+                        <a:latin typeface="Hanken Grotesk" panose="020B0604020202020204" charset="0"/>
+                        <a:ea typeface="+mn-ea"/>
+                        <a:cs typeface="+mn-cs"/>
+                      </a:endParaRPr>
                     </a:p>
                   </a:txBody>
                   <a:tcPr marL="56005" marR="56005" marT="28002" marB="28002" anchor="ctr"/>
@@ -33600,13 +32365,19 @@
                     <a:bodyPr/>
                     <a:lstStyle/>
                     <a:p>
-                      <a:pPr algn="ctr"/>
+                      <a:pPr marL="0" algn="ctr" defTabSz="685800" rtl="0" eaLnBrk="1" latinLnBrk="0" hangingPunct="1"/>
                       <a:r>
-                        <a:rPr lang="en-US" sz="900" b="0" dirty="0">
-                          <a:latin typeface="Hanken Grotesk" panose="020B0604020202020204" charset="0"/>
-                        </a:rPr>
-                        <a:t>0.012</a:t>
+                        <a:rPr lang="en-US" sz="900" dirty="0"/>
+                        <a:t>-0.421</a:t>
                       </a:r>
+                      <a:endParaRPr lang="en-US" sz="900" kern="1200" dirty="0">
+                        <a:solidFill>
+                          <a:schemeClr val="tx1"/>
+                        </a:solidFill>
+                        <a:latin typeface="Hanken Grotesk" panose="020B0604020202020204" charset="0"/>
+                        <a:ea typeface="+mn-ea"/>
+                        <a:cs typeface="+mn-cs"/>
+                      </a:endParaRPr>
                     </a:p>
                   </a:txBody>
                   <a:tcPr marL="56005" marR="56005" marT="28002" marB="28002" anchor="ctr"/>
@@ -33616,10 +32387,15 @@
                     <a:bodyPr/>
                     <a:lstStyle/>
                     <a:p>
-                      <a:pPr algn="ctr"/>
+                      <a:pPr marL="0" algn="ctr" defTabSz="685800" rtl="0" eaLnBrk="1" latinLnBrk="0" hangingPunct="1"/>
                       <a:r>
-                        <a:rPr lang="en-US" sz="900">
+                        <a:rPr lang="en-US" sz="900" kern="1200" dirty="0">
+                          <a:solidFill>
+                            <a:schemeClr val="tx1"/>
+                          </a:solidFill>
                           <a:latin typeface="Hanken Grotesk" panose="020B0604020202020204" charset="0"/>
+                          <a:ea typeface="+mn-ea"/>
+                          <a:cs typeface="+mn-cs"/>
                         </a:rPr>
                         <a:t>DL</a:t>
                       </a:r>
@@ -33630,112 +32406,6 @@
                 <a:extLst>
                   <a:ext uri="{0D108BD9-81ED-4DB2-BD59-A6C34878D82A}">
                     <a16:rowId xmlns:a16="http://schemas.microsoft.com/office/drawing/2014/main" val="858432243"/>
-                  </a:ext>
-                </a:extLst>
-              </a:tr>
-              <a:tr h="262674">
-                <a:tc>
-                  <a:txBody>
-                    <a:bodyPr/>
-                    <a:lstStyle/>
-                    <a:p>
-                      <a:pPr algn="ctr"/>
-                      <a:r>
-                        <a:rPr lang="en-US" sz="900" b="1">
-                          <a:latin typeface="Hanken Grotesk" panose="020B0604020202020204" charset="0"/>
-                        </a:rPr>
-                        <a:t>11</a:t>
-                      </a:r>
-                      <a:endParaRPr lang="en-US" sz="900">
-                        <a:latin typeface="Hanken Grotesk" panose="020B0604020202020204" charset="0"/>
-                      </a:endParaRPr>
-                    </a:p>
-                  </a:txBody>
-                  <a:tcPr marL="56005" marR="56005" marT="28002" marB="28002" anchor="ctr"/>
-                </a:tc>
-                <a:tc>
-                  <a:txBody>
-                    <a:bodyPr/>
-                    <a:lstStyle/>
-                    <a:p>
-                      <a:pPr algn="ctr"/>
-                      <a:r>
-                        <a:rPr lang="en-US" sz="900">
-                          <a:latin typeface="Hanken Grotesk" panose="020B0604020202020204" charset="0"/>
-                        </a:rPr>
-                        <a:t>MLP</a:t>
-                      </a:r>
-                    </a:p>
-                  </a:txBody>
-                  <a:tcPr marL="56005" marR="56005" marT="28002" marB="28002" anchor="ctr"/>
-                </a:tc>
-                <a:tc>
-                  <a:txBody>
-                    <a:bodyPr/>
-                    <a:lstStyle/>
-                    <a:p>
-                      <a:pPr algn="ctr"/>
-                      <a:r>
-                        <a:rPr lang="en-US" sz="900">
-                          <a:latin typeface="Hanken Grotesk" panose="020B0604020202020204" charset="0"/>
-                        </a:rPr>
-                        <a:t>0.618</a:t>
-                      </a:r>
-                    </a:p>
-                  </a:txBody>
-                  <a:tcPr marL="56005" marR="56005" marT="28002" marB="28002" anchor="ctr"/>
-                </a:tc>
-                <a:tc>
-                  <a:txBody>
-                    <a:bodyPr/>
-                    <a:lstStyle/>
-                    <a:p>
-                      <a:pPr algn="ctr"/>
-                      <a:r>
-                        <a:rPr lang="en-US" sz="900">
-                          <a:latin typeface="Hanken Grotesk" panose="020B0604020202020204" charset="0"/>
-                        </a:rPr>
-                        <a:t>0.499</a:t>
-                      </a:r>
-                    </a:p>
-                  </a:txBody>
-                  <a:tcPr marL="56005" marR="56005" marT="28002" marB="28002" anchor="ctr"/>
-                </a:tc>
-                <a:tc>
-                  <a:txBody>
-                    <a:bodyPr/>
-                    <a:lstStyle/>
-                    <a:p>
-                      <a:pPr algn="ctr"/>
-                      <a:r>
-                        <a:rPr lang="en-US" sz="900" b="0" dirty="0">
-                          <a:latin typeface="Hanken Grotesk" panose="020B0604020202020204" charset="0"/>
-                        </a:rPr>
-                        <a:t>0.011</a:t>
-                      </a:r>
-                    </a:p>
-                  </a:txBody>
-                  <a:tcPr marL="56005" marR="56005" marT="28002" marB="28002" anchor="ctr"/>
-                </a:tc>
-                <a:tc>
-                  <a:txBody>
-                    <a:bodyPr/>
-                    <a:lstStyle/>
-                    <a:p>
-                      <a:pPr algn="ctr"/>
-                      <a:r>
-                        <a:rPr lang="en-US" sz="900" dirty="0">
-                          <a:latin typeface="Hanken Grotesk" panose="020B0604020202020204" charset="0"/>
-                        </a:rPr>
-                        <a:t>DL</a:t>
-                      </a:r>
-                    </a:p>
-                  </a:txBody>
-                  <a:tcPr marL="56005" marR="56005" marT="28002" marB="28002" anchor="ctr"/>
-                </a:tc>
-                <a:extLst>
-                  <a:ext uri="{0D108BD9-81ED-4DB2-BD59-A6C34878D82A}">
-                    <a16:rowId xmlns:a16="http://schemas.microsoft.com/office/drawing/2014/main" val="2400273485"/>
                   </a:ext>
                 </a:extLst>
               </a:tr>
@@ -34045,7 +32715,7 @@
         </p:nvSpPr>
         <p:spPr>
           <a:xfrm>
-            <a:off x="1847185" y="4440454"/>
+            <a:off x="1717287" y="4370991"/>
             <a:ext cx="6105334" cy="347916"/>
           </a:xfrm>
           <a:prstGeom prst="rect">
@@ -34602,7 +33272,7 @@
             </a:r>
             <a:fld id="{1612EBDF-BBCF-4455-9CA4-C9C775D5C22A}" type="datetime1">
               <a:rPr lang="en-US" sz="1000" smtClean="0"/>
-              <a:t>1/12/2026</a:t>
+              <a:t>1/14/2026</a:t>
             </a:fld>
             <a:endParaRPr lang="en-US" sz="1000" dirty="0"/>
           </a:p>
@@ -34621,7 +33291,7 @@
 </p:sld>
 </file>
 
-<file path=ppt/slides/slide23.xml><?xml version="1.0" encoding="utf-8"?>
+<file path=ppt/slides/slide22.xml><?xml version="1.0" encoding="utf-8"?>
 <p:sld xmlns:a="http://schemas.openxmlformats.org/drawingml/2006/main" xmlns:r="http://schemas.openxmlformats.org/officeDocument/2006/relationships" xmlns:p="http://schemas.openxmlformats.org/presentationml/2006/main">
   <p:cSld>
     <p:spTree>
@@ -35372,7 +34042,7 @@
             </a:r>
             <a:fld id="{1612EBDF-BBCF-4455-9CA4-C9C775D5C22A}" type="datetime1">
               <a:rPr lang="en-US" sz="1000" smtClean="0"/>
-              <a:t>1/12/2026</a:t>
+              <a:t>1/14/2026</a:t>
             </a:fld>
             <a:endParaRPr lang="en-US" sz="1000" dirty="0"/>
           </a:p>
@@ -35391,7 +34061,7 @@
 </p:sld>
 </file>
 
-<file path=ppt/slides/slide24.xml><?xml version="1.0" encoding="utf-8"?>
+<file path=ppt/slides/slide23.xml><?xml version="1.0" encoding="utf-8"?>
 <p:sld xmlns:a="http://schemas.openxmlformats.org/drawingml/2006/main" xmlns:r="http://schemas.openxmlformats.org/officeDocument/2006/relationships" xmlns:p="http://schemas.openxmlformats.org/presentationml/2006/main">
   <p:cSld>
     <p:spTree>
@@ -36002,7 +34672,7 @@
             </a:r>
             <a:fld id="{1612EBDF-BBCF-4455-9CA4-C9C775D5C22A}" type="datetime1">
               <a:rPr lang="en-US" sz="1000" smtClean="0"/>
-              <a:t>1/12/2026</a:t>
+              <a:t>1/14/2026</a:t>
             </a:fld>
             <a:endParaRPr lang="en-US" sz="1000" dirty="0"/>
           </a:p>
@@ -36244,7 +34914,7 @@
 </p:sld>
 </file>
 
-<file path=ppt/slides/slide25.xml><?xml version="1.0" encoding="utf-8"?>
+<file path=ppt/slides/slide24.xml><?xml version="1.0" encoding="utf-8"?>
 <p:sld xmlns:a="http://schemas.openxmlformats.org/drawingml/2006/main" xmlns:r="http://schemas.openxmlformats.org/officeDocument/2006/relationships" xmlns:p="http://schemas.openxmlformats.org/presentationml/2006/main">
   <p:cSld>
     <p:spTree>
@@ -36768,7 +35438,7 @@
 </p:sld>
 </file>
 
-<file path=ppt/slides/slide26.xml><?xml version="1.0" encoding="utf-8"?>
+<file path=ppt/slides/slide25.xml><?xml version="1.0" encoding="utf-8"?>
 <p:sld xmlns:a="http://schemas.openxmlformats.org/drawingml/2006/main" xmlns:r="http://schemas.openxmlformats.org/officeDocument/2006/relationships" xmlns:p="http://schemas.openxmlformats.org/presentationml/2006/main">
   <p:cSld>
     <p:spTree>
@@ -37921,7 +36591,7 @@
             </a:r>
             <a:fld id="{1612EBDF-BBCF-4455-9CA4-C9C775D5C22A}" type="datetime1">
               <a:rPr lang="en-US" sz="1000" smtClean="0"/>
-              <a:t>1/12/2026</a:t>
+              <a:t>1/14/2026</a:t>
             </a:fld>
             <a:endParaRPr lang="en-US" sz="1000" dirty="0"/>
           </a:p>
@@ -39079,7 +37749,7 @@
             </a:r>
             <a:fld id="{1612EBDF-BBCF-4455-9CA4-C9C775D5C22A}" type="datetime1">
               <a:rPr lang="en-US" sz="1000" smtClean="0"/>
-              <a:t>1/12/2026</a:t>
+              <a:t>1/14/2026</a:t>
             </a:fld>
             <a:endParaRPr lang="en-US" sz="1000" dirty="0"/>
           </a:p>
@@ -39800,7 +38470,7 @@
             </a:r>
             <a:fld id="{1612EBDF-BBCF-4455-9CA4-C9C775D5C22A}" type="datetime1">
               <a:rPr lang="en-US" sz="1000" smtClean="0"/>
-              <a:t>1/12/2026</a:t>
+              <a:t>1/14/2026</a:t>
             </a:fld>
             <a:endParaRPr lang="en-US" sz="1000" dirty="0"/>
           </a:p>
@@ -40987,7 +39657,7 @@
             </a:r>
             <a:fld id="{1612EBDF-BBCF-4455-9CA4-C9C775D5C22A}" type="datetime1">
               <a:rPr lang="en-US" sz="1000" smtClean="0"/>
-              <a:t>1/12/2026</a:t>
+              <a:t>1/14/2026</a:t>
             </a:fld>
             <a:endParaRPr lang="en-US" sz="1000" dirty="0"/>
           </a:p>
@@ -42719,7 +41389,7 @@
             </a:r>
             <a:fld id="{1612EBDF-BBCF-4455-9CA4-C9C775D5C22A}" type="datetime1">
               <a:rPr lang="en-US" sz="1000" smtClean="0"/>
-              <a:t>1/12/2026</a:t>
+              <a:t>1/14/2026</a:t>
             </a:fld>
             <a:endParaRPr lang="en-US" sz="1000" dirty="0"/>
           </a:p>
@@ -45429,7 +44099,7 @@
             </a:r>
             <a:fld id="{1612EBDF-BBCF-4455-9CA4-C9C775D5C22A}" type="datetime1">
               <a:rPr lang="en-US" sz="1000" smtClean="0"/>
-              <a:t>1/12/2026</a:t>
+              <a:t>1/14/2026</a:t>
             </a:fld>
             <a:endParaRPr lang="en-US" sz="1000" dirty="0"/>
           </a:p>

</xml_diff>

<commit_message>
Updated the thingy to final
</commit_message>
<xml_diff>
--- a/documentation/MW Load Presenation Final.pptx
+++ b/documentation/MW Load Presenation Final.pptx
@@ -1828,7 +1828,7 @@
           <a:p>
             <a:fld id="{1A90A598-0175-4F4C-B315-95405EC9EDA1}" type="datetimeFigureOut">
               <a:rPr lang="en-US" smtClean="0"/>
-              <a:t>1/14/2026</a:t>
+              <a:t>1/15/2026</a:t>
             </a:fld>
             <a:endParaRPr lang="en-US"/>
           </a:p>
@@ -2027,7 +2027,7 @@
           <a:p>
             <a:fld id="{1A90A598-0175-4F4C-B315-95405EC9EDA1}" type="datetimeFigureOut">
               <a:rPr lang="en-US" smtClean="0"/>
-              <a:t>1/14/2026</a:t>
+              <a:t>1/15/2026</a:t>
             </a:fld>
             <a:endParaRPr lang="en-US"/>
           </a:p>
@@ -2236,7 +2236,7 @@
           <a:p>
             <a:fld id="{1A90A598-0175-4F4C-B315-95405EC9EDA1}" type="datetimeFigureOut">
               <a:rPr lang="en-US" smtClean="0"/>
-              <a:t>1/14/2026</a:t>
+              <a:t>1/15/2026</a:t>
             </a:fld>
             <a:endParaRPr lang="en-US"/>
           </a:p>
@@ -9693,7 +9693,7 @@
           <a:p>
             <a:fld id="{1A90A598-0175-4F4C-B315-95405EC9EDA1}" type="datetimeFigureOut">
               <a:rPr lang="en-US" smtClean="0"/>
-              <a:t>1/14/2026</a:t>
+              <a:t>1/15/2026</a:t>
             </a:fld>
             <a:endParaRPr lang="en-US"/>
           </a:p>
@@ -9969,7 +9969,7 @@
           <a:p>
             <a:fld id="{1A90A598-0175-4F4C-B315-95405EC9EDA1}" type="datetimeFigureOut">
               <a:rPr lang="en-US" smtClean="0"/>
-              <a:t>1/14/2026</a:t>
+              <a:t>1/15/2026</a:t>
             </a:fld>
             <a:endParaRPr lang="en-US"/>
           </a:p>
@@ -10235,7 +10235,7 @@
           <a:p>
             <a:fld id="{1A90A598-0175-4F4C-B315-95405EC9EDA1}" type="datetimeFigureOut">
               <a:rPr lang="en-US" smtClean="0"/>
-              <a:t>1/14/2026</a:t>
+              <a:t>1/15/2026</a:t>
             </a:fld>
             <a:endParaRPr lang="en-US"/>
           </a:p>
@@ -10648,7 +10648,7 @@
           <a:p>
             <a:fld id="{1A90A598-0175-4F4C-B315-95405EC9EDA1}" type="datetimeFigureOut">
               <a:rPr lang="en-US" smtClean="0"/>
-              <a:t>1/14/2026</a:t>
+              <a:t>1/15/2026</a:t>
             </a:fld>
             <a:endParaRPr lang="en-US"/>
           </a:p>
@@ -10790,7 +10790,7 @@
           <a:p>
             <a:fld id="{1A90A598-0175-4F4C-B315-95405EC9EDA1}" type="datetimeFigureOut">
               <a:rPr lang="en-US" smtClean="0"/>
-              <a:t>1/14/2026</a:t>
+              <a:t>1/15/2026</a:t>
             </a:fld>
             <a:endParaRPr lang="en-US"/>
           </a:p>
@@ -10904,7 +10904,7 @@
           <a:p>
             <a:fld id="{1A90A598-0175-4F4C-B315-95405EC9EDA1}" type="datetimeFigureOut">
               <a:rPr lang="en-US" smtClean="0"/>
-              <a:t>1/14/2026</a:t>
+              <a:t>1/15/2026</a:t>
             </a:fld>
             <a:endParaRPr lang="en-US"/>
           </a:p>
@@ -11215,7 +11215,7 @@
           <a:p>
             <a:fld id="{1A90A598-0175-4F4C-B315-95405EC9EDA1}" type="datetimeFigureOut">
               <a:rPr lang="en-US" smtClean="0"/>
-              <a:t>1/14/2026</a:t>
+              <a:t>1/15/2026</a:t>
             </a:fld>
             <a:endParaRPr lang="en-US"/>
           </a:p>
@@ -11504,7 +11504,7 @@
           <a:p>
             <a:fld id="{1A90A598-0175-4F4C-B315-95405EC9EDA1}" type="datetimeFigureOut">
               <a:rPr lang="en-US" smtClean="0"/>
-              <a:t>1/14/2026</a:t>
+              <a:t>1/15/2026</a:t>
             </a:fld>
             <a:endParaRPr lang="en-US"/>
           </a:p>
@@ -11746,7 +11746,7 @@
           <a:p>
             <a:fld id="{1A90A598-0175-4F4C-B315-95405EC9EDA1}" type="datetimeFigureOut">
               <a:rPr lang="en-US" smtClean="0"/>
-              <a:t>1/14/2026</a:t>
+              <a:t>1/15/2026</a:t>
             </a:fld>
             <a:endParaRPr lang="en-US"/>
           </a:p>
@@ -13261,7 +13261,7 @@
             </a:r>
             <a:fld id="{1612EBDF-BBCF-4455-9CA4-C9C775D5C22A}" type="datetime1">
               <a:rPr lang="en-US" sz="1000" smtClean="0"/>
-              <a:t>1/14/2026</a:t>
+              <a:t>1/15/2026</a:t>
             </a:fld>
             <a:endParaRPr lang="en-US" sz="1000" dirty="0"/>
           </a:p>
@@ -16888,7 +16888,7 @@
             </a:r>
             <a:fld id="{1612EBDF-BBCF-4455-9CA4-C9C775D5C22A}" type="datetime1">
               <a:rPr lang="en-US" sz="1000" smtClean="0"/>
-              <a:t>1/14/2026</a:t>
+              <a:t>1/15/2026</a:t>
             </a:fld>
             <a:endParaRPr lang="en-US" sz="1000" dirty="0"/>
           </a:p>
@@ -17849,7 +17849,7 @@
             </a:r>
             <a:fld id="{1612EBDF-BBCF-4455-9CA4-C9C775D5C22A}" type="datetime1">
               <a:rPr lang="en-US" sz="1000" smtClean="0"/>
-              <a:t>1/14/2026</a:t>
+              <a:t>1/15/2026</a:t>
             </a:fld>
             <a:endParaRPr lang="en-US" sz="1000" dirty="0"/>
           </a:p>
@@ -18817,7 +18817,7 @@
             </a:r>
             <a:fld id="{1612EBDF-BBCF-4455-9CA4-C9C775D5C22A}" type="datetime1">
               <a:rPr lang="en-US" sz="1000" smtClean="0"/>
-              <a:t>1/14/2026</a:t>
+              <a:t>1/15/2026</a:t>
             </a:fld>
             <a:endParaRPr lang="en-US" sz="1000" dirty="0"/>
           </a:p>
@@ -18921,6 +18921,298 @@
           </a:prstGeom>
         </p:spPr>
       </p:pic>
+      <p:sp>
+        <p:nvSpPr>
+          <p:cNvPr id="2" name="Google Shape;330;p36">
+            <a:extLst>
+              <a:ext uri="{FF2B5EF4-FFF2-40B4-BE49-F238E27FC236}">
+                <a16:creationId xmlns:a16="http://schemas.microsoft.com/office/drawing/2014/main" id="{FEBEDA7A-D648-F50F-892B-9EAD6D2EB6E2}"/>
+              </a:ext>
+            </a:extLst>
+          </p:cNvPr>
+          <p:cNvSpPr txBox="1">
+            <a:spLocks/>
+          </p:cNvSpPr>
+          <p:nvPr/>
+        </p:nvSpPr>
+        <p:spPr>
+          <a:xfrm>
+            <a:off x="241332" y="4614412"/>
+            <a:ext cx="3764403" cy="278135"/>
+          </a:xfrm>
+          <a:prstGeom prst="rect">
+            <a:avLst/>
+          </a:prstGeom>
+          <a:noFill/>
+          <a:ln>
+            <a:noFill/>
+          </a:ln>
+        </p:spPr>
+        <p:txBody>
+          <a:bodyPr spcFirstLastPara="1" wrap="square" lIns="91425" tIns="91425" rIns="91425" bIns="91425" anchor="t" anchorCtr="0">
+            <a:noAutofit/>
+          </a:bodyPr>
+          <a:lstStyle>
+            <a:defPPr marR="0" lvl="0" algn="l" rtl="0">
+              <a:lnSpc>
+                <a:spcPct val="100000"/>
+              </a:lnSpc>
+              <a:spcBef>
+                <a:spcPts val="0"/>
+              </a:spcBef>
+              <a:spcAft>
+                <a:spcPts val="0"/>
+              </a:spcAft>
+            </a:defPPr>
+            <a:lvl1pPr marL="457200" marR="0" lvl="0" indent="-317500" algn="l" rtl="0">
+              <a:lnSpc>
+                <a:spcPct val="100000"/>
+              </a:lnSpc>
+              <a:spcBef>
+                <a:spcPts val="0"/>
+              </a:spcBef>
+              <a:spcAft>
+                <a:spcPts val="0"/>
+              </a:spcAft>
+              <a:buClr>
+                <a:schemeClr val="dk1"/>
+              </a:buClr>
+              <a:buSzPts val="1400"/>
+              <a:buFont typeface="Hanken Grotesk"/>
+              <a:buNone/>
+              <a:defRPr sz="1400" b="0" i="0" u="none" strike="noStrike" cap="none">
+                <a:solidFill>
+                  <a:schemeClr val="dk1"/>
+                </a:solidFill>
+                <a:latin typeface="Hanken Grotesk"/>
+                <a:ea typeface="Hanken Grotesk"/>
+                <a:cs typeface="Hanken Grotesk"/>
+                <a:sym typeface="Hanken Grotesk"/>
+              </a:defRPr>
+            </a:lvl1pPr>
+            <a:lvl2pPr marL="914400" marR="0" lvl="1" indent="-317500" algn="ctr" rtl="0">
+              <a:lnSpc>
+                <a:spcPct val="100000"/>
+              </a:lnSpc>
+              <a:spcBef>
+                <a:spcPts val="0"/>
+              </a:spcBef>
+              <a:spcAft>
+                <a:spcPts val="0"/>
+              </a:spcAft>
+              <a:buClr>
+                <a:schemeClr val="dk1"/>
+              </a:buClr>
+              <a:buSzPts val="1400"/>
+              <a:buFont typeface="Hanken Grotesk"/>
+              <a:buNone/>
+              <a:defRPr sz="1400" b="0" i="0" u="none" strike="noStrike" cap="none">
+                <a:solidFill>
+                  <a:schemeClr val="dk1"/>
+                </a:solidFill>
+                <a:latin typeface="Hanken Grotesk"/>
+                <a:ea typeface="Hanken Grotesk"/>
+                <a:cs typeface="Hanken Grotesk"/>
+                <a:sym typeface="Hanken Grotesk"/>
+              </a:defRPr>
+            </a:lvl2pPr>
+            <a:lvl3pPr marL="1371600" marR="0" lvl="2" indent="-317500" algn="ctr" rtl="0">
+              <a:lnSpc>
+                <a:spcPct val="100000"/>
+              </a:lnSpc>
+              <a:spcBef>
+                <a:spcPts val="0"/>
+              </a:spcBef>
+              <a:spcAft>
+                <a:spcPts val="0"/>
+              </a:spcAft>
+              <a:buClr>
+                <a:schemeClr val="dk1"/>
+              </a:buClr>
+              <a:buSzPts val="1400"/>
+              <a:buFont typeface="Hanken Grotesk"/>
+              <a:buNone/>
+              <a:defRPr sz="1400" b="0" i="0" u="none" strike="noStrike" cap="none">
+                <a:solidFill>
+                  <a:schemeClr val="dk1"/>
+                </a:solidFill>
+                <a:latin typeface="Hanken Grotesk"/>
+                <a:ea typeface="Hanken Grotesk"/>
+                <a:cs typeface="Hanken Grotesk"/>
+                <a:sym typeface="Hanken Grotesk"/>
+              </a:defRPr>
+            </a:lvl3pPr>
+            <a:lvl4pPr marL="1828800" marR="0" lvl="3" indent="-317500" algn="ctr" rtl="0">
+              <a:lnSpc>
+                <a:spcPct val="100000"/>
+              </a:lnSpc>
+              <a:spcBef>
+                <a:spcPts val="0"/>
+              </a:spcBef>
+              <a:spcAft>
+                <a:spcPts val="0"/>
+              </a:spcAft>
+              <a:buClr>
+                <a:schemeClr val="dk1"/>
+              </a:buClr>
+              <a:buSzPts val="1400"/>
+              <a:buFont typeface="Hanken Grotesk"/>
+              <a:buNone/>
+              <a:defRPr sz="1400" b="0" i="0" u="none" strike="noStrike" cap="none">
+                <a:solidFill>
+                  <a:schemeClr val="dk1"/>
+                </a:solidFill>
+                <a:latin typeface="Hanken Grotesk"/>
+                <a:ea typeface="Hanken Grotesk"/>
+                <a:cs typeface="Hanken Grotesk"/>
+                <a:sym typeface="Hanken Grotesk"/>
+              </a:defRPr>
+            </a:lvl4pPr>
+            <a:lvl5pPr marL="2286000" marR="0" lvl="4" indent="-317500" algn="ctr" rtl="0">
+              <a:lnSpc>
+                <a:spcPct val="100000"/>
+              </a:lnSpc>
+              <a:spcBef>
+                <a:spcPts val="0"/>
+              </a:spcBef>
+              <a:spcAft>
+                <a:spcPts val="0"/>
+              </a:spcAft>
+              <a:buClr>
+                <a:schemeClr val="dk1"/>
+              </a:buClr>
+              <a:buSzPts val="1400"/>
+              <a:buFont typeface="Hanken Grotesk"/>
+              <a:buNone/>
+              <a:defRPr sz="1400" b="0" i="0" u="none" strike="noStrike" cap="none">
+                <a:solidFill>
+                  <a:schemeClr val="dk1"/>
+                </a:solidFill>
+                <a:latin typeface="Hanken Grotesk"/>
+                <a:ea typeface="Hanken Grotesk"/>
+                <a:cs typeface="Hanken Grotesk"/>
+                <a:sym typeface="Hanken Grotesk"/>
+              </a:defRPr>
+            </a:lvl5pPr>
+            <a:lvl6pPr marL="2743200" marR="0" lvl="5" indent="-317500" algn="ctr" rtl="0">
+              <a:lnSpc>
+                <a:spcPct val="100000"/>
+              </a:lnSpc>
+              <a:spcBef>
+                <a:spcPts val="0"/>
+              </a:spcBef>
+              <a:spcAft>
+                <a:spcPts val="0"/>
+              </a:spcAft>
+              <a:buClr>
+                <a:schemeClr val="dk1"/>
+              </a:buClr>
+              <a:buSzPts val="1400"/>
+              <a:buFont typeface="Hanken Grotesk"/>
+              <a:buNone/>
+              <a:defRPr sz="1400" b="0" i="0" u="none" strike="noStrike" cap="none">
+                <a:solidFill>
+                  <a:schemeClr val="dk1"/>
+                </a:solidFill>
+                <a:latin typeface="Hanken Grotesk"/>
+                <a:ea typeface="Hanken Grotesk"/>
+                <a:cs typeface="Hanken Grotesk"/>
+                <a:sym typeface="Hanken Grotesk"/>
+              </a:defRPr>
+            </a:lvl6pPr>
+            <a:lvl7pPr marL="3200400" marR="0" lvl="6" indent="-317500" algn="ctr" rtl="0">
+              <a:lnSpc>
+                <a:spcPct val="100000"/>
+              </a:lnSpc>
+              <a:spcBef>
+                <a:spcPts val="0"/>
+              </a:spcBef>
+              <a:spcAft>
+                <a:spcPts val="0"/>
+              </a:spcAft>
+              <a:buClr>
+                <a:schemeClr val="dk1"/>
+              </a:buClr>
+              <a:buSzPts val="1400"/>
+              <a:buFont typeface="Hanken Grotesk"/>
+              <a:buNone/>
+              <a:defRPr sz="1400" b="0" i="0" u="none" strike="noStrike" cap="none">
+                <a:solidFill>
+                  <a:schemeClr val="dk1"/>
+                </a:solidFill>
+                <a:latin typeface="Hanken Grotesk"/>
+                <a:ea typeface="Hanken Grotesk"/>
+                <a:cs typeface="Hanken Grotesk"/>
+                <a:sym typeface="Hanken Grotesk"/>
+              </a:defRPr>
+            </a:lvl7pPr>
+            <a:lvl8pPr marL="3657600" marR="0" lvl="7" indent="-317500" algn="ctr" rtl="0">
+              <a:lnSpc>
+                <a:spcPct val="100000"/>
+              </a:lnSpc>
+              <a:spcBef>
+                <a:spcPts val="0"/>
+              </a:spcBef>
+              <a:spcAft>
+                <a:spcPts val="0"/>
+              </a:spcAft>
+              <a:buClr>
+                <a:schemeClr val="dk1"/>
+              </a:buClr>
+              <a:buSzPts val="1400"/>
+              <a:buFont typeface="Hanken Grotesk"/>
+              <a:buNone/>
+              <a:defRPr sz="1400" b="0" i="0" u="none" strike="noStrike" cap="none">
+                <a:solidFill>
+                  <a:schemeClr val="dk1"/>
+                </a:solidFill>
+                <a:latin typeface="Hanken Grotesk"/>
+                <a:ea typeface="Hanken Grotesk"/>
+                <a:cs typeface="Hanken Grotesk"/>
+                <a:sym typeface="Hanken Grotesk"/>
+              </a:defRPr>
+            </a:lvl8pPr>
+            <a:lvl9pPr marL="4114800" marR="0" lvl="8" indent="-317500" algn="ctr" rtl="0">
+              <a:lnSpc>
+                <a:spcPct val="100000"/>
+              </a:lnSpc>
+              <a:spcBef>
+                <a:spcPts val="0"/>
+              </a:spcBef>
+              <a:spcAft>
+                <a:spcPts val="0"/>
+              </a:spcAft>
+              <a:buClr>
+                <a:schemeClr val="dk1"/>
+              </a:buClr>
+              <a:buSzPts val="1400"/>
+              <a:buFont typeface="Hanken Grotesk"/>
+              <a:buNone/>
+              <a:defRPr sz="1400" b="0" i="0" u="none" strike="noStrike" cap="none">
+                <a:solidFill>
+                  <a:schemeClr val="dk1"/>
+                </a:solidFill>
+                <a:latin typeface="Hanken Grotesk"/>
+                <a:ea typeface="Hanken Grotesk"/>
+                <a:cs typeface="Hanken Grotesk"/>
+                <a:sym typeface="Hanken Grotesk"/>
+              </a:defRPr>
+            </a:lvl9pPr>
+          </a:lstStyle>
+          <a:p>
+            <a:pPr marL="0" indent="0"/>
+            <a:r>
+              <a:rPr lang="en-US" sz="1000" dirty="0"/>
+              <a:t>Slide 10 - </a:t>
+            </a:r>
+            <a:fld id="{1612EBDF-BBCF-4455-9CA4-C9C775D5C22A}" type="datetime1">
+              <a:rPr lang="en-US" sz="1000" smtClean="0"/>
+              <a:t>1/15/2026</a:t>
+            </a:fld>
+            <a:endParaRPr lang="en-US" sz="1000" dirty="0"/>
+          </a:p>
+        </p:txBody>
+      </p:sp>
     </p:spTree>
     <p:extLst>
       <p:ext uri="{BB962C8B-B14F-4D97-AF65-F5344CB8AC3E}">
@@ -19885,7 +20177,7 @@
             </a:r>
             <a:fld id="{1612EBDF-BBCF-4455-9CA4-C9C775D5C22A}" type="datetime1">
               <a:rPr lang="en-US" sz="1000" smtClean="0"/>
-              <a:t>1/14/2026</a:t>
+              <a:t>1/15/2026</a:t>
             </a:fld>
             <a:endParaRPr lang="en-US" sz="1000" dirty="0"/>
           </a:p>
@@ -19925,6 +20217,298 @@
               <a:t> This correlation matrix shows how different all the columns in the data are related to reach other.</a:t>
             </a:r>
             <a:endParaRPr lang="en-US" sz="1800" dirty="0"/>
+          </a:p>
+        </p:txBody>
+      </p:sp>
+      <p:sp>
+        <p:nvSpPr>
+          <p:cNvPr id="7" name="Google Shape;330;p36">
+            <a:extLst>
+              <a:ext uri="{FF2B5EF4-FFF2-40B4-BE49-F238E27FC236}">
+                <a16:creationId xmlns:a16="http://schemas.microsoft.com/office/drawing/2014/main" id="{326B45B9-027A-29FD-2DE7-18300A8E8469}"/>
+              </a:ext>
+            </a:extLst>
+          </p:cNvPr>
+          <p:cNvSpPr txBox="1">
+            <a:spLocks/>
+          </p:cNvSpPr>
+          <p:nvPr/>
+        </p:nvSpPr>
+        <p:spPr>
+          <a:xfrm>
+            <a:off x="7794425" y="4720503"/>
+            <a:ext cx="3764403" cy="278135"/>
+          </a:xfrm>
+          <a:prstGeom prst="rect">
+            <a:avLst/>
+          </a:prstGeom>
+          <a:noFill/>
+          <a:ln>
+            <a:noFill/>
+          </a:ln>
+        </p:spPr>
+        <p:txBody>
+          <a:bodyPr spcFirstLastPara="1" wrap="square" lIns="91425" tIns="91425" rIns="91425" bIns="91425" anchor="t" anchorCtr="0">
+            <a:noAutofit/>
+          </a:bodyPr>
+          <a:lstStyle>
+            <a:defPPr marR="0" lvl="0" algn="l" rtl="0">
+              <a:lnSpc>
+                <a:spcPct val="100000"/>
+              </a:lnSpc>
+              <a:spcBef>
+                <a:spcPts val="0"/>
+              </a:spcBef>
+              <a:spcAft>
+                <a:spcPts val="0"/>
+              </a:spcAft>
+            </a:defPPr>
+            <a:lvl1pPr marL="457200" marR="0" lvl="0" indent="-317500" algn="l" rtl="0">
+              <a:lnSpc>
+                <a:spcPct val="100000"/>
+              </a:lnSpc>
+              <a:spcBef>
+                <a:spcPts val="0"/>
+              </a:spcBef>
+              <a:spcAft>
+                <a:spcPts val="0"/>
+              </a:spcAft>
+              <a:buClr>
+                <a:schemeClr val="dk1"/>
+              </a:buClr>
+              <a:buSzPts val="1400"/>
+              <a:buFont typeface="Hanken Grotesk"/>
+              <a:buNone/>
+              <a:defRPr sz="1400" b="0" i="0" u="none" strike="noStrike" cap="none">
+                <a:solidFill>
+                  <a:schemeClr val="dk1"/>
+                </a:solidFill>
+                <a:latin typeface="Hanken Grotesk"/>
+                <a:ea typeface="Hanken Grotesk"/>
+                <a:cs typeface="Hanken Grotesk"/>
+                <a:sym typeface="Hanken Grotesk"/>
+              </a:defRPr>
+            </a:lvl1pPr>
+            <a:lvl2pPr marL="914400" marR="0" lvl="1" indent="-317500" algn="ctr" rtl="0">
+              <a:lnSpc>
+                <a:spcPct val="100000"/>
+              </a:lnSpc>
+              <a:spcBef>
+                <a:spcPts val="0"/>
+              </a:spcBef>
+              <a:spcAft>
+                <a:spcPts val="0"/>
+              </a:spcAft>
+              <a:buClr>
+                <a:schemeClr val="dk1"/>
+              </a:buClr>
+              <a:buSzPts val="1400"/>
+              <a:buFont typeface="Hanken Grotesk"/>
+              <a:buNone/>
+              <a:defRPr sz="1400" b="0" i="0" u="none" strike="noStrike" cap="none">
+                <a:solidFill>
+                  <a:schemeClr val="dk1"/>
+                </a:solidFill>
+                <a:latin typeface="Hanken Grotesk"/>
+                <a:ea typeface="Hanken Grotesk"/>
+                <a:cs typeface="Hanken Grotesk"/>
+                <a:sym typeface="Hanken Grotesk"/>
+              </a:defRPr>
+            </a:lvl2pPr>
+            <a:lvl3pPr marL="1371600" marR="0" lvl="2" indent="-317500" algn="ctr" rtl="0">
+              <a:lnSpc>
+                <a:spcPct val="100000"/>
+              </a:lnSpc>
+              <a:spcBef>
+                <a:spcPts val="0"/>
+              </a:spcBef>
+              <a:spcAft>
+                <a:spcPts val="0"/>
+              </a:spcAft>
+              <a:buClr>
+                <a:schemeClr val="dk1"/>
+              </a:buClr>
+              <a:buSzPts val="1400"/>
+              <a:buFont typeface="Hanken Grotesk"/>
+              <a:buNone/>
+              <a:defRPr sz="1400" b="0" i="0" u="none" strike="noStrike" cap="none">
+                <a:solidFill>
+                  <a:schemeClr val="dk1"/>
+                </a:solidFill>
+                <a:latin typeface="Hanken Grotesk"/>
+                <a:ea typeface="Hanken Grotesk"/>
+                <a:cs typeface="Hanken Grotesk"/>
+                <a:sym typeface="Hanken Grotesk"/>
+              </a:defRPr>
+            </a:lvl3pPr>
+            <a:lvl4pPr marL="1828800" marR="0" lvl="3" indent="-317500" algn="ctr" rtl="0">
+              <a:lnSpc>
+                <a:spcPct val="100000"/>
+              </a:lnSpc>
+              <a:spcBef>
+                <a:spcPts val="0"/>
+              </a:spcBef>
+              <a:spcAft>
+                <a:spcPts val="0"/>
+              </a:spcAft>
+              <a:buClr>
+                <a:schemeClr val="dk1"/>
+              </a:buClr>
+              <a:buSzPts val="1400"/>
+              <a:buFont typeface="Hanken Grotesk"/>
+              <a:buNone/>
+              <a:defRPr sz="1400" b="0" i="0" u="none" strike="noStrike" cap="none">
+                <a:solidFill>
+                  <a:schemeClr val="dk1"/>
+                </a:solidFill>
+                <a:latin typeface="Hanken Grotesk"/>
+                <a:ea typeface="Hanken Grotesk"/>
+                <a:cs typeface="Hanken Grotesk"/>
+                <a:sym typeface="Hanken Grotesk"/>
+              </a:defRPr>
+            </a:lvl4pPr>
+            <a:lvl5pPr marL="2286000" marR="0" lvl="4" indent="-317500" algn="ctr" rtl="0">
+              <a:lnSpc>
+                <a:spcPct val="100000"/>
+              </a:lnSpc>
+              <a:spcBef>
+                <a:spcPts val="0"/>
+              </a:spcBef>
+              <a:spcAft>
+                <a:spcPts val="0"/>
+              </a:spcAft>
+              <a:buClr>
+                <a:schemeClr val="dk1"/>
+              </a:buClr>
+              <a:buSzPts val="1400"/>
+              <a:buFont typeface="Hanken Grotesk"/>
+              <a:buNone/>
+              <a:defRPr sz="1400" b="0" i="0" u="none" strike="noStrike" cap="none">
+                <a:solidFill>
+                  <a:schemeClr val="dk1"/>
+                </a:solidFill>
+                <a:latin typeface="Hanken Grotesk"/>
+                <a:ea typeface="Hanken Grotesk"/>
+                <a:cs typeface="Hanken Grotesk"/>
+                <a:sym typeface="Hanken Grotesk"/>
+              </a:defRPr>
+            </a:lvl5pPr>
+            <a:lvl6pPr marL="2743200" marR="0" lvl="5" indent="-317500" algn="ctr" rtl="0">
+              <a:lnSpc>
+                <a:spcPct val="100000"/>
+              </a:lnSpc>
+              <a:spcBef>
+                <a:spcPts val="0"/>
+              </a:spcBef>
+              <a:spcAft>
+                <a:spcPts val="0"/>
+              </a:spcAft>
+              <a:buClr>
+                <a:schemeClr val="dk1"/>
+              </a:buClr>
+              <a:buSzPts val="1400"/>
+              <a:buFont typeface="Hanken Grotesk"/>
+              <a:buNone/>
+              <a:defRPr sz="1400" b="0" i="0" u="none" strike="noStrike" cap="none">
+                <a:solidFill>
+                  <a:schemeClr val="dk1"/>
+                </a:solidFill>
+                <a:latin typeface="Hanken Grotesk"/>
+                <a:ea typeface="Hanken Grotesk"/>
+                <a:cs typeface="Hanken Grotesk"/>
+                <a:sym typeface="Hanken Grotesk"/>
+              </a:defRPr>
+            </a:lvl6pPr>
+            <a:lvl7pPr marL="3200400" marR="0" lvl="6" indent="-317500" algn="ctr" rtl="0">
+              <a:lnSpc>
+                <a:spcPct val="100000"/>
+              </a:lnSpc>
+              <a:spcBef>
+                <a:spcPts val="0"/>
+              </a:spcBef>
+              <a:spcAft>
+                <a:spcPts val="0"/>
+              </a:spcAft>
+              <a:buClr>
+                <a:schemeClr val="dk1"/>
+              </a:buClr>
+              <a:buSzPts val="1400"/>
+              <a:buFont typeface="Hanken Grotesk"/>
+              <a:buNone/>
+              <a:defRPr sz="1400" b="0" i="0" u="none" strike="noStrike" cap="none">
+                <a:solidFill>
+                  <a:schemeClr val="dk1"/>
+                </a:solidFill>
+                <a:latin typeface="Hanken Grotesk"/>
+                <a:ea typeface="Hanken Grotesk"/>
+                <a:cs typeface="Hanken Grotesk"/>
+                <a:sym typeface="Hanken Grotesk"/>
+              </a:defRPr>
+            </a:lvl7pPr>
+            <a:lvl8pPr marL="3657600" marR="0" lvl="7" indent="-317500" algn="ctr" rtl="0">
+              <a:lnSpc>
+                <a:spcPct val="100000"/>
+              </a:lnSpc>
+              <a:spcBef>
+                <a:spcPts val="0"/>
+              </a:spcBef>
+              <a:spcAft>
+                <a:spcPts val="0"/>
+              </a:spcAft>
+              <a:buClr>
+                <a:schemeClr val="dk1"/>
+              </a:buClr>
+              <a:buSzPts val="1400"/>
+              <a:buFont typeface="Hanken Grotesk"/>
+              <a:buNone/>
+              <a:defRPr sz="1400" b="0" i="0" u="none" strike="noStrike" cap="none">
+                <a:solidFill>
+                  <a:schemeClr val="dk1"/>
+                </a:solidFill>
+                <a:latin typeface="Hanken Grotesk"/>
+                <a:ea typeface="Hanken Grotesk"/>
+                <a:cs typeface="Hanken Grotesk"/>
+                <a:sym typeface="Hanken Grotesk"/>
+              </a:defRPr>
+            </a:lvl8pPr>
+            <a:lvl9pPr marL="4114800" marR="0" lvl="8" indent="-317500" algn="ctr" rtl="0">
+              <a:lnSpc>
+                <a:spcPct val="100000"/>
+              </a:lnSpc>
+              <a:spcBef>
+                <a:spcPts val="0"/>
+              </a:spcBef>
+              <a:spcAft>
+                <a:spcPts val="0"/>
+              </a:spcAft>
+              <a:buClr>
+                <a:schemeClr val="dk1"/>
+              </a:buClr>
+              <a:buSzPts val="1400"/>
+              <a:buFont typeface="Hanken Grotesk"/>
+              <a:buNone/>
+              <a:defRPr sz="1400" b="0" i="0" u="none" strike="noStrike" cap="none">
+                <a:solidFill>
+                  <a:schemeClr val="dk1"/>
+                </a:solidFill>
+                <a:latin typeface="Hanken Grotesk"/>
+                <a:ea typeface="Hanken Grotesk"/>
+                <a:cs typeface="Hanken Grotesk"/>
+                <a:sym typeface="Hanken Grotesk"/>
+              </a:defRPr>
+            </a:lvl9pPr>
+          </a:lstStyle>
+          <a:p>
+            <a:pPr marL="0" indent="0"/>
+            <a:r>
+              <a:rPr lang="en-US" sz="1000" dirty="0"/>
+              <a:t>Slide 11 - </a:t>
+            </a:r>
+            <a:fld id="{1612EBDF-BBCF-4455-9CA4-C9C775D5C22A}" type="datetime1">
+              <a:rPr lang="en-US" sz="1000" smtClean="0"/>
+              <a:t>1/15/2026</a:t>
+            </a:fld>
+            <a:endParaRPr lang="en-US" sz="1000" dirty="0"/>
           </a:p>
         </p:txBody>
       </p:sp>
@@ -20963,7 +21547,7 @@
             </a:r>
             <a:fld id="{1612EBDF-BBCF-4455-9CA4-C9C775D5C22A}" type="datetime1">
               <a:rPr lang="en-US" sz="1000" smtClean="0"/>
-              <a:t>1/14/2026</a:t>
+              <a:t>1/15/2026</a:t>
             </a:fld>
             <a:endParaRPr lang="en-US" sz="1000" dirty="0"/>
           </a:p>
@@ -22448,7 +23032,7 @@
             </a:r>
             <a:fld id="{1612EBDF-BBCF-4455-9CA4-C9C775D5C22A}" type="datetime1">
               <a:rPr lang="en-US" sz="1000" smtClean="0"/>
-              <a:t>1/14/2026</a:t>
+              <a:t>1/15/2026</a:t>
             </a:fld>
             <a:endParaRPr lang="en-US" sz="1000" dirty="0"/>
           </a:p>
@@ -23945,11 +24529,11 @@
             <a:pPr marL="0" indent="0"/>
             <a:r>
               <a:rPr lang="en-US" sz="1000" dirty="0"/>
-              <a:t>Slide 13 - </a:t>
+              <a:t>Slide 14 - </a:t>
             </a:r>
             <a:fld id="{1612EBDF-BBCF-4455-9CA4-C9C775D5C22A}" type="datetime1">
               <a:rPr lang="en-US" sz="1000" smtClean="0"/>
-              <a:t>1/14/2026</a:t>
+              <a:t>1/15/2026</a:t>
             </a:fld>
             <a:endParaRPr lang="en-US" sz="1000" dirty="0"/>
           </a:p>
@@ -25637,11 +26221,11 @@
             <a:pPr marL="0" indent="0"/>
             <a:r>
               <a:rPr lang="en-US" sz="1000" dirty="0"/>
-              <a:t>Slide 14 - </a:t>
+              <a:t>Slide 15 - </a:t>
             </a:r>
             <a:fld id="{1612EBDF-BBCF-4455-9CA4-C9C775D5C22A}" type="datetime1">
               <a:rPr lang="en-US" sz="1000" smtClean="0"/>
-              <a:t>1/14/2026</a:t>
+              <a:t>1/15/2026</a:t>
             </a:fld>
             <a:endParaRPr lang="en-US" sz="1000" dirty="0"/>
           </a:p>
@@ -27142,7 +27726,7 @@
             </a:r>
             <a:fld id="{1612EBDF-BBCF-4455-9CA4-C9C775D5C22A}" type="datetime1">
               <a:rPr lang="en-US" sz="1000" smtClean="0"/>
-              <a:t>1/14/2026</a:t>
+              <a:t>1/15/2026</a:t>
             </a:fld>
             <a:endParaRPr lang="en-US" sz="1000" dirty="0"/>
           </a:p>
@@ -27150,10 +27734,10 @@
       </p:sp>
       <p:pic>
         <p:nvPicPr>
-          <p:cNvPr id="6" name="Picture 5" descr="A graph showing different colored bars&#10;&#10;AI-generated content may be incorrect.">
+          <p:cNvPr id="4" name="Picture 3">
             <a:extLst>
               <a:ext uri="{FF2B5EF4-FFF2-40B4-BE49-F238E27FC236}">
-                <a16:creationId xmlns:a16="http://schemas.microsoft.com/office/drawing/2014/main" id="{5C9F4911-268A-CBF1-D4C1-FF548D8339A1}"/>
+                <a16:creationId xmlns:a16="http://schemas.microsoft.com/office/drawing/2014/main" id="{6E548475-80C3-C921-AC4D-EDA3F4B8426C}"/>
               </a:ext>
             </a:extLst>
           </p:cNvPr>
@@ -27170,8 +27754,8 @@
         </p:blipFill>
         <p:spPr>
           <a:xfrm>
-            <a:off x="1785865" y="1045402"/>
-            <a:ext cx="5647815" cy="3369272"/>
+            <a:off x="2123533" y="1116126"/>
+            <a:ext cx="5234602" cy="3357316"/>
           </a:xfrm>
           <a:prstGeom prst="rect">
             <a:avLst/>
@@ -29998,7 +30582,7 @@
             </a:r>
             <a:fld id="{1612EBDF-BBCF-4455-9CA4-C9C775D5C22A}" type="datetime1">
               <a:rPr lang="en-US" sz="1000" smtClean="0"/>
-              <a:t>1/14/2026</a:t>
+              <a:t>1/15/2026</a:t>
             </a:fld>
             <a:endParaRPr lang="en-US" sz="1000" dirty="0"/>
           </a:p>
@@ -33268,11 +33852,11 @@
             <a:pPr marL="0" indent="0"/>
             <a:r>
               <a:rPr lang="en-US" sz="1000" dirty="0"/>
-              <a:t>Slide 20 - </a:t>
+              <a:t>Slide 18 - </a:t>
             </a:r>
             <a:fld id="{1612EBDF-BBCF-4455-9CA4-C9C775D5C22A}" type="datetime1">
               <a:rPr lang="en-US" sz="1000" smtClean="0"/>
-              <a:t>1/14/2026</a:t>
+              <a:t>1/15/2026</a:t>
             </a:fld>
             <a:endParaRPr lang="en-US" sz="1000" dirty="0"/>
           </a:p>
@@ -34038,11 +34622,11 @@
             <a:pPr marL="0" indent="0"/>
             <a:r>
               <a:rPr lang="en-US" sz="1000" dirty="0"/>
-              <a:t>Slide 21 - </a:t>
+              <a:t>Slide 19 - </a:t>
             </a:r>
             <a:fld id="{1612EBDF-BBCF-4455-9CA4-C9C775D5C22A}" type="datetime1">
               <a:rPr lang="en-US" sz="1000" smtClean="0"/>
-              <a:t>1/14/2026</a:t>
+              <a:t>1/15/2026</a:t>
             </a:fld>
             <a:endParaRPr lang="en-US" sz="1000" dirty="0"/>
           </a:p>
@@ -34668,11 +35252,11 @@
             <a:pPr marL="0" indent="0"/>
             <a:r>
               <a:rPr lang="en-US" sz="1000" dirty="0"/>
-              <a:t>Slide 21 - </a:t>
+              <a:t>Slide 20 - </a:t>
             </a:r>
             <a:fld id="{1612EBDF-BBCF-4455-9CA4-C9C775D5C22A}" type="datetime1">
               <a:rPr lang="en-US" sz="1000" smtClean="0"/>
-              <a:t>1/14/2026</a:t>
+              <a:t>1/15/2026</a:t>
             </a:fld>
             <a:endParaRPr lang="en-US" sz="1000" dirty="0"/>
           </a:p>
@@ -36591,7 +37175,7 @@
             </a:r>
             <a:fld id="{1612EBDF-BBCF-4455-9CA4-C9C775D5C22A}" type="datetime1">
               <a:rPr lang="en-US" sz="1000" smtClean="0"/>
-              <a:t>1/14/2026</a:t>
+              <a:t>1/15/2026</a:t>
             </a:fld>
             <a:endParaRPr lang="en-US" sz="1000" dirty="0"/>
           </a:p>
@@ -37749,7 +38333,7 @@
             </a:r>
             <a:fld id="{1612EBDF-BBCF-4455-9CA4-C9C775D5C22A}" type="datetime1">
               <a:rPr lang="en-US" sz="1000" smtClean="0"/>
-              <a:t>1/14/2026</a:t>
+              <a:t>1/15/2026</a:t>
             </a:fld>
             <a:endParaRPr lang="en-US" sz="1000" dirty="0"/>
           </a:p>
@@ -38470,7 +39054,7 @@
             </a:r>
             <a:fld id="{1612EBDF-BBCF-4455-9CA4-C9C775D5C22A}" type="datetime1">
               <a:rPr lang="en-US" sz="1000" smtClean="0"/>
-              <a:t>1/14/2026</a:t>
+              <a:t>1/15/2026</a:t>
             </a:fld>
             <a:endParaRPr lang="en-US" sz="1000" dirty="0"/>
           </a:p>
@@ -39653,11 +40237,11 @@
             <a:pPr marL="0" indent="0"/>
             <a:r>
               <a:rPr lang="en-US" sz="1000" dirty="0"/>
-              <a:t>Slide 5 - </a:t>
+              <a:t>Slide 4 - </a:t>
             </a:r>
             <a:fld id="{1612EBDF-BBCF-4455-9CA4-C9C775D5C22A}" type="datetime1">
               <a:rPr lang="en-US" sz="1000" smtClean="0"/>
-              <a:t>1/14/2026</a:t>
+              <a:t>1/15/2026</a:t>
             </a:fld>
             <a:endParaRPr lang="en-US" sz="1000" dirty="0"/>
           </a:p>
@@ -41385,11 +41969,11 @@
             <a:pPr marL="0" indent="0"/>
             <a:r>
               <a:rPr lang="en-US" sz="1000" dirty="0"/>
-              <a:t>Slide 4 - </a:t>
+              <a:t>Slide 5 - </a:t>
             </a:r>
             <a:fld id="{1612EBDF-BBCF-4455-9CA4-C9C775D5C22A}" type="datetime1">
               <a:rPr lang="en-US" sz="1000" smtClean="0"/>
-              <a:t>1/14/2026</a:t>
+              <a:t>1/15/2026</a:t>
             </a:fld>
             <a:endParaRPr lang="en-US" sz="1000" dirty="0"/>
           </a:p>
@@ -44099,7 +44683,7 @@
             </a:r>
             <a:fld id="{1612EBDF-BBCF-4455-9CA4-C9C775D5C22A}" type="datetime1">
               <a:rPr lang="en-US" sz="1000" smtClean="0"/>
-              <a:t>1/14/2026</a:t>
+              <a:t>1/15/2026</a:t>
             </a:fld>
             <a:endParaRPr lang="en-US" sz="1000" dirty="0"/>
           </a:p>

</xml_diff>